<commit_message>
SRS: Separate System Context into build and query flow field Fixes #48
</commit_message>
<xml_diff>
--- a/docs/SRS/SystemContextFigure.pptx
+++ b/docs/SRS/SystemContextFigure.pptx
@@ -304,7 +304,7 @@
           <a:p>
             <a:fld id="{779256A2-DE0C-7447-B687-786F38514E8C}" type="datetimeFigureOut">
               <a:rPr lang="en-US" smtClean="0"/>
-              <a:t>9/4/19</a:t>
+              <a:t>3/21/2024</a:t>
             </a:fld>
             <a:endParaRPr lang="en-US"/>
           </a:p>
@@ -474,7 +474,7 @@
           <a:p>
             <a:fld id="{779256A2-DE0C-7447-B687-786F38514E8C}" type="datetimeFigureOut">
               <a:rPr lang="en-US" smtClean="0"/>
-              <a:t>9/4/19</a:t>
+              <a:t>3/21/2024</a:t>
             </a:fld>
             <a:endParaRPr lang="en-US"/>
           </a:p>
@@ -654,7 +654,7 @@
           <a:p>
             <a:fld id="{779256A2-DE0C-7447-B687-786F38514E8C}" type="datetimeFigureOut">
               <a:rPr lang="en-US" smtClean="0"/>
-              <a:t>9/4/19</a:t>
+              <a:t>3/21/2024</a:t>
             </a:fld>
             <a:endParaRPr lang="en-US"/>
           </a:p>
@@ -824,7 +824,7 @@
           <a:p>
             <a:fld id="{779256A2-DE0C-7447-B687-786F38514E8C}" type="datetimeFigureOut">
               <a:rPr lang="en-US" smtClean="0"/>
-              <a:t>9/4/19</a:t>
+              <a:t>3/21/2024</a:t>
             </a:fld>
             <a:endParaRPr lang="en-US"/>
           </a:p>
@@ -1070,7 +1070,7 @@
           <a:p>
             <a:fld id="{779256A2-DE0C-7447-B687-786F38514E8C}" type="datetimeFigureOut">
               <a:rPr lang="en-US" smtClean="0"/>
-              <a:t>9/4/19</a:t>
+              <a:t>3/21/2024</a:t>
             </a:fld>
             <a:endParaRPr lang="en-US"/>
           </a:p>
@@ -1358,7 +1358,7 @@
           <a:p>
             <a:fld id="{779256A2-DE0C-7447-B687-786F38514E8C}" type="datetimeFigureOut">
               <a:rPr lang="en-US" smtClean="0"/>
-              <a:t>9/4/19</a:t>
+              <a:t>3/21/2024</a:t>
             </a:fld>
             <a:endParaRPr lang="en-US"/>
           </a:p>
@@ -1780,7 +1780,7 @@
           <a:p>
             <a:fld id="{779256A2-DE0C-7447-B687-786F38514E8C}" type="datetimeFigureOut">
               <a:rPr lang="en-US" smtClean="0"/>
-              <a:t>9/4/19</a:t>
+              <a:t>3/21/2024</a:t>
             </a:fld>
             <a:endParaRPr lang="en-US"/>
           </a:p>
@@ -1898,7 +1898,7 @@
           <a:p>
             <a:fld id="{779256A2-DE0C-7447-B687-786F38514E8C}" type="datetimeFigureOut">
               <a:rPr lang="en-US" smtClean="0"/>
-              <a:t>9/4/19</a:t>
+              <a:t>3/21/2024</a:t>
             </a:fld>
             <a:endParaRPr lang="en-US"/>
           </a:p>
@@ -1993,7 +1993,7 @@
           <a:p>
             <a:fld id="{779256A2-DE0C-7447-B687-786F38514E8C}" type="datetimeFigureOut">
               <a:rPr lang="en-US" smtClean="0"/>
-              <a:t>9/4/19</a:t>
+              <a:t>3/21/2024</a:t>
             </a:fld>
             <a:endParaRPr lang="en-US"/>
           </a:p>
@@ -2270,7 +2270,7 @@
           <a:p>
             <a:fld id="{779256A2-DE0C-7447-B687-786F38514E8C}" type="datetimeFigureOut">
               <a:rPr lang="en-US" smtClean="0"/>
-              <a:t>9/4/19</a:t>
+              <a:t>3/21/2024</a:t>
             </a:fld>
             <a:endParaRPr lang="en-US"/>
           </a:p>
@@ -2523,7 +2523,7 @@
           <a:p>
             <a:fld id="{779256A2-DE0C-7447-B687-786F38514E8C}" type="datetimeFigureOut">
               <a:rPr lang="en-US" smtClean="0"/>
-              <a:t>9/4/19</a:t>
+              <a:t>3/21/2024</a:t>
             </a:fld>
             <a:endParaRPr lang="en-US"/>
           </a:p>
@@ -2736,7 +2736,7 @@
           <a:p>
             <a:fld id="{779256A2-DE0C-7447-B687-786F38514E8C}" type="datetimeFigureOut">
               <a:rPr lang="en-US" smtClean="0"/>
-              <a:t>9/4/19</a:t>
+              <a:t>3/21/2024</a:t>
             </a:fld>
             <a:endParaRPr lang="en-US"/>
           </a:p>
@@ -3119,10 +3119,10 @@
         </p:nvGrpSpPr>
         <p:grpSpPr>
           <a:xfrm>
-            <a:off x="189913" y="2868373"/>
-            <a:ext cx="8858711" cy="1252941"/>
-            <a:chOff x="189913" y="3381165"/>
-            <a:chExt cx="8858711" cy="1252941"/>
+            <a:off x="189913" y="673454"/>
+            <a:ext cx="8858711" cy="1879410"/>
+            <a:chOff x="189913" y="2754696"/>
+            <a:chExt cx="8858711" cy="1879410"/>
           </a:xfrm>
         </p:grpSpPr>
         <p:grpSp>
@@ -3298,8 +3298,8 @@
               </p:nvSpPr>
               <p:spPr>
                 <a:xfrm>
-                  <a:off x="1673605" y="2052185"/>
-                  <a:ext cx="762949" cy="461665"/>
+                  <a:off x="1595868" y="2052185"/>
+                  <a:ext cx="936475" cy="461665"/>
                 </a:xfrm>
                 <a:prstGeom prst="rect">
                   <a:avLst/>
@@ -3317,7 +3317,7 @@
                       <a:latin typeface="Times New Roman"/>
                       <a:cs typeface="Times New Roman"/>
                     </a:rPr>
-                    <a:t>User</a:t>
+                    <a:t>Saved</a:t>
                   </a:r>
                 </a:p>
               </p:txBody>
@@ -3332,10 +3332,10 @@
           </p:nvGrpSpPr>
           <p:grpSpPr>
             <a:xfrm>
-              <a:off x="3885481" y="3381165"/>
-              <a:ext cx="1523744" cy="1246370"/>
-              <a:chOff x="3703297" y="1721177"/>
-              <a:chExt cx="1523744" cy="1246370"/>
+              <a:off x="3851314" y="3381165"/>
+              <a:ext cx="1552028" cy="1246370"/>
+              <a:chOff x="3669130" y="1721177"/>
+              <a:chExt cx="1552028" cy="1246370"/>
             </a:xfrm>
           </p:grpSpPr>
           <p:sp>
@@ -3394,8 +3394,8 @@
             </p:nvSpPr>
             <p:spPr>
               <a:xfrm>
-                <a:off x="3726309" y="2113529"/>
-                <a:ext cx="1500732" cy="461665"/>
+                <a:off x="3669130" y="1927152"/>
+                <a:ext cx="1552028" cy="461665"/>
               </a:xfrm>
               <a:prstGeom prst="rect">
                 <a:avLst/>
@@ -3413,7 +3413,7 @@
                     <a:latin typeface="Times New Roman"/>
                     <a:cs typeface="Times New Roman"/>
                   </a:rPr>
-                  <a:t>ProgName</a:t>
+                  <a:t>SynthEddy</a:t>
                 </a:r>
                 <a:endParaRPr lang="en-US" sz="2400" dirty="0">
                   <a:latin typeface="Times New Roman"/>
@@ -3508,8 +3508,8 @@
           </p:nvSpPr>
           <p:spPr>
             <a:xfrm>
-              <a:off x="1745191" y="3577615"/>
-              <a:ext cx="1114408" cy="369332"/>
+              <a:off x="1468394" y="2766137"/>
+              <a:ext cx="2307042" cy="1200329"/>
             </a:xfrm>
             <a:prstGeom prst="rect">
               <a:avLst/>
@@ -3527,7 +3527,34 @@
                   <a:latin typeface="Times New Roman"/>
                   <a:cs typeface="Times New Roman"/>
                 </a:rPr>
-                <a:t>Inputs: …</a:t>
+                <a:t>Inputs: </a:t>
+              </a:r>
+            </a:p>
+            <a:p>
+              <a:r>
+                <a:rPr lang="en-US" dirty="0">
+                  <a:latin typeface="Times New Roman"/>
+                  <a:cs typeface="Times New Roman"/>
+                </a:rPr>
+                <a:t>Flow field dimensions,</a:t>
+              </a:r>
+            </a:p>
+            <a:p>
+              <a:r>
+                <a:rPr lang="en-US" dirty="0">
+                  <a:latin typeface="Times New Roman"/>
+                  <a:cs typeface="Times New Roman"/>
+                </a:rPr>
+                <a:t>Avg flow velocity,</a:t>
+              </a:r>
+            </a:p>
+            <a:p>
+              <a:r>
+                <a:rPr lang="en-US" dirty="0">
+                  <a:latin typeface="Times New Roman"/>
+                  <a:cs typeface="Times New Roman"/>
+                </a:rPr>
+                <a:t>Eddy profiles</a:t>
               </a:r>
             </a:p>
           </p:txBody>
@@ -3540,8 +3567,8 @@
           </p:nvSpPr>
           <p:spPr>
             <a:xfrm>
-              <a:off x="5369175" y="3577615"/>
-              <a:ext cx="1268296" cy="369332"/>
+              <a:off x="5573022" y="2754696"/>
+              <a:ext cx="2003497" cy="1200329"/>
             </a:xfrm>
             <a:prstGeom prst="rect">
               <a:avLst/>
@@ -3559,12 +3586,808 @@
                   <a:latin typeface="Times New Roman"/>
                   <a:cs typeface="Times New Roman"/>
                 </a:rPr>
-                <a:t>Outputs: …</a:t>
+                <a:t>Outputs: </a:t>
+              </a:r>
+            </a:p>
+            <a:p>
+              <a:r>
+                <a:rPr lang="en-US" dirty="0">
+                  <a:latin typeface="Times New Roman"/>
+                  <a:cs typeface="Times New Roman"/>
+                </a:rPr>
+                <a:t>Intensity, scale and </a:t>
+              </a:r>
+              <a:br>
+                <a:rPr lang="en-US" dirty="0">
+                  <a:latin typeface="Times New Roman"/>
+                  <a:cs typeface="Times New Roman"/>
+                </a:rPr>
+              </a:br>
+              <a:r>
+                <a:rPr lang="en-US" dirty="0">
+                  <a:latin typeface="Times New Roman"/>
+                  <a:cs typeface="Times New Roman"/>
+                </a:rPr>
+                <a:t>initial position </a:t>
+              </a:r>
+              <a:br>
+                <a:rPr lang="en-US" dirty="0">
+                  <a:latin typeface="Times New Roman"/>
+                  <a:cs typeface="Times New Roman"/>
+                </a:rPr>
+              </a:br>
+              <a:r>
+                <a:rPr lang="en-US" dirty="0">
+                  <a:latin typeface="Times New Roman"/>
+                  <a:cs typeface="Times New Roman"/>
+                </a:rPr>
+                <a:t>of each eddy</a:t>
               </a:r>
             </a:p>
           </p:txBody>
         </p:sp>
       </p:grpSp>
+      <p:sp>
+        <p:nvSpPr>
+          <p:cNvPr id="3" name="TextBox 2">
+            <a:extLst>
+              <a:ext uri="{FF2B5EF4-FFF2-40B4-BE49-F238E27FC236}">
+                <a16:creationId xmlns:a16="http://schemas.microsoft.com/office/drawing/2014/main" id="{0152B9A9-F873-1FC7-4BE2-443523239136}"/>
+              </a:ext>
+            </a:extLst>
+          </p:cNvPr>
+          <p:cNvSpPr txBox="1"/>
+          <p:nvPr/>
+        </p:nvSpPr>
+        <p:spPr>
+          <a:xfrm>
+            <a:off x="3876962" y="1993653"/>
+            <a:ext cx="1526380" cy="523220"/>
+          </a:xfrm>
+          <a:prstGeom prst="rect">
+            <a:avLst/>
+          </a:prstGeom>
+          <a:noFill/>
+        </p:spPr>
+        <p:txBody>
+          <a:bodyPr wrap="none" rtlCol="0">
+            <a:spAutoFit/>
+          </a:bodyPr>
+          <a:lstStyle/>
+          <a:p>
+            <a:pPr algn="ctr"/>
+            <a:r>
+              <a:rPr lang="en-US" sz="1400" dirty="0">
+                <a:latin typeface="Times New Roman"/>
+                <a:cs typeface="Times New Roman"/>
+              </a:rPr>
+              <a:t>Field Construction</a:t>
+            </a:r>
+            <a:br>
+              <a:rPr lang="en-US" sz="1400" dirty="0">
+                <a:latin typeface="Times New Roman"/>
+                <a:cs typeface="Times New Roman"/>
+              </a:rPr>
+            </a:br>
+            <a:r>
+              <a:rPr lang="en-US" sz="1400" dirty="0">
+                <a:latin typeface="Times New Roman"/>
+                <a:cs typeface="Times New Roman"/>
+              </a:rPr>
+              <a:t>Mode</a:t>
+            </a:r>
+          </a:p>
+        </p:txBody>
+      </p:sp>
+      <p:grpSp>
+        <p:nvGrpSpPr>
+          <p:cNvPr id="11" name="Group 10">
+            <a:extLst>
+              <a:ext uri="{FF2B5EF4-FFF2-40B4-BE49-F238E27FC236}">
+                <a16:creationId xmlns:a16="http://schemas.microsoft.com/office/drawing/2014/main" id="{039CE3A7-B919-AFC6-A569-1A099AD40806}"/>
+              </a:ext>
+            </a:extLst>
+          </p:cNvPr>
+          <p:cNvGrpSpPr/>
+          <p:nvPr/>
+        </p:nvGrpSpPr>
+        <p:grpSpPr>
+          <a:xfrm>
+            <a:off x="192139" y="3977200"/>
+            <a:ext cx="8858711" cy="1580877"/>
+            <a:chOff x="189913" y="3053229"/>
+            <a:chExt cx="8858711" cy="1580877"/>
+          </a:xfrm>
+        </p:grpSpPr>
+        <p:grpSp>
+          <p:nvGrpSpPr>
+            <p:cNvPr id="12" name="Group 11">
+              <a:extLst>
+                <a:ext uri="{FF2B5EF4-FFF2-40B4-BE49-F238E27FC236}">
+                  <a16:creationId xmlns:a16="http://schemas.microsoft.com/office/drawing/2014/main" id="{D8AC7D9C-B34F-3C62-A619-C0CBD49D80EA}"/>
+                </a:ext>
+              </a:extLst>
+            </p:cNvPr>
+            <p:cNvGrpSpPr/>
+            <p:nvPr/>
+          </p:nvGrpSpPr>
+          <p:grpSpPr>
+            <a:xfrm>
+              <a:off x="189913" y="3387736"/>
+              <a:ext cx="8858711" cy="1246370"/>
+              <a:chOff x="189913" y="1721177"/>
+              <a:chExt cx="8858711" cy="1246370"/>
+            </a:xfrm>
+          </p:grpSpPr>
+          <p:grpSp>
+            <p:nvGrpSpPr>
+              <p:cNvPr id="23" name="Group 22">
+                <a:extLst>
+                  <a:ext uri="{FF2B5EF4-FFF2-40B4-BE49-F238E27FC236}">
+                    <a16:creationId xmlns:a16="http://schemas.microsoft.com/office/drawing/2014/main" id="{637D060B-E739-92F5-DF8A-721539B78303}"/>
+                  </a:ext>
+                </a:extLst>
+              </p:cNvPr>
+              <p:cNvGrpSpPr/>
+              <p:nvPr/>
+            </p:nvGrpSpPr>
+            <p:grpSpPr>
+              <a:xfrm>
+                <a:off x="189913" y="1721177"/>
+                <a:ext cx="1246302" cy="1246370"/>
+                <a:chOff x="1436215" y="1721177"/>
+                <a:chExt cx="1246302" cy="1246370"/>
+              </a:xfrm>
+            </p:grpSpPr>
+            <p:sp>
+              <p:nvSpPr>
+                <p:cNvPr id="29" name="Oval 28">
+                  <a:extLst>
+                    <a:ext uri="{FF2B5EF4-FFF2-40B4-BE49-F238E27FC236}">
+                      <a16:creationId xmlns:a16="http://schemas.microsoft.com/office/drawing/2014/main" id="{A1EEB837-7886-C9BB-82C7-CFC59875DDB8}"/>
+                    </a:ext>
+                  </a:extLst>
+                </p:cNvPr>
+                <p:cNvSpPr/>
+                <p:nvPr/>
+              </p:nvSpPr>
+              <p:spPr>
+                <a:xfrm>
+                  <a:off x="1436215" y="1721177"/>
+                  <a:ext cx="1246302" cy="1246370"/>
+                </a:xfrm>
+                <a:prstGeom prst="ellipse">
+                  <a:avLst/>
+                </a:prstGeom>
+                <a:noFill/>
+                <a:ln w="38100" cmpd="sng">
+                  <a:solidFill>
+                    <a:schemeClr val="tx1"/>
+                  </a:solidFill>
+                </a:ln>
+                <a:effectLst/>
+              </p:spPr>
+              <p:style>
+                <a:lnRef idx="1">
+                  <a:schemeClr val="accent1"/>
+                </a:lnRef>
+                <a:fillRef idx="3">
+                  <a:schemeClr val="accent1"/>
+                </a:fillRef>
+                <a:effectRef idx="2">
+                  <a:schemeClr val="accent1"/>
+                </a:effectRef>
+                <a:fontRef idx="minor">
+                  <a:schemeClr val="lt1"/>
+                </a:fontRef>
+              </p:style>
+              <p:txBody>
+                <a:bodyPr rtlCol="0" anchor="ctr"/>
+                <a:lstStyle/>
+                <a:p>
+                  <a:pPr algn="ctr"/>
+                  <a:endParaRPr lang="en-US"/>
+                </a:p>
+              </p:txBody>
+            </p:sp>
+            <p:sp>
+              <p:nvSpPr>
+                <p:cNvPr id="30" name="TextBox 29">
+                  <a:extLst>
+                    <a:ext uri="{FF2B5EF4-FFF2-40B4-BE49-F238E27FC236}">
+                      <a16:creationId xmlns:a16="http://schemas.microsoft.com/office/drawing/2014/main" id="{F81C05D0-E59E-00FD-C84B-52A092AE94D7}"/>
+                    </a:ext>
+                  </a:extLst>
+                </p:cNvPr>
+                <p:cNvSpPr txBox="1"/>
+                <p:nvPr/>
+              </p:nvSpPr>
+              <p:spPr>
+                <a:xfrm>
+                  <a:off x="1660758" y="1737563"/>
+                  <a:ext cx="784189" cy="1200329"/>
+                </a:xfrm>
+                <a:prstGeom prst="rect">
+                  <a:avLst/>
+                </a:prstGeom>
+                <a:noFill/>
+              </p:spPr>
+              <p:txBody>
+                <a:bodyPr wrap="none" rtlCol="0">
+                  <a:spAutoFit/>
+                </a:bodyPr>
+                <a:lstStyle/>
+                <a:p>
+                  <a:r>
+                    <a:rPr lang="en-US" sz="2400" dirty="0">
+                      <a:latin typeface="Times New Roman"/>
+                      <a:cs typeface="Times New Roman"/>
+                    </a:rPr>
+                    <a:t>User</a:t>
+                  </a:r>
+                </a:p>
+                <a:p>
+                  <a:pPr algn="ctr"/>
+                  <a:r>
+                    <a:rPr lang="en-US" sz="2400" dirty="0">
+                      <a:latin typeface="Times New Roman"/>
+                      <a:cs typeface="Times New Roman"/>
+                    </a:rPr>
+                    <a:t>or</a:t>
+                  </a:r>
+                </a:p>
+                <a:p>
+                  <a:r>
+                    <a:rPr lang="en-US" sz="2400" dirty="0">
+                      <a:latin typeface="Times New Roman"/>
+                      <a:cs typeface="Times New Roman"/>
+                    </a:rPr>
+                    <a:t>CFD</a:t>
+                  </a:r>
+                </a:p>
+              </p:txBody>
+            </p:sp>
+          </p:grpSp>
+          <p:grpSp>
+            <p:nvGrpSpPr>
+              <p:cNvPr id="24" name="Group 23">
+                <a:extLst>
+                  <a:ext uri="{FF2B5EF4-FFF2-40B4-BE49-F238E27FC236}">
+                    <a16:creationId xmlns:a16="http://schemas.microsoft.com/office/drawing/2014/main" id="{74E9B68D-1EC2-17BE-CC6F-94634F1D3D04}"/>
+                  </a:ext>
+                </a:extLst>
+              </p:cNvPr>
+              <p:cNvGrpSpPr/>
+              <p:nvPr/>
+            </p:nvGrpSpPr>
+            <p:grpSpPr>
+              <a:xfrm>
+                <a:off x="7802322" y="1721177"/>
+                <a:ext cx="1246302" cy="1246370"/>
+                <a:chOff x="1436215" y="1721177"/>
+                <a:chExt cx="1246302" cy="1246370"/>
+              </a:xfrm>
+            </p:grpSpPr>
+            <p:sp>
+              <p:nvSpPr>
+                <p:cNvPr id="26" name="Oval 25">
+                  <a:extLst>
+                    <a:ext uri="{FF2B5EF4-FFF2-40B4-BE49-F238E27FC236}">
+                      <a16:creationId xmlns:a16="http://schemas.microsoft.com/office/drawing/2014/main" id="{1246B490-44BE-2CFF-7A9C-E339CC13D788}"/>
+                    </a:ext>
+                  </a:extLst>
+                </p:cNvPr>
+                <p:cNvSpPr/>
+                <p:nvPr/>
+              </p:nvSpPr>
+              <p:spPr>
+                <a:xfrm>
+                  <a:off x="1436215" y="1721177"/>
+                  <a:ext cx="1246302" cy="1246370"/>
+                </a:xfrm>
+                <a:prstGeom prst="ellipse">
+                  <a:avLst/>
+                </a:prstGeom>
+                <a:noFill/>
+                <a:ln w="38100" cmpd="sng">
+                  <a:solidFill>
+                    <a:schemeClr val="tx1"/>
+                  </a:solidFill>
+                </a:ln>
+                <a:effectLst/>
+              </p:spPr>
+              <p:style>
+                <a:lnRef idx="1">
+                  <a:schemeClr val="accent1"/>
+                </a:lnRef>
+                <a:fillRef idx="3">
+                  <a:schemeClr val="accent1"/>
+                </a:fillRef>
+                <a:effectRef idx="2">
+                  <a:schemeClr val="accent1"/>
+                </a:effectRef>
+                <a:fontRef idx="minor">
+                  <a:schemeClr val="lt1"/>
+                </a:fontRef>
+              </p:style>
+              <p:txBody>
+                <a:bodyPr rtlCol="0" anchor="ctr"/>
+                <a:lstStyle/>
+                <a:p>
+                  <a:pPr algn="ctr"/>
+                  <a:endParaRPr lang="en-US"/>
+                </a:p>
+              </p:txBody>
+            </p:sp>
+            <p:sp>
+              <p:nvSpPr>
+                <p:cNvPr id="28" name="TextBox 27">
+                  <a:extLst>
+                    <a:ext uri="{FF2B5EF4-FFF2-40B4-BE49-F238E27FC236}">
+                      <a16:creationId xmlns:a16="http://schemas.microsoft.com/office/drawing/2014/main" id="{C9EDDAED-64F1-D911-7CF3-05E240ABABBA}"/>
+                    </a:ext>
+                  </a:extLst>
+                </p:cNvPr>
+                <p:cNvSpPr txBox="1"/>
+                <p:nvPr/>
+              </p:nvSpPr>
+              <p:spPr>
+                <a:xfrm>
+                  <a:off x="1595868" y="2052185"/>
+                  <a:ext cx="936475" cy="461665"/>
+                </a:xfrm>
+                <a:prstGeom prst="rect">
+                  <a:avLst/>
+                </a:prstGeom>
+                <a:noFill/>
+              </p:spPr>
+              <p:txBody>
+                <a:bodyPr wrap="none" rtlCol="0">
+                  <a:spAutoFit/>
+                </a:bodyPr>
+                <a:lstStyle/>
+                <a:p>
+                  <a:r>
+                    <a:rPr lang="en-US" sz="2400" dirty="0">
+                      <a:latin typeface="Times New Roman"/>
+                      <a:cs typeface="Times New Roman"/>
+                    </a:rPr>
+                    <a:t>Saved</a:t>
+                  </a:r>
+                </a:p>
+              </p:txBody>
+            </p:sp>
+          </p:grpSp>
+        </p:grpSp>
+        <p:grpSp>
+          <p:nvGrpSpPr>
+            <p:cNvPr id="13" name="Group 12">
+              <a:extLst>
+                <a:ext uri="{FF2B5EF4-FFF2-40B4-BE49-F238E27FC236}">
+                  <a16:creationId xmlns:a16="http://schemas.microsoft.com/office/drawing/2014/main" id="{034E2477-9324-27FF-FC0F-935B946060B4}"/>
+                </a:ext>
+              </a:extLst>
+            </p:cNvPr>
+            <p:cNvGrpSpPr/>
+            <p:nvPr/>
+          </p:nvGrpSpPr>
+          <p:grpSpPr>
+            <a:xfrm>
+              <a:off x="3851314" y="3381165"/>
+              <a:ext cx="1552028" cy="1246370"/>
+              <a:chOff x="3669130" y="1721177"/>
+              <a:chExt cx="1552028" cy="1246370"/>
+            </a:xfrm>
+          </p:grpSpPr>
+          <p:sp>
+            <p:nvSpPr>
+              <p:cNvPr id="21" name="Rectangle 20">
+                <a:extLst>
+                  <a:ext uri="{FF2B5EF4-FFF2-40B4-BE49-F238E27FC236}">
+                    <a16:creationId xmlns:a16="http://schemas.microsoft.com/office/drawing/2014/main" id="{B53D56AD-039F-66A7-536B-26D3FD3E86F3}"/>
+                  </a:ext>
+                </a:extLst>
+              </p:cNvPr>
+              <p:cNvSpPr/>
+              <p:nvPr/>
+            </p:nvSpPr>
+            <p:spPr>
+              <a:xfrm>
+                <a:off x="3703297" y="1721177"/>
+                <a:ext cx="1483694" cy="1246370"/>
+              </a:xfrm>
+              <a:prstGeom prst="rect">
+                <a:avLst/>
+              </a:prstGeom>
+              <a:noFill/>
+              <a:ln w="38100" cmpd="sng">
+                <a:solidFill>
+                  <a:schemeClr val="tx1"/>
+                </a:solidFill>
+              </a:ln>
+              <a:effectLst/>
+            </p:spPr>
+            <p:style>
+              <a:lnRef idx="1">
+                <a:schemeClr val="accent1"/>
+              </a:lnRef>
+              <a:fillRef idx="3">
+                <a:schemeClr val="accent1"/>
+              </a:fillRef>
+              <a:effectRef idx="2">
+                <a:schemeClr val="accent1"/>
+              </a:effectRef>
+              <a:fontRef idx="minor">
+                <a:schemeClr val="lt1"/>
+              </a:fontRef>
+            </p:style>
+            <p:txBody>
+              <a:bodyPr rtlCol="0" anchor="ctr"/>
+              <a:lstStyle/>
+              <a:p>
+                <a:pPr algn="ctr"/>
+                <a:r>
+                  <a:rPr lang="en-US"/>
+                  <a:t>`</a:t>
+                </a:r>
+              </a:p>
+            </p:txBody>
+          </p:sp>
+          <p:sp>
+            <p:nvSpPr>
+              <p:cNvPr id="22" name="TextBox 21">
+                <a:extLst>
+                  <a:ext uri="{FF2B5EF4-FFF2-40B4-BE49-F238E27FC236}">
+                    <a16:creationId xmlns:a16="http://schemas.microsoft.com/office/drawing/2014/main" id="{7F85A99C-B9E2-A221-F62A-1FF2A7223F3A}"/>
+                  </a:ext>
+                </a:extLst>
+              </p:cNvPr>
+              <p:cNvSpPr txBox="1"/>
+              <p:nvPr/>
+            </p:nvSpPr>
+            <p:spPr>
+              <a:xfrm>
+                <a:off x="3669130" y="1927152"/>
+                <a:ext cx="1552028" cy="461665"/>
+              </a:xfrm>
+              <a:prstGeom prst="rect">
+                <a:avLst/>
+              </a:prstGeom>
+              <a:noFill/>
+            </p:spPr>
+            <p:txBody>
+              <a:bodyPr wrap="none" rtlCol="0">
+                <a:spAutoFit/>
+              </a:bodyPr>
+              <a:lstStyle/>
+              <a:p>
+                <a:r>
+                  <a:rPr lang="en-US" sz="2400" dirty="0" err="1">
+                    <a:latin typeface="Times New Roman"/>
+                    <a:cs typeface="Times New Roman"/>
+                  </a:rPr>
+                  <a:t>SynthEddy</a:t>
+                </a:r>
+                <a:endParaRPr lang="en-US" sz="2400" dirty="0">
+                  <a:latin typeface="Times New Roman"/>
+                  <a:cs typeface="Times New Roman"/>
+                </a:endParaRPr>
+              </a:p>
+            </p:txBody>
+          </p:sp>
+        </p:grpSp>
+        <p:cxnSp>
+          <p:nvCxnSpPr>
+            <p:cNvPr id="14" name="Straight Arrow Connector 13">
+              <a:extLst>
+                <a:ext uri="{FF2B5EF4-FFF2-40B4-BE49-F238E27FC236}">
+                  <a16:creationId xmlns:a16="http://schemas.microsoft.com/office/drawing/2014/main" id="{F5628CE3-7457-06B4-83EC-0046878A21C3}"/>
+                </a:ext>
+              </a:extLst>
+            </p:cNvPr>
+            <p:cNvCxnSpPr>
+              <a:stCxn id="29" idx="6"/>
+              <a:endCxn id="21" idx="1"/>
+            </p:cNvCxnSpPr>
+            <p:nvPr/>
+          </p:nvCxnSpPr>
+          <p:spPr>
+            <a:xfrm flipV="1">
+              <a:off x="1436215" y="4004350"/>
+              <a:ext cx="2449266" cy="6571"/>
+            </a:xfrm>
+            <a:prstGeom prst="straightConnector1">
+              <a:avLst/>
+            </a:prstGeom>
+            <a:ln w="38100" cmpd="sng">
+              <a:solidFill>
+                <a:schemeClr val="tx1"/>
+              </a:solidFill>
+              <a:tailEnd type="arrow"/>
+            </a:ln>
+            <a:effectLst/>
+          </p:spPr>
+          <p:style>
+            <a:lnRef idx="2">
+              <a:schemeClr val="accent1"/>
+            </a:lnRef>
+            <a:fillRef idx="0">
+              <a:schemeClr val="accent1"/>
+            </a:fillRef>
+            <a:effectRef idx="1">
+              <a:schemeClr val="accent1"/>
+            </a:effectRef>
+            <a:fontRef idx="minor">
+              <a:schemeClr val="tx1"/>
+            </a:fontRef>
+          </p:style>
+        </p:cxnSp>
+        <p:cxnSp>
+          <p:nvCxnSpPr>
+            <p:cNvPr id="15" name="Straight Arrow Connector 14">
+              <a:extLst>
+                <a:ext uri="{FF2B5EF4-FFF2-40B4-BE49-F238E27FC236}">
+                  <a16:creationId xmlns:a16="http://schemas.microsoft.com/office/drawing/2014/main" id="{C87B0814-6395-E39D-55D1-96CD9772500F}"/>
+                </a:ext>
+              </a:extLst>
+            </p:cNvPr>
+            <p:cNvCxnSpPr/>
+            <p:nvPr/>
+          </p:nvCxnSpPr>
+          <p:spPr>
+            <a:xfrm>
+              <a:off x="5369175" y="4010921"/>
+              <a:ext cx="2449266" cy="0"/>
+            </a:xfrm>
+            <a:prstGeom prst="straightConnector1">
+              <a:avLst/>
+            </a:prstGeom>
+            <a:ln w="38100" cmpd="sng">
+              <a:solidFill>
+                <a:schemeClr val="tx1"/>
+              </a:solidFill>
+              <a:tailEnd type="arrow"/>
+            </a:ln>
+            <a:effectLst/>
+          </p:spPr>
+          <p:style>
+            <a:lnRef idx="2">
+              <a:schemeClr val="accent1"/>
+            </a:lnRef>
+            <a:fillRef idx="0">
+              <a:schemeClr val="accent1"/>
+            </a:fillRef>
+            <a:effectRef idx="1">
+              <a:schemeClr val="accent1"/>
+            </a:effectRef>
+            <a:fontRef idx="minor">
+              <a:schemeClr val="tx1"/>
+            </a:fontRef>
+          </p:style>
+        </p:cxnSp>
+        <p:sp>
+          <p:nvSpPr>
+            <p:cNvPr id="16" name="TextBox 15">
+              <a:extLst>
+                <a:ext uri="{FF2B5EF4-FFF2-40B4-BE49-F238E27FC236}">
+                  <a16:creationId xmlns:a16="http://schemas.microsoft.com/office/drawing/2014/main" id="{0C1872C3-4437-3222-896B-B8D141349931}"/>
+                </a:ext>
+              </a:extLst>
+            </p:cNvPr>
+            <p:cNvSpPr txBox="1"/>
+            <p:nvPr/>
+          </p:nvSpPr>
+          <p:spPr>
+            <a:xfrm>
+              <a:off x="1527972" y="3053229"/>
+              <a:ext cx="1702133" cy="923330"/>
+            </a:xfrm>
+            <a:prstGeom prst="rect">
+              <a:avLst/>
+            </a:prstGeom>
+            <a:noFill/>
+          </p:spPr>
+          <p:txBody>
+            <a:bodyPr wrap="none" rtlCol="0">
+              <a:spAutoFit/>
+            </a:bodyPr>
+            <a:lstStyle/>
+            <a:p>
+              <a:r>
+                <a:rPr lang="en-US" dirty="0">
+                  <a:latin typeface="Times New Roman"/>
+                  <a:cs typeface="Times New Roman"/>
+                </a:rPr>
+                <a:t>Inputs: </a:t>
+              </a:r>
+            </a:p>
+            <a:p>
+              <a:r>
+                <a:rPr lang="en-US" dirty="0">
+                  <a:latin typeface="Times New Roman"/>
+                  <a:cs typeface="Times New Roman"/>
+                </a:rPr>
+                <a:t>Position (x, y, z)</a:t>
+              </a:r>
+            </a:p>
+            <a:p>
+              <a:r>
+                <a:rPr lang="en-US" dirty="0">
+                  <a:latin typeface="Times New Roman"/>
+                  <a:cs typeface="Times New Roman"/>
+                </a:rPr>
+                <a:t>Time (t)</a:t>
+              </a:r>
+            </a:p>
+          </p:txBody>
+        </p:sp>
+        <p:sp>
+          <p:nvSpPr>
+            <p:cNvPr id="17" name="TextBox 16">
+              <a:extLst>
+                <a:ext uri="{FF2B5EF4-FFF2-40B4-BE49-F238E27FC236}">
+                  <a16:creationId xmlns:a16="http://schemas.microsoft.com/office/drawing/2014/main" id="{B7522B71-5505-D580-D8A0-ED0317319753}"/>
+                </a:ext>
+              </a:extLst>
+            </p:cNvPr>
+            <p:cNvSpPr txBox="1"/>
+            <p:nvPr/>
+          </p:nvSpPr>
+          <p:spPr>
+            <a:xfrm>
+              <a:off x="5512709" y="3303245"/>
+              <a:ext cx="2118978" cy="646331"/>
+            </a:xfrm>
+            <a:prstGeom prst="rect">
+              <a:avLst/>
+            </a:prstGeom>
+            <a:noFill/>
+          </p:spPr>
+          <p:txBody>
+            <a:bodyPr wrap="none" rtlCol="0">
+              <a:spAutoFit/>
+            </a:bodyPr>
+            <a:lstStyle/>
+            <a:p>
+              <a:r>
+                <a:rPr lang="en-US" dirty="0">
+                  <a:latin typeface="Times New Roman"/>
+                  <a:cs typeface="Times New Roman"/>
+                </a:rPr>
+                <a:t>Output: </a:t>
+              </a:r>
+            </a:p>
+            <a:p>
+              <a:r>
+                <a:rPr lang="en-US" dirty="0">
+                  <a:latin typeface="Times New Roman"/>
+                  <a:cs typeface="Times New Roman"/>
+                </a:rPr>
+                <a:t>Velocity at (x, y, z, t)</a:t>
+              </a:r>
+            </a:p>
+          </p:txBody>
+        </p:sp>
+      </p:grpSp>
+      <p:sp>
+        <p:nvSpPr>
+          <p:cNvPr id="31" name="TextBox 30">
+            <a:extLst>
+              <a:ext uri="{FF2B5EF4-FFF2-40B4-BE49-F238E27FC236}">
+                <a16:creationId xmlns:a16="http://schemas.microsoft.com/office/drawing/2014/main" id="{2242D141-8642-50CE-2586-985806FEB9D8}"/>
+              </a:ext>
+            </a:extLst>
+          </p:cNvPr>
+          <p:cNvSpPr txBox="1"/>
+          <p:nvPr/>
+        </p:nvSpPr>
+        <p:spPr>
+          <a:xfrm>
+            <a:off x="4095834" y="5079073"/>
+            <a:ext cx="1098378" cy="307777"/>
+          </a:xfrm>
+          <a:prstGeom prst="rect">
+            <a:avLst/>
+          </a:prstGeom>
+          <a:noFill/>
+        </p:spPr>
+        <p:txBody>
+          <a:bodyPr wrap="none" rtlCol="0">
+            <a:spAutoFit/>
+          </a:bodyPr>
+          <a:lstStyle/>
+          <a:p>
+            <a:r>
+              <a:rPr lang="en-US" sz="1400" dirty="0">
+                <a:latin typeface="Times New Roman"/>
+                <a:cs typeface="Times New Roman"/>
+              </a:rPr>
+              <a:t>Query Mode</a:t>
+            </a:r>
+          </a:p>
+        </p:txBody>
+      </p:sp>
+      <p:cxnSp>
+        <p:nvCxnSpPr>
+          <p:cNvPr id="33" name="Straight Arrow Connector 32">
+            <a:extLst>
+              <a:ext uri="{FF2B5EF4-FFF2-40B4-BE49-F238E27FC236}">
+                <a16:creationId xmlns:a16="http://schemas.microsoft.com/office/drawing/2014/main" id="{A952A90C-6F4D-20C3-59F8-DD12D8774945}"/>
+              </a:ext>
+            </a:extLst>
+          </p:cNvPr>
+          <p:cNvCxnSpPr>
+            <a:cxnSpLocks/>
+          </p:cNvCxnSpPr>
+          <p:nvPr/>
+        </p:nvCxnSpPr>
+        <p:spPr>
+          <a:xfrm flipH="1">
+            <a:off x="4743450" y="2255263"/>
+            <a:ext cx="3061098" cy="1995099"/>
+          </a:xfrm>
+          <a:prstGeom prst="straightConnector1">
+            <a:avLst/>
+          </a:prstGeom>
+          <a:ln w="38100">
+            <a:headEnd type="none" w="med" len="med"/>
+            <a:tailEnd type="arrow" w="med" len="med"/>
+          </a:ln>
+          <a:effectLst/>
+        </p:spPr>
+        <p:style>
+          <a:lnRef idx="2">
+            <a:schemeClr val="dk1"/>
+          </a:lnRef>
+          <a:fillRef idx="0">
+            <a:schemeClr val="dk1"/>
+          </a:fillRef>
+          <a:effectRef idx="1">
+            <a:schemeClr val="dk1"/>
+          </a:effectRef>
+          <a:fontRef idx="minor">
+            <a:schemeClr val="tx1"/>
+          </a:fontRef>
+        </p:style>
+      </p:cxnSp>
+      <p:sp>
+        <p:nvSpPr>
+          <p:cNvPr id="43" name="TextBox 42">
+            <a:extLst>
+              <a:ext uri="{FF2B5EF4-FFF2-40B4-BE49-F238E27FC236}">
+                <a16:creationId xmlns:a16="http://schemas.microsoft.com/office/drawing/2014/main" id="{4512E2B9-B1C0-2578-AA7A-848A35B9C61E}"/>
+              </a:ext>
+            </a:extLst>
+          </p:cNvPr>
+          <p:cNvSpPr txBox="1"/>
+          <p:nvPr/>
+        </p:nvSpPr>
+        <p:spPr>
+          <a:xfrm rot="19624764">
+            <a:off x="4647891" y="3049595"/>
+            <a:ext cx="2460930" cy="369332"/>
+          </a:xfrm>
+          <a:prstGeom prst="rect">
+            <a:avLst/>
+          </a:prstGeom>
+          <a:noFill/>
+        </p:spPr>
+        <p:txBody>
+          <a:bodyPr wrap="none" rtlCol="0">
+            <a:spAutoFit/>
+          </a:bodyPr>
+          <a:lstStyle/>
+          <a:p>
+            <a:r>
+              <a:rPr lang="en-US" dirty="0">
+                <a:latin typeface="Times New Roman"/>
+                <a:cs typeface="Times New Roman"/>
+              </a:rPr>
+              <a:t>Inputs: (read saved data)</a:t>
+            </a:r>
+          </a:p>
+        </p:txBody>
+      </p:sp>
     </p:spTree>
     <p:extLst>
       <p:ext uri="{BB962C8B-B14F-4D97-AF65-F5344CB8AC3E}">

</xml_diff>

<commit_message>
Consistency of Input Fixes #13 Positions are all bold x now
</commit_message>
<xml_diff>
--- a/docs/SRS/SystemContextFigure.pptx
+++ b/docs/SRS/SystemContextFigure.pptx
@@ -3119,10 +3119,10 @@
         </p:nvGrpSpPr>
         <p:grpSpPr>
           <a:xfrm>
-            <a:off x="189913" y="673454"/>
-            <a:ext cx="8858711" cy="1879410"/>
-            <a:chOff x="189913" y="2754696"/>
-            <a:chExt cx="8858711" cy="1879410"/>
+            <a:off x="189913" y="483129"/>
+            <a:ext cx="8858711" cy="2069735"/>
+            <a:chOff x="189913" y="2564371"/>
+            <a:chExt cx="8858711" cy="2069735"/>
           </a:xfrm>
         </p:grpSpPr>
         <p:grpSp>
@@ -3508,8 +3508,8 @@
           </p:nvSpPr>
           <p:spPr>
             <a:xfrm>
-              <a:off x="1468394" y="2766137"/>
-              <a:ext cx="2307042" cy="1200329"/>
+              <a:off x="1459432" y="2564371"/>
+              <a:ext cx="2307042" cy="1446550"/>
             </a:xfrm>
             <a:prstGeom prst="rect">
               <a:avLst/>
@@ -3554,7 +3554,16 @@
                   <a:latin typeface="Times New Roman"/>
                   <a:cs typeface="Times New Roman"/>
                 </a:rPr>
-                <a:t>Eddy profiles</a:t>
+                <a:t>Eddy profiles </a:t>
+              </a:r>
+            </a:p>
+            <a:p>
+              <a:r>
+                <a:rPr lang="en-US" sz="1600" dirty="0">
+                  <a:latin typeface="Times New Roman"/>
+                  <a:cs typeface="Times New Roman"/>
+                </a:rPr>
+                <a:t>(intensity and scale)</a:t>
               </a:r>
             </a:p>
           </p:txBody>
@@ -4180,7 +4189,7 @@
           <p:spPr>
             <a:xfrm>
               <a:off x="1527972" y="3053229"/>
-              <a:ext cx="1702133" cy="923330"/>
+              <a:ext cx="2242922" cy="923330"/>
             </a:xfrm>
             <a:prstGeom prst="rect">
               <a:avLst/>
@@ -4207,8 +4216,26 @@
                   <a:latin typeface="Times New Roman"/>
                   <a:cs typeface="Times New Roman"/>
                 </a:rPr>
-                <a:t>Position (x, y, z)</a:t>
+                <a:t>Position </a:t>
               </a:r>
+              <a:r>
+                <a:rPr lang="en-US" b="1" dirty="0">
+                  <a:latin typeface="Times New Roman"/>
+                  <a:cs typeface="Times New Roman"/>
+                </a:rPr>
+                <a:t>x</a:t>
+              </a:r>
+              <a:r>
+                <a:rPr lang="en-US" dirty="0">
+                  <a:latin typeface="Times New Roman"/>
+                  <a:cs typeface="Times New Roman"/>
+                </a:rPr>
+                <a:t> (3D vector)</a:t>
+              </a:r>
+              <a:endParaRPr lang="en-US" b="1" dirty="0">
+                <a:latin typeface="Times New Roman"/>
+                <a:cs typeface="Times New Roman"/>
+              </a:endParaRPr>
             </a:p>
             <a:p>
               <a:r>
@@ -4236,7 +4263,7 @@
           <p:spPr>
             <a:xfrm>
               <a:off x="5512709" y="3303245"/>
-              <a:ext cx="2118978" cy="646331"/>
+              <a:ext cx="1685141" cy="646331"/>
             </a:xfrm>
             <a:prstGeom prst="rect">
               <a:avLst/>
@@ -4263,7 +4290,21 @@
                   <a:latin typeface="Times New Roman"/>
                   <a:cs typeface="Times New Roman"/>
                 </a:rPr>
-                <a:t>Velocity at (x, y, z, t)</a:t>
+                <a:t>Velocity at (</a:t>
+              </a:r>
+              <a:r>
+                <a:rPr lang="en-US" b="1" dirty="0">
+                  <a:latin typeface="Times New Roman"/>
+                  <a:cs typeface="Times New Roman"/>
+                </a:rPr>
+                <a:t>x</a:t>
+              </a:r>
+              <a:r>
+                <a:rPr lang="en-US" dirty="0">
+                  <a:latin typeface="Times New Roman"/>
+                  <a:cs typeface="Times New Roman"/>
+                </a:rPr>
+                <a:t>, t)</a:t>
               </a:r>
             </a:p>
           </p:txBody>

</xml_diff>

<commit_message>
SRS: Revised according to Summer 2024 meeting feedbacks
</commit_message>
<xml_diff>
--- a/docs/SRS/SystemContextFigure.pptx
+++ b/docs/SRS/SystemContextFigure.pptx
@@ -1,11 +1,14 @@
 
 <file path=ppt/presentation.xml><?xml version="1.0" encoding="utf-8"?>
-<p:presentation xmlns:a="http://schemas.openxmlformats.org/drawingml/2006/main" xmlns:r="http://schemas.openxmlformats.org/officeDocument/2006/relationships" xmlns:p="http://schemas.openxmlformats.org/presentationml/2006/main" saveSubsetFonts="1" autoCompressPictures="0">
+<p:presentation xmlns:a="http://schemas.openxmlformats.org/drawingml/2006/main" xmlns:r="http://schemas.openxmlformats.org/officeDocument/2006/relationships" xmlns:p="http://schemas.openxmlformats.org/presentationml/2006/main" xmlns:m="http://schemas.openxmlformats.org/officeDocument/2006/math" xmlns:w="http://schemas.openxmlformats.org/wordprocessingml/2006/main" autoCompressPictures="0" saveSubsetFonts="1">
   <p:sldMasterIdLst>
     <p:sldMasterId id="2147483648" r:id="rId1"/>
   </p:sldMasterIdLst>
+  <p:notesMasterIdLst>
+    <p:notesMasterId r:id="rId5"/>
+  </p:notesMasterIdLst>
   <p:sldIdLst>
-    <p:sldId id="256" r:id="rId2"/>
+    <p:sldId id="256" r:id="rId4"/>
   </p:sldIdLst>
   <p:sldSz cx="9144000" cy="6858000" type="screen4x3"/>
   <p:notesSz cx="6858000" cy="9144000"/>
@@ -13,8 +16,8 @@
     <a:defPPr>
       <a:defRPr lang="en-US"/>
     </a:defPPr>
-    <a:lvl1pPr marL="0" algn="l" defTabSz="457200" rtl="0" eaLnBrk="1" latinLnBrk="0" hangingPunct="1">
-      <a:defRPr sz="1800" kern="1200">
+    <a:lvl1pPr marL="0" algn="l" defTabSz="457200">
+      <a:defRPr sz="1800">
         <a:solidFill>
           <a:schemeClr val="tx1"/>
         </a:solidFill>
@@ -23,8 +26,8 @@
         <a:cs typeface="+mn-cs"/>
       </a:defRPr>
     </a:lvl1pPr>
-    <a:lvl2pPr marL="457200" algn="l" defTabSz="457200" rtl="0" eaLnBrk="1" latinLnBrk="0" hangingPunct="1">
-      <a:defRPr sz="1800" kern="1200">
+    <a:lvl2pPr marL="457200" algn="l" defTabSz="457200">
+      <a:defRPr sz="1800">
         <a:solidFill>
           <a:schemeClr val="tx1"/>
         </a:solidFill>
@@ -33,8 +36,8 @@
         <a:cs typeface="+mn-cs"/>
       </a:defRPr>
     </a:lvl2pPr>
-    <a:lvl3pPr marL="914400" algn="l" defTabSz="457200" rtl="0" eaLnBrk="1" latinLnBrk="0" hangingPunct="1">
-      <a:defRPr sz="1800" kern="1200">
+    <a:lvl3pPr marL="914400" algn="l" defTabSz="457200">
+      <a:defRPr sz="1800">
         <a:solidFill>
           <a:schemeClr val="tx1"/>
         </a:solidFill>
@@ -43,8 +46,8 @@
         <a:cs typeface="+mn-cs"/>
       </a:defRPr>
     </a:lvl3pPr>
-    <a:lvl4pPr marL="1371600" algn="l" defTabSz="457200" rtl="0" eaLnBrk="1" latinLnBrk="0" hangingPunct="1">
-      <a:defRPr sz="1800" kern="1200">
+    <a:lvl4pPr marL="1371600" algn="l" defTabSz="457200">
+      <a:defRPr sz="1800">
         <a:solidFill>
           <a:schemeClr val="tx1"/>
         </a:solidFill>
@@ -53,8 +56,8 @@
         <a:cs typeface="+mn-cs"/>
       </a:defRPr>
     </a:lvl4pPr>
-    <a:lvl5pPr marL="1828800" algn="l" defTabSz="457200" rtl="0" eaLnBrk="1" latinLnBrk="0" hangingPunct="1">
-      <a:defRPr sz="1800" kern="1200">
+    <a:lvl5pPr marL="1828800" algn="l" defTabSz="457200">
+      <a:defRPr sz="1800">
         <a:solidFill>
           <a:schemeClr val="tx1"/>
         </a:solidFill>
@@ -63,8 +66,8 @@
         <a:cs typeface="+mn-cs"/>
       </a:defRPr>
     </a:lvl5pPr>
-    <a:lvl6pPr marL="2286000" algn="l" defTabSz="457200" rtl="0" eaLnBrk="1" latinLnBrk="0" hangingPunct="1">
-      <a:defRPr sz="1800" kern="1200">
+    <a:lvl6pPr marL="2286000" algn="l" defTabSz="457200">
+      <a:defRPr sz="1800">
         <a:solidFill>
           <a:schemeClr val="tx1"/>
         </a:solidFill>
@@ -73,8 +76,8 @@
         <a:cs typeface="+mn-cs"/>
       </a:defRPr>
     </a:lvl6pPr>
-    <a:lvl7pPr marL="2743200" algn="l" defTabSz="457200" rtl="0" eaLnBrk="1" latinLnBrk="0" hangingPunct="1">
-      <a:defRPr sz="1800" kern="1200">
+    <a:lvl7pPr marL="2743200" algn="l" defTabSz="457200">
+      <a:defRPr sz="1800">
         <a:solidFill>
           <a:schemeClr val="tx1"/>
         </a:solidFill>
@@ -83,8 +86,8 @@
         <a:cs typeface="+mn-cs"/>
       </a:defRPr>
     </a:lvl7pPr>
-    <a:lvl8pPr marL="3200400" algn="l" defTabSz="457200" rtl="0" eaLnBrk="1" latinLnBrk="0" hangingPunct="1">
-      <a:defRPr sz="1800" kern="1200">
+    <a:lvl8pPr marL="3200400" algn="l" defTabSz="457200">
+      <a:defRPr sz="1800">
         <a:solidFill>
           <a:schemeClr val="tx1"/>
         </a:solidFill>
@@ -93,8 +96,8 @@
         <a:cs typeface="+mn-cs"/>
       </a:defRPr>
     </a:lvl8pPr>
-    <a:lvl9pPr marL="3657600" algn="l" defTabSz="457200" rtl="0" eaLnBrk="1" latinLnBrk="0" hangingPunct="1">
-      <a:defRPr sz="1800" kern="1200">
+    <a:lvl9pPr marL="3657600" algn="l" defTabSz="457200">
+      <a:defRPr sz="1800">
         <a:solidFill>
           <a:schemeClr val="tx1"/>
         </a:solidFill>
@@ -104,27 +107,413 @@
       </a:defRPr>
     </a:lvl9pPr>
   </p:defaultTextStyle>
-  <p:extLst>
-    <p:ext uri="{EFAFB233-063F-42B5-8137-9DF3F51BA10A}">
-      <p15:sldGuideLst xmlns:p15="http://schemas.microsoft.com/office/powerpoint/2012/main">
-        <p15:guide id="1" orient="horz" pos="2160">
-          <p15:clr>
-            <a:srgbClr val="A4A3A4"/>
-          </p15:clr>
-        </p15:guide>
-        <p15:guide id="2" pos="2880">
-          <p15:clr>
-            <a:srgbClr val="A4A3A4"/>
-          </p15:clr>
-        </p15:guide>
-      </p15:sldGuideLst>
-    </p:ext>
-  </p:extLst>
 </p:presentation>
 </file>
 
+<file path=ppt/notesMasters/notesMaster1.xml><?xml version="1.0" encoding="utf-8"?>
+<p:notesMaster xmlns:a="http://schemas.openxmlformats.org/drawingml/2006/main" xmlns:r="http://schemas.openxmlformats.org/officeDocument/2006/relationships" xmlns:p="http://schemas.openxmlformats.org/presentationml/2006/main">
+  <p:cSld name="">
+    <p:bg>
+      <p:bgRef idx="1001">
+        <a:schemeClr val="bg1"/>
+      </p:bgRef>
+    </p:bg>
+    <p:spTree>
+      <p:nvGrpSpPr>
+        <p:cNvPr id="1" name=""/>
+        <p:cNvGrpSpPr/>
+        <p:nvPr/>
+      </p:nvGrpSpPr>
+      <p:grpSpPr bwMode="auto">
+        <a:xfrm>
+          <a:off x="0" y="0"/>
+          <a:ext cx="0" cy="0"/>
+          <a:chOff x="0" y="0"/>
+          <a:chExt cx="0" cy="0"/>
+        </a:xfrm>
+      </p:grpSpPr>
+      <p:sp>
+        <p:nvSpPr>
+          <p:cNvPr id="2" name="Header Placeholder 1"/>
+          <p:cNvSpPr>
+            <a:spLocks noGrp="1"/>
+          </p:cNvSpPr>
+          <p:nvPr>
+            <p:ph type="hdr" sz="quarter"/>
+          </p:nvPr>
+        </p:nvSpPr>
+        <p:spPr bwMode="auto">
+          <a:xfrm>
+            <a:off x="0" y="0"/>
+            <a:ext cx="2971800" cy="458788"/>
+          </a:xfrm>
+          <a:prstGeom prst="rect">
+            <a:avLst/>
+          </a:prstGeom>
+        </p:spPr>
+        <p:txBody>
+          <a:bodyPr vert="horz" lIns="91440" tIns="45720" rIns="91440" bIns="45720" rtlCol="0" anchor="ctr"/>
+          <a:lstStyle>
+            <a:lvl1pPr algn="l">
+              <a:defRPr sz="1200"/>
+            </a:lvl1pPr>
+          </a:lstStyle>
+          <a:p>
+            <a:pPr>
+              <a:defRPr/>
+            </a:pPr>
+            <a:endParaRPr/>
+          </a:p>
+        </p:txBody>
+      </p:sp>
+      <p:sp>
+        <p:nvSpPr>
+          <p:cNvPr id="3" name="Date Placeholder 2"/>
+          <p:cNvSpPr>
+            <a:spLocks noGrp="1"/>
+          </p:cNvSpPr>
+          <p:nvPr>
+            <p:ph type="dt" idx="2"/>
+          </p:nvPr>
+        </p:nvSpPr>
+        <p:spPr bwMode="auto">
+          <a:xfrm>
+            <a:off x="3884613" y="0"/>
+            <a:ext cx="2971800" cy="458788"/>
+          </a:xfrm>
+          <a:prstGeom prst="rect">
+            <a:avLst/>
+          </a:prstGeom>
+        </p:spPr>
+        <p:txBody>
+          <a:bodyPr vert="horz" lIns="91440" tIns="45720" rIns="91440" bIns="45720" rtlCol="0" anchor="ctr"/>
+          <a:lstStyle>
+            <a:lvl1pPr algn="r">
+              <a:defRPr sz="1200"/>
+            </a:lvl1pPr>
+          </a:lstStyle>
+          <a:p>
+            <a:pPr>
+              <a:defRPr/>
+            </a:pPr>
+            <a:endParaRPr/>
+          </a:p>
+        </p:txBody>
+      </p:sp>
+      <p:sp>
+        <p:nvSpPr>
+          <p:cNvPr id="3" name="Date Placeholder 2"/>
+          <p:cNvSpPr>
+            <a:spLocks noGrp="1"/>
+          </p:cNvSpPr>
+          <p:nvPr>
+            <p:ph type="dt" idx="3"/>
+          </p:nvPr>
+        </p:nvSpPr>
+        <p:spPr bwMode="auto">
+          <a:xfrm>
+            <a:off x="3884613" y="0"/>
+            <a:ext cx="2971800" cy="458788"/>
+          </a:xfrm>
+          <a:prstGeom prst="rect">
+            <a:avLst/>
+          </a:prstGeom>
+        </p:spPr>
+        <p:txBody>
+          <a:bodyPr vert="horz" lIns="91440" tIns="45720" rIns="91440" bIns="45720" rtlCol="0" anchor="ctr"/>
+          <a:lstStyle>
+            <a:lvl1pPr algn="r">
+              <a:defRPr sz="1200"/>
+            </a:lvl1pPr>
+          </a:lstStyle>
+          <a:p>
+            <a:pPr>
+              <a:defRPr/>
+            </a:pPr>
+            <a:endParaRPr/>
+          </a:p>
+        </p:txBody>
+      </p:sp>
+      <p:sp>
+        <p:nvSpPr>
+          <p:cNvPr id="5" name="Notes Placeholder 4"/>
+          <p:cNvSpPr>
+            <a:spLocks noGrp="1"/>
+          </p:cNvSpPr>
+          <p:nvPr>
+            <p:ph type="body" sz="quarter" idx="1"/>
+          </p:nvPr>
+        </p:nvSpPr>
+        <p:spPr bwMode="auto">
+          <a:xfrm>
+            <a:off x="685800" y="4400550"/>
+            <a:ext cx="5486400" cy="3600450"/>
+          </a:xfrm>
+          <a:prstGeom prst="rect">
+            <a:avLst/>
+          </a:prstGeom>
+        </p:spPr>
+        <p:txBody>
+          <a:bodyPr vert="horz" lIns="91440" tIns="45720" rIns="91440" bIns="45720" rtlCol="0" anchor="ctr"/>
+          <a:lstStyle/>
+          <a:p>
+            <a:pPr>
+              <a:defRPr/>
+            </a:pPr>
+            <a:endParaRPr/>
+          </a:p>
+        </p:txBody>
+      </p:sp>
+      <p:sp>
+        <p:nvSpPr>
+          <p:cNvPr id="6" name="Footer Placeholder 5"/>
+          <p:cNvSpPr>
+            <a:spLocks noGrp="1"/>
+          </p:cNvSpPr>
+          <p:nvPr>
+            <p:ph type="ftr" sz="quarter" idx="4"/>
+          </p:nvPr>
+        </p:nvSpPr>
+        <p:spPr bwMode="auto">
+          <a:xfrm>
+            <a:off x="0" y="8685213"/>
+            <a:ext cx="2971800" cy="458787"/>
+          </a:xfrm>
+          <a:prstGeom prst="rect">
+            <a:avLst/>
+          </a:prstGeom>
+        </p:spPr>
+        <p:txBody>
+          <a:bodyPr vert="horz" lIns="91440" tIns="45720" rIns="91440" bIns="45720" rtlCol="0" anchor="b"/>
+          <a:lstStyle>
+            <a:lvl1pPr algn="l">
+              <a:defRPr sz="1200"/>
+            </a:lvl1pPr>
+          </a:lstStyle>
+          <a:p>
+            <a:pPr>
+              <a:defRPr/>
+            </a:pPr>
+            <a:endParaRPr/>
+          </a:p>
+        </p:txBody>
+      </p:sp>
+      <p:sp>
+        <p:nvSpPr>
+          <p:cNvPr id="7" name="Slide Number Placeholder 6"/>
+          <p:cNvSpPr>
+            <a:spLocks noGrp="1"/>
+          </p:cNvSpPr>
+          <p:nvPr>
+            <p:ph type="sldNum" sz="quarter" idx="10"/>
+          </p:nvPr>
+        </p:nvSpPr>
+        <p:spPr bwMode="auto">
+          <a:xfrm>
+            <a:off x="3884613" y="8685213"/>
+            <a:ext cx="2971800" cy="458787"/>
+          </a:xfrm>
+          <a:prstGeom prst="rect">
+            <a:avLst/>
+          </a:prstGeom>
+        </p:spPr>
+        <p:txBody>
+          <a:bodyPr vert="horz" lIns="91440" tIns="45720" rIns="91440" bIns="45720" rtlCol="0" anchor="b"/>
+          <a:lstStyle>
+            <a:lvl1pPr algn="r">
+              <a:defRPr sz="1200"/>
+            </a:lvl1pPr>
+          </a:lstStyle>
+          <a:p>
+            <a:pPr>
+              <a:defRPr/>
+            </a:pPr>
+            <a:endParaRPr/>
+          </a:p>
+        </p:txBody>
+      </p:sp>
+    </p:spTree>
+  </p:cSld>
+  <p:clrMap bg1="lt1" tx1="dk1" bg2="lt2" tx2="dk2" accent1="accent1" accent2="accent2" accent3="accent3" accent4="accent4" accent5="accent5" accent6="accent6" hlink="hlink" folHlink="folHlink"/>
+  <p:notesStyle>
+    <a:lvl1pPr marL="0" algn="l" defTabSz="914400">
+      <a:defRPr sz="1200">
+        <a:solidFill>
+          <a:schemeClr val="tx1"/>
+        </a:solidFill>
+        <a:latin typeface="+mn-lt"/>
+        <a:ea typeface="+mn-ea"/>
+        <a:cs typeface="+mn-cs"/>
+      </a:defRPr>
+    </a:lvl1pPr>
+    <a:lvl2pPr marL="457200" algn="l" defTabSz="914400">
+      <a:defRPr sz="1200">
+        <a:solidFill>
+          <a:schemeClr val="tx1"/>
+        </a:solidFill>
+        <a:latin typeface="+mn-lt"/>
+        <a:ea typeface="+mn-ea"/>
+        <a:cs typeface="+mn-cs"/>
+      </a:defRPr>
+    </a:lvl2pPr>
+    <a:lvl3pPr marL="914400" algn="l" defTabSz="914400">
+      <a:defRPr sz="1200">
+        <a:solidFill>
+          <a:schemeClr val="tx1"/>
+        </a:solidFill>
+        <a:latin typeface="+mn-lt"/>
+        <a:ea typeface="+mn-ea"/>
+        <a:cs typeface="+mn-cs"/>
+      </a:defRPr>
+    </a:lvl3pPr>
+    <a:lvl4pPr marL="1371600" algn="l" defTabSz="914400">
+      <a:defRPr sz="1200">
+        <a:solidFill>
+          <a:schemeClr val="tx1"/>
+        </a:solidFill>
+        <a:latin typeface="+mn-lt"/>
+        <a:ea typeface="+mn-ea"/>
+        <a:cs typeface="+mn-cs"/>
+      </a:defRPr>
+    </a:lvl4pPr>
+    <a:lvl5pPr marL="1828800" algn="l" defTabSz="914400">
+      <a:defRPr sz="1200">
+        <a:solidFill>
+          <a:schemeClr val="tx1"/>
+        </a:solidFill>
+        <a:latin typeface="+mn-lt"/>
+        <a:ea typeface="+mn-ea"/>
+        <a:cs typeface="+mn-cs"/>
+      </a:defRPr>
+    </a:lvl5pPr>
+    <a:lvl6pPr marL="2286000" algn="l" defTabSz="914400">
+      <a:defRPr sz="1200">
+        <a:solidFill>
+          <a:schemeClr val="tx1"/>
+        </a:solidFill>
+        <a:latin typeface="+mn-lt"/>
+        <a:ea typeface="+mn-ea"/>
+        <a:cs typeface="+mn-cs"/>
+      </a:defRPr>
+    </a:lvl6pPr>
+    <a:lvl7pPr marL="2743200" algn="l" defTabSz="914400">
+      <a:defRPr sz="1200">
+        <a:solidFill>
+          <a:schemeClr val="tx1"/>
+        </a:solidFill>
+        <a:latin typeface="+mn-lt"/>
+        <a:ea typeface="+mn-ea"/>
+        <a:cs typeface="+mn-cs"/>
+      </a:defRPr>
+    </a:lvl7pPr>
+    <a:lvl8pPr marL="3200400" algn="l" defTabSz="914400">
+      <a:defRPr sz="1200">
+        <a:solidFill>
+          <a:schemeClr val="tx1"/>
+        </a:solidFill>
+        <a:latin typeface="+mn-lt"/>
+        <a:ea typeface="+mn-ea"/>
+        <a:cs typeface="+mn-cs"/>
+      </a:defRPr>
+    </a:lvl8pPr>
+    <a:lvl9pPr marL="3657600" algn="l" defTabSz="914400">
+      <a:defRPr sz="1200">
+        <a:solidFill>
+          <a:schemeClr val="tx1"/>
+        </a:solidFill>
+        <a:latin typeface="+mn-lt"/>
+        <a:ea typeface="+mn-ea"/>
+        <a:cs typeface="+mn-cs"/>
+      </a:defRPr>
+    </a:lvl9pPr>
+  </p:notesStyle>
+</p:notesMaster>
+</file>
+
+<file path=ppt/notesSlides/notesSlide1.xml><?xml version="1.0" encoding="utf-8"?>
+<p:notes xmlns:a="http://schemas.openxmlformats.org/drawingml/2006/main" xmlns:r="http://schemas.openxmlformats.org/officeDocument/2006/relationships" xmlns:p="http://schemas.openxmlformats.org/presentationml/2006/main" xmlns:m="http://schemas.openxmlformats.org/officeDocument/2006/math" xmlns:w="http://schemas.openxmlformats.org/wordprocessingml/2006/main">
+  <p:cSld name="">
+    <p:spTree>
+      <p:nvGrpSpPr>
+        <p:cNvPr id="1" name=""/>
+        <p:cNvGrpSpPr/>
+        <p:nvPr/>
+      </p:nvGrpSpPr>
+      <p:grpSpPr bwMode="auto">
+        <a:xfrm>
+          <a:off x="0" y="0"/>
+          <a:ext cx="0" cy="0"/>
+          <a:chOff x="0" y="0"/>
+          <a:chExt cx="0" cy="0"/>
+        </a:xfrm>
+      </p:grpSpPr>
+      <p:sp>
+        <p:nvSpPr>
+          <p:cNvPr id="2" name="Slide Image Placeholder 1"/>
+          <p:cNvSpPr>
+            <a:spLocks noChangeAspect="1" noGrp="1" noRot="1"/>
+          </p:cNvSpPr>
+          <p:nvPr>
+            <p:ph type="sldImg"/>
+          </p:nvPr>
+        </p:nvSpPr>
+        <p:spPr bwMode="auto"/>
+      </p:sp>
+      <p:sp>
+        <p:nvSpPr>
+          <p:cNvPr id="3" name="Notes Placeholder 2"/>
+          <p:cNvSpPr>
+            <a:spLocks noGrp="1"/>
+          </p:cNvSpPr>
+          <p:nvPr>
+            <p:ph type="body" idx="1"/>
+          </p:nvPr>
+        </p:nvSpPr>
+        <p:spPr bwMode="auto"/>
+        <p:txBody>
+          <a:bodyPr/>
+          <a:lstStyle/>
+          <a:p>
+            <a:pPr>
+              <a:defRPr/>
+            </a:pPr>
+            <a:endParaRPr/>
+          </a:p>
+        </p:txBody>
+      </p:sp>
+      <p:sp>
+        <p:nvSpPr>
+          <p:cNvPr id="4" name="Slide Number Placeholder 3"/>
+          <p:cNvSpPr>
+            <a:spLocks noGrp="1"/>
+          </p:cNvSpPr>
+          <p:nvPr>
+            <p:ph type="sldNum" sz="quarter" idx="10"/>
+          </p:nvPr>
+        </p:nvSpPr>
+        <p:spPr bwMode="auto"/>
+        <p:txBody>
+          <a:bodyPr/>
+          <a:lstStyle/>
+          <a:p>
+            <a:pPr>
+              <a:defRPr/>
+            </a:pPr>
+            <a:fld id="{C21C848C-1C84-AE23-C1DE-7576F60A322B}" type="slidenum">
+              <a:rPr/>
+              <a:t/>
+            </a:fld>
+            <a:endParaRPr/>
+          </a:p>
+        </p:txBody>
+      </p:sp>
+    </p:spTree>
+  </p:cSld>
+</p:notes>
+</file>
+
 <file path=ppt/slideLayouts/slideLayout1.xml><?xml version="1.0" encoding="utf-8"?>
-<p:sldLayout xmlns:a="http://schemas.openxmlformats.org/drawingml/2006/main" xmlns:r="http://schemas.openxmlformats.org/officeDocument/2006/relationships" xmlns:p="http://schemas.openxmlformats.org/presentationml/2006/main" type="title" preserve="1">
+<p:sldLayout xmlns:a="http://schemas.openxmlformats.org/drawingml/2006/main" xmlns:r="http://schemas.openxmlformats.org/officeDocument/2006/relationships" xmlns:p="http://schemas.openxmlformats.org/presentationml/2006/main" xmlns:m="http://schemas.openxmlformats.org/officeDocument/2006/math" xmlns:w="http://schemas.openxmlformats.org/wordprocessingml/2006/main" matchingName="" preserve="1" showMasterPhAnim="0" type="title" userDrawn="1">
   <p:cSld name="Title Slide">
     <p:spTree>
       <p:nvGrpSpPr>
@@ -132,7 +521,7 @@
         <p:cNvGrpSpPr/>
         <p:nvPr/>
       </p:nvGrpSpPr>
-      <p:grpSpPr>
+      <p:grpSpPr bwMode="auto">
         <a:xfrm>
           <a:off x="0" y="0"/>
           <a:ext cx="0" cy="0"/>
@@ -150,7 +539,7 @@
             <p:ph type="ctrTitle"/>
           </p:nvPr>
         </p:nvSpPr>
-        <p:spPr>
+        <p:spPr bwMode="auto">
           <a:xfrm>
             <a:off x="685800" y="2130425"/>
             <a:ext cx="7772400" cy="1470025"/>
@@ -160,6 +549,9 @@
           <a:bodyPr/>
           <a:lstStyle/>
           <a:p>
+            <a:pPr>
+              <a:defRPr/>
+            </a:pPr>
             <a:r>
               <a:rPr lang="en-CA"/>
               <a:t>Click to edit Master title style</a:t>
@@ -178,10 +570,10 @@
             <p:ph type="subTitle" idx="1"/>
           </p:nvPr>
         </p:nvSpPr>
-        <p:spPr>
+        <p:spPr bwMode="auto">
           <a:xfrm>
             <a:off x="1371600" y="3886200"/>
-            <a:ext cx="6400800" cy="1752600"/>
+            <a:ext cx="6400800" cy="1752599"/>
           </a:xfrm>
         </p:spPr>
         <p:txBody>
@@ -279,6 +671,9 @@
             </a:lvl9pPr>
           </a:lstStyle>
           <a:p>
+            <a:pPr>
+              <a:defRPr/>
+            </a:pPr>
             <a:r>
               <a:rPr lang="en-CA"/>
               <a:t>Click to edit Master subtitle style</a:t>
@@ -297,13 +692,16 @@
             <p:ph type="dt" sz="half" idx="10"/>
           </p:nvPr>
         </p:nvSpPr>
-        <p:spPr/>
+        <p:spPr bwMode="auto"/>
         <p:txBody>
           <a:bodyPr/>
           <a:lstStyle/>
           <a:p>
+            <a:pPr>
+              <a:defRPr/>
+            </a:pPr>
             <a:fld id="{779256A2-DE0C-7447-B687-786F38514E8C}" type="datetimeFigureOut">
-              <a:rPr lang="en-US" smtClean="0"/>
+              <a:rPr lang="en-US"/>
               <a:t>3/21/2024</a:t>
             </a:fld>
             <a:endParaRPr lang="en-US"/>
@@ -320,11 +718,14 @@
             <p:ph type="ftr" sz="quarter" idx="11"/>
           </p:nvPr>
         </p:nvSpPr>
-        <p:spPr/>
+        <p:spPr bwMode="auto"/>
         <p:txBody>
           <a:bodyPr/>
           <a:lstStyle/>
           <a:p>
+            <a:pPr>
+              <a:defRPr/>
+            </a:pPr>
             <a:endParaRPr lang="en-US"/>
           </a:p>
         </p:txBody>
@@ -339,13 +740,16 @@
             <p:ph type="sldNum" sz="quarter" idx="12"/>
           </p:nvPr>
         </p:nvSpPr>
-        <p:spPr/>
+        <p:spPr bwMode="auto"/>
         <p:txBody>
           <a:bodyPr/>
           <a:lstStyle/>
           <a:p>
+            <a:pPr>
+              <a:defRPr/>
+            </a:pPr>
             <a:fld id="{D1E6B054-2327-D043-B7B5-4043E46ED170}" type="slidenum">
-              <a:rPr lang="en-US" smtClean="0"/>
+              <a:rPr lang="en-US"/>
               <a:t>‹#›</a:t>
             </a:fld>
             <a:endParaRPr lang="en-US"/>
@@ -353,11 +757,6 @@
         </p:txBody>
       </p:sp>
     </p:spTree>
-    <p:extLst>
-      <p:ext uri="{BB962C8B-B14F-4D97-AF65-F5344CB8AC3E}">
-        <p14:creationId xmlns:p14="http://schemas.microsoft.com/office/powerpoint/2010/main" val="3361452229"/>
-      </p:ext>
-    </p:extLst>
   </p:cSld>
   <p:clrMapOvr>
     <a:masterClrMapping/>
@@ -366,7 +765,7 @@
 </file>
 
 <file path=ppt/slideLayouts/slideLayout10.xml><?xml version="1.0" encoding="utf-8"?>
-<p:sldLayout xmlns:a="http://schemas.openxmlformats.org/drawingml/2006/main" xmlns:r="http://schemas.openxmlformats.org/officeDocument/2006/relationships" xmlns:p="http://schemas.openxmlformats.org/presentationml/2006/main" type="vertTx" preserve="1">
+<p:sldLayout xmlns:a="http://schemas.openxmlformats.org/drawingml/2006/main" xmlns:r="http://schemas.openxmlformats.org/officeDocument/2006/relationships" xmlns:p="http://schemas.openxmlformats.org/presentationml/2006/main" xmlns:m="http://schemas.openxmlformats.org/officeDocument/2006/math" xmlns:w="http://schemas.openxmlformats.org/wordprocessingml/2006/main" matchingName="" preserve="1" showMasterPhAnim="0" type="vertTx" userDrawn="1">
   <p:cSld name="Title and Vertical Text">
     <p:spTree>
       <p:nvGrpSpPr>
@@ -374,7 +773,7 @@
         <p:cNvGrpSpPr/>
         <p:nvPr/>
       </p:nvGrpSpPr>
-      <p:grpSpPr>
+      <p:grpSpPr bwMode="auto">
         <a:xfrm>
           <a:off x="0" y="0"/>
           <a:ext cx="0" cy="0"/>
@@ -392,11 +791,14 @@
             <p:ph type="title"/>
           </p:nvPr>
         </p:nvSpPr>
-        <p:spPr/>
+        <p:spPr bwMode="auto"/>
         <p:txBody>
           <a:bodyPr/>
           <a:lstStyle/>
           <a:p>
+            <a:pPr>
+              <a:defRPr/>
+            </a:pPr>
             <a:r>
               <a:rPr lang="en-CA"/>
               <a:t>Click to edit Master title style</a:t>
@@ -415,40 +817,54 @@
             <p:ph type="body" orient="vert" idx="1"/>
           </p:nvPr>
         </p:nvSpPr>
-        <p:spPr/>
+        <p:spPr bwMode="auto"/>
         <p:txBody>
           <a:bodyPr vert="eaVert"/>
           <a:lstStyle/>
           <a:p>
-            <a:pPr lvl="0"/>
+            <a:pPr lvl="0">
+              <a:defRPr/>
+            </a:pPr>
             <a:r>
               <a:rPr lang="en-CA"/>
               <a:t>Click to edit Master text styles</a:t>
             </a:r>
-          </a:p>
-          <a:p>
-            <a:pPr lvl="1"/>
+            <a:endParaRPr/>
+          </a:p>
+          <a:p>
+            <a:pPr lvl="1">
+              <a:defRPr/>
+            </a:pPr>
             <a:r>
               <a:rPr lang="en-CA"/>
               <a:t>Second level</a:t>
             </a:r>
-          </a:p>
-          <a:p>
-            <a:pPr lvl="2"/>
+            <a:endParaRPr/>
+          </a:p>
+          <a:p>
+            <a:pPr lvl="2">
+              <a:defRPr/>
+            </a:pPr>
             <a:r>
               <a:rPr lang="en-CA"/>
               <a:t>Third level</a:t>
             </a:r>
-          </a:p>
-          <a:p>
-            <a:pPr lvl="3"/>
+            <a:endParaRPr/>
+          </a:p>
+          <a:p>
+            <a:pPr lvl="3">
+              <a:defRPr/>
+            </a:pPr>
             <a:r>
               <a:rPr lang="en-CA"/>
               <a:t>Fourth level</a:t>
             </a:r>
-          </a:p>
-          <a:p>
-            <a:pPr lvl="4"/>
+            <a:endParaRPr/>
+          </a:p>
+          <a:p>
+            <a:pPr lvl="4">
+              <a:defRPr/>
+            </a:pPr>
             <a:r>
               <a:rPr lang="en-CA"/>
               <a:t>Fifth level</a:t>
@@ -467,13 +883,16 @@
             <p:ph type="dt" sz="half" idx="10"/>
           </p:nvPr>
         </p:nvSpPr>
-        <p:spPr/>
+        <p:spPr bwMode="auto"/>
         <p:txBody>
           <a:bodyPr/>
           <a:lstStyle/>
           <a:p>
+            <a:pPr>
+              <a:defRPr/>
+            </a:pPr>
             <a:fld id="{779256A2-DE0C-7447-B687-786F38514E8C}" type="datetimeFigureOut">
-              <a:rPr lang="en-US" smtClean="0"/>
+              <a:rPr lang="en-US"/>
               <a:t>3/21/2024</a:t>
             </a:fld>
             <a:endParaRPr lang="en-US"/>
@@ -490,11 +909,14 @@
             <p:ph type="ftr" sz="quarter" idx="11"/>
           </p:nvPr>
         </p:nvSpPr>
-        <p:spPr/>
+        <p:spPr bwMode="auto"/>
         <p:txBody>
           <a:bodyPr/>
           <a:lstStyle/>
           <a:p>
+            <a:pPr>
+              <a:defRPr/>
+            </a:pPr>
             <a:endParaRPr lang="en-US"/>
           </a:p>
         </p:txBody>
@@ -509,13 +931,16 @@
             <p:ph type="sldNum" sz="quarter" idx="12"/>
           </p:nvPr>
         </p:nvSpPr>
-        <p:spPr/>
+        <p:spPr bwMode="auto"/>
         <p:txBody>
           <a:bodyPr/>
           <a:lstStyle/>
           <a:p>
+            <a:pPr>
+              <a:defRPr/>
+            </a:pPr>
             <a:fld id="{D1E6B054-2327-D043-B7B5-4043E46ED170}" type="slidenum">
-              <a:rPr lang="en-US" smtClean="0"/>
+              <a:rPr lang="en-US"/>
               <a:t>‹#›</a:t>
             </a:fld>
             <a:endParaRPr lang="en-US"/>
@@ -523,11 +948,6 @@
         </p:txBody>
       </p:sp>
     </p:spTree>
-    <p:extLst>
-      <p:ext uri="{BB962C8B-B14F-4D97-AF65-F5344CB8AC3E}">
-        <p14:creationId xmlns:p14="http://schemas.microsoft.com/office/powerpoint/2010/main" val="1470153226"/>
-      </p:ext>
-    </p:extLst>
   </p:cSld>
   <p:clrMapOvr>
     <a:masterClrMapping/>
@@ -536,7 +956,7 @@
 </file>
 
 <file path=ppt/slideLayouts/slideLayout11.xml><?xml version="1.0" encoding="utf-8"?>
-<p:sldLayout xmlns:a="http://schemas.openxmlformats.org/drawingml/2006/main" xmlns:r="http://schemas.openxmlformats.org/officeDocument/2006/relationships" xmlns:p="http://schemas.openxmlformats.org/presentationml/2006/main" type="vertTitleAndTx" preserve="1">
+<p:sldLayout xmlns:a="http://schemas.openxmlformats.org/drawingml/2006/main" xmlns:r="http://schemas.openxmlformats.org/officeDocument/2006/relationships" xmlns:p="http://schemas.openxmlformats.org/presentationml/2006/main" xmlns:m="http://schemas.openxmlformats.org/officeDocument/2006/math" xmlns:w="http://schemas.openxmlformats.org/wordprocessingml/2006/main" matchingName="" preserve="1" showMasterPhAnim="0" type="vertTitleAndTx" userDrawn="1">
   <p:cSld name="Vertical Title and Text">
     <p:spTree>
       <p:nvGrpSpPr>
@@ -544,7 +964,7 @@
         <p:cNvGrpSpPr/>
         <p:nvPr/>
       </p:nvGrpSpPr>
-      <p:grpSpPr>
+      <p:grpSpPr bwMode="auto">
         <a:xfrm>
           <a:off x="0" y="0"/>
           <a:ext cx="0" cy="0"/>
@@ -562,7 +982,7 @@
             <p:ph type="title" orient="vert"/>
           </p:nvPr>
         </p:nvSpPr>
-        <p:spPr>
+        <p:spPr bwMode="auto">
           <a:xfrm>
             <a:off x="6629400" y="274638"/>
             <a:ext cx="2057400" cy="5851525"/>
@@ -572,6 +992,9 @@
           <a:bodyPr vert="eaVert"/>
           <a:lstStyle/>
           <a:p>
+            <a:pPr>
+              <a:defRPr/>
+            </a:pPr>
             <a:r>
               <a:rPr lang="en-CA"/>
               <a:t>Click to edit Master title style</a:t>
@@ -590,7 +1013,7 @@
             <p:ph type="body" orient="vert" idx="1"/>
           </p:nvPr>
         </p:nvSpPr>
-        <p:spPr>
+        <p:spPr bwMode="auto">
           <a:xfrm>
             <a:off x="457200" y="274638"/>
             <a:ext cx="6019800" cy="5851525"/>
@@ -600,35 +1023,49 @@
           <a:bodyPr vert="eaVert"/>
           <a:lstStyle/>
           <a:p>
-            <a:pPr lvl="0"/>
+            <a:pPr lvl="0">
+              <a:defRPr/>
+            </a:pPr>
             <a:r>
               <a:rPr lang="en-CA"/>
               <a:t>Click to edit Master text styles</a:t>
             </a:r>
-          </a:p>
-          <a:p>
-            <a:pPr lvl="1"/>
+            <a:endParaRPr/>
+          </a:p>
+          <a:p>
+            <a:pPr lvl="1">
+              <a:defRPr/>
+            </a:pPr>
             <a:r>
               <a:rPr lang="en-CA"/>
               <a:t>Second level</a:t>
             </a:r>
-          </a:p>
-          <a:p>
-            <a:pPr lvl="2"/>
+            <a:endParaRPr/>
+          </a:p>
+          <a:p>
+            <a:pPr lvl="2">
+              <a:defRPr/>
+            </a:pPr>
             <a:r>
               <a:rPr lang="en-CA"/>
               <a:t>Third level</a:t>
             </a:r>
-          </a:p>
-          <a:p>
-            <a:pPr lvl="3"/>
+            <a:endParaRPr/>
+          </a:p>
+          <a:p>
+            <a:pPr lvl="3">
+              <a:defRPr/>
+            </a:pPr>
             <a:r>
               <a:rPr lang="en-CA"/>
               <a:t>Fourth level</a:t>
             </a:r>
-          </a:p>
-          <a:p>
-            <a:pPr lvl="4"/>
+            <a:endParaRPr/>
+          </a:p>
+          <a:p>
+            <a:pPr lvl="4">
+              <a:defRPr/>
+            </a:pPr>
             <a:r>
               <a:rPr lang="en-CA"/>
               <a:t>Fifth level</a:t>
@@ -647,13 +1084,16 @@
             <p:ph type="dt" sz="half" idx="10"/>
           </p:nvPr>
         </p:nvSpPr>
-        <p:spPr/>
+        <p:spPr bwMode="auto"/>
         <p:txBody>
           <a:bodyPr/>
           <a:lstStyle/>
           <a:p>
+            <a:pPr>
+              <a:defRPr/>
+            </a:pPr>
             <a:fld id="{779256A2-DE0C-7447-B687-786F38514E8C}" type="datetimeFigureOut">
-              <a:rPr lang="en-US" smtClean="0"/>
+              <a:rPr lang="en-US"/>
               <a:t>3/21/2024</a:t>
             </a:fld>
             <a:endParaRPr lang="en-US"/>
@@ -670,11 +1110,14 @@
             <p:ph type="ftr" sz="quarter" idx="11"/>
           </p:nvPr>
         </p:nvSpPr>
-        <p:spPr/>
+        <p:spPr bwMode="auto"/>
         <p:txBody>
           <a:bodyPr/>
           <a:lstStyle/>
           <a:p>
+            <a:pPr>
+              <a:defRPr/>
+            </a:pPr>
             <a:endParaRPr lang="en-US"/>
           </a:p>
         </p:txBody>
@@ -689,13 +1132,16 @@
             <p:ph type="sldNum" sz="quarter" idx="12"/>
           </p:nvPr>
         </p:nvSpPr>
-        <p:spPr/>
+        <p:spPr bwMode="auto"/>
         <p:txBody>
           <a:bodyPr/>
           <a:lstStyle/>
           <a:p>
+            <a:pPr>
+              <a:defRPr/>
+            </a:pPr>
             <a:fld id="{D1E6B054-2327-D043-B7B5-4043E46ED170}" type="slidenum">
-              <a:rPr lang="en-US" smtClean="0"/>
+              <a:rPr lang="en-US"/>
               <a:t>‹#›</a:t>
             </a:fld>
             <a:endParaRPr lang="en-US"/>
@@ -703,11 +1149,6 @@
         </p:txBody>
       </p:sp>
     </p:spTree>
-    <p:extLst>
-      <p:ext uri="{BB962C8B-B14F-4D97-AF65-F5344CB8AC3E}">
-        <p14:creationId xmlns:p14="http://schemas.microsoft.com/office/powerpoint/2010/main" val="2425975206"/>
-      </p:ext>
-    </p:extLst>
   </p:cSld>
   <p:clrMapOvr>
     <a:masterClrMapping/>
@@ -716,7 +1157,7 @@
 </file>
 
 <file path=ppt/slideLayouts/slideLayout2.xml><?xml version="1.0" encoding="utf-8"?>
-<p:sldLayout xmlns:a="http://schemas.openxmlformats.org/drawingml/2006/main" xmlns:r="http://schemas.openxmlformats.org/officeDocument/2006/relationships" xmlns:p="http://schemas.openxmlformats.org/presentationml/2006/main" type="obj" preserve="1">
+<p:sldLayout xmlns:a="http://schemas.openxmlformats.org/drawingml/2006/main" xmlns:r="http://schemas.openxmlformats.org/officeDocument/2006/relationships" xmlns:p="http://schemas.openxmlformats.org/presentationml/2006/main" xmlns:m="http://schemas.openxmlformats.org/officeDocument/2006/math" xmlns:w="http://schemas.openxmlformats.org/wordprocessingml/2006/main" matchingName="" preserve="1" showMasterPhAnim="0" type="obj" userDrawn="1">
   <p:cSld name="Title and Content">
     <p:spTree>
       <p:nvGrpSpPr>
@@ -724,7 +1165,7 @@
         <p:cNvGrpSpPr/>
         <p:nvPr/>
       </p:nvGrpSpPr>
-      <p:grpSpPr>
+      <p:grpSpPr bwMode="auto">
         <a:xfrm>
           <a:off x="0" y="0"/>
           <a:ext cx="0" cy="0"/>
@@ -742,11 +1183,14 @@
             <p:ph type="title"/>
           </p:nvPr>
         </p:nvSpPr>
-        <p:spPr/>
+        <p:spPr bwMode="auto"/>
         <p:txBody>
           <a:bodyPr/>
           <a:lstStyle/>
           <a:p>
+            <a:pPr>
+              <a:defRPr/>
+            </a:pPr>
             <a:r>
               <a:rPr lang="en-CA"/>
               <a:t>Click to edit Master title style</a:t>
@@ -765,40 +1209,54 @@
             <p:ph idx="1"/>
           </p:nvPr>
         </p:nvSpPr>
-        <p:spPr/>
+        <p:spPr bwMode="auto"/>
         <p:txBody>
           <a:bodyPr/>
           <a:lstStyle/>
           <a:p>
-            <a:pPr lvl="0"/>
+            <a:pPr lvl="0">
+              <a:defRPr/>
+            </a:pPr>
             <a:r>
               <a:rPr lang="en-CA"/>
               <a:t>Click to edit Master text styles</a:t>
             </a:r>
-          </a:p>
-          <a:p>
-            <a:pPr lvl="1"/>
+            <a:endParaRPr/>
+          </a:p>
+          <a:p>
+            <a:pPr lvl="1">
+              <a:defRPr/>
+            </a:pPr>
             <a:r>
               <a:rPr lang="en-CA"/>
               <a:t>Second level</a:t>
             </a:r>
-          </a:p>
-          <a:p>
-            <a:pPr lvl="2"/>
+            <a:endParaRPr/>
+          </a:p>
+          <a:p>
+            <a:pPr lvl="2">
+              <a:defRPr/>
+            </a:pPr>
             <a:r>
               <a:rPr lang="en-CA"/>
               <a:t>Third level</a:t>
             </a:r>
-          </a:p>
-          <a:p>
-            <a:pPr lvl="3"/>
+            <a:endParaRPr/>
+          </a:p>
+          <a:p>
+            <a:pPr lvl="3">
+              <a:defRPr/>
+            </a:pPr>
             <a:r>
               <a:rPr lang="en-CA"/>
               <a:t>Fourth level</a:t>
             </a:r>
-          </a:p>
-          <a:p>
-            <a:pPr lvl="4"/>
+            <a:endParaRPr/>
+          </a:p>
+          <a:p>
+            <a:pPr lvl="4">
+              <a:defRPr/>
+            </a:pPr>
             <a:r>
               <a:rPr lang="en-CA"/>
               <a:t>Fifth level</a:t>
@@ -817,13 +1275,16 @@
             <p:ph type="dt" sz="half" idx="10"/>
           </p:nvPr>
         </p:nvSpPr>
-        <p:spPr/>
+        <p:spPr bwMode="auto"/>
         <p:txBody>
           <a:bodyPr/>
           <a:lstStyle/>
           <a:p>
+            <a:pPr>
+              <a:defRPr/>
+            </a:pPr>
             <a:fld id="{779256A2-DE0C-7447-B687-786F38514E8C}" type="datetimeFigureOut">
-              <a:rPr lang="en-US" smtClean="0"/>
+              <a:rPr lang="en-US"/>
               <a:t>3/21/2024</a:t>
             </a:fld>
             <a:endParaRPr lang="en-US"/>
@@ -840,11 +1301,14 @@
             <p:ph type="ftr" sz="quarter" idx="11"/>
           </p:nvPr>
         </p:nvSpPr>
-        <p:spPr/>
+        <p:spPr bwMode="auto"/>
         <p:txBody>
           <a:bodyPr/>
           <a:lstStyle/>
           <a:p>
+            <a:pPr>
+              <a:defRPr/>
+            </a:pPr>
             <a:endParaRPr lang="en-US"/>
           </a:p>
         </p:txBody>
@@ -859,13 +1323,16 @@
             <p:ph type="sldNum" sz="quarter" idx="12"/>
           </p:nvPr>
         </p:nvSpPr>
-        <p:spPr/>
+        <p:spPr bwMode="auto"/>
         <p:txBody>
           <a:bodyPr/>
           <a:lstStyle/>
           <a:p>
+            <a:pPr>
+              <a:defRPr/>
+            </a:pPr>
             <a:fld id="{D1E6B054-2327-D043-B7B5-4043E46ED170}" type="slidenum">
-              <a:rPr lang="en-US" smtClean="0"/>
+              <a:rPr lang="en-US"/>
               <a:t>‹#›</a:t>
             </a:fld>
             <a:endParaRPr lang="en-US"/>
@@ -873,11 +1340,6 @@
         </p:txBody>
       </p:sp>
     </p:spTree>
-    <p:extLst>
-      <p:ext uri="{BB962C8B-B14F-4D97-AF65-F5344CB8AC3E}">
-        <p14:creationId xmlns:p14="http://schemas.microsoft.com/office/powerpoint/2010/main" val="2309045098"/>
-      </p:ext>
-    </p:extLst>
   </p:cSld>
   <p:clrMapOvr>
     <a:masterClrMapping/>
@@ -886,7 +1348,7 @@
 </file>
 
 <file path=ppt/slideLayouts/slideLayout3.xml><?xml version="1.0" encoding="utf-8"?>
-<p:sldLayout xmlns:a="http://schemas.openxmlformats.org/drawingml/2006/main" xmlns:r="http://schemas.openxmlformats.org/officeDocument/2006/relationships" xmlns:p="http://schemas.openxmlformats.org/presentationml/2006/main" type="secHead" preserve="1">
+<p:sldLayout xmlns:a="http://schemas.openxmlformats.org/drawingml/2006/main" xmlns:r="http://schemas.openxmlformats.org/officeDocument/2006/relationships" xmlns:p="http://schemas.openxmlformats.org/presentationml/2006/main" xmlns:m="http://schemas.openxmlformats.org/officeDocument/2006/math" xmlns:w="http://schemas.openxmlformats.org/wordprocessingml/2006/main" matchingName="" preserve="1" showMasterPhAnim="0" type="secHead" userDrawn="1">
   <p:cSld name="Section Header">
     <p:spTree>
       <p:nvGrpSpPr>
@@ -894,7 +1356,7 @@
         <p:cNvGrpSpPr/>
         <p:nvPr/>
       </p:nvGrpSpPr>
-      <p:grpSpPr>
+      <p:grpSpPr bwMode="auto">
         <a:xfrm>
           <a:off x="0" y="0"/>
           <a:ext cx="0" cy="0"/>
@@ -912,7 +1374,7 @@
             <p:ph type="title"/>
           </p:nvPr>
         </p:nvSpPr>
-        <p:spPr>
+        <p:spPr bwMode="auto">
           <a:xfrm>
             <a:off x="722313" y="4406900"/>
             <a:ext cx="7772400" cy="1362075"/>
@@ -926,6 +1388,9 @@
             </a:lvl1pPr>
           </a:lstStyle>
           <a:p>
+            <a:pPr>
+              <a:defRPr/>
+            </a:pPr>
             <a:r>
               <a:rPr lang="en-CA"/>
               <a:t>Click to edit Master title style</a:t>
@@ -944,7 +1409,7 @@
             <p:ph type="body" idx="1"/>
           </p:nvPr>
         </p:nvSpPr>
-        <p:spPr>
+        <p:spPr bwMode="auto">
           <a:xfrm>
             <a:off x="722313" y="2906713"/>
             <a:ext cx="7772400" cy="1500187"/>
@@ -1045,11 +1510,14 @@
             </a:lvl9pPr>
           </a:lstStyle>
           <a:p>
-            <a:pPr lvl="0"/>
+            <a:pPr lvl="0">
+              <a:defRPr/>
+            </a:pPr>
             <a:r>
               <a:rPr lang="en-CA"/>
               <a:t>Click to edit Master text styles</a:t>
             </a:r>
+            <a:endParaRPr/>
           </a:p>
         </p:txBody>
       </p:sp>
@@ -1063,13 +1531,16 @@
             <p:ph type="dt" sz="half" idx="10"/>
           </p:nvPr>
         </p:nvSpPr>
-        <p:spPr/>
+        <p:spPr bwMode="auto"/>
         <p:txBody>
           <a:bodyPr/>
           <a:lstStyle/>
           <a:p>
+            <a:pPr>
+              <a:defRPr/>
+            </a:pPr>
             <a:fld id="{779256A2-DE0C-7447-B687-786F38514E8C}" type="datetimeFigureOut">
-              <a:rPr lang="en-US" smtClean="0"/>
+              <a:rPr lang="en-US"/>
               <a:t>3/21/2024</a:t>
             </a:fld>
             <a:endParaRPr lang="en-US"/>
@@ -1086,11 +1557,14 @@
             <p:ph type="ftr" sz="quarter" idx="11"/>
           </p:nvPr>
         </p:nvSpPr>
-        <p:spPr/>
+        <p:spPr bwMode="auto"/>
         <p:txBody>
           <a:bodyPr/>
           <a:lstStyle/>
           <a:p>
+            <a:pPr>
+              <a:defRPr/>
+            </a:pPr>
             <a:endParaRPr lang="en-US"/>
           </a:p>
         </p:txBody>
@@ -1105,13 +1579,16 @@
             <p:ph type="sldNum" sz="quarter" idx="12"/>
           </p:nvPr>
         </p:nvSpPr>
-        <p:spPr/>
+        <p:spPr bwMode="auto"/>
         <p:txBody>
           <a:bodyPr/>
           <a:lstStyle/>
           <a:p>
+            <a:pPr>
+              <a:defRPr/>
+            </a:pPr>
             <a:fld id="{D1E6B054-2327-D043-B7B5-4043E46ED170}" type="slidenum">
-              <a:rPr lang="en-US" smtClean="0"/>
+              <a:rPr lang="en-US"/>
               <a:t>‹#›</a:t>
             </a:fld>
             <a:endParaRPr lang="en-US"/>
@@ -1119,11 +1596,6 @@
         </p:txBody>
       </p:sp>
     </p:spTree>
-    <p:extLst>
-      <p:ext uri="{BB962C8B-B14F-4D97-AF65-F5344CB8AC3E}">
-        <p14:creationId xmlns:p14="http://schemas.microsoft.com/office/powerpoint/2010/main" val="3000644066"/>
-      </p:ext>
-    </p:extLst>
   </p:cSld>
   <p:clrMapOvr>
     <a:masterClrMapping/>
@@ -1132,7 +1604,7 @@
 </file>
 
 <file path=ppt/slideLayouts/slideLayout4.xml><?xml version="1.0" encoding="utf-8"?>
-<p:sldLayout xmlns:a="http://schemas.openxmlformats.org/drawingml/2006/main" xmlns:r="http://schemas.openxmlformats.org/officeDocument/2006/relationships" xmlns:p="http://schemas.openxmlformats.org/presentationml/2006/main" type="twoObj" preserve="1">
+<p:sldLayout xmlns:a="http://schemas.openxmlformats.org/drawingml/2006/main" xmlns:r="http://schemas.openxmlformats.org/officeDocument/2006/relationships" xmlns:p="http://schemas.openxmlformats.org/presentationml/2006/main" xmlns:m="http://schemas.openxmlformats.org/officeDocument/2006/math" xmlns:w="http://schemas.openxmlformats.org/wordprocessingml/2006/main" matchingName="" preserve="1" showMasterPhAnim="0" type="twoObj" userDrawn="1">
   <p:cSld name="Two Content">
     <p:spTree>
       <p:nvGrpSpPr>
@@ -1140,7 +1612,7 @@
         <p:cNvGrpSpPr/>
         <p:nvPr/>
       </p:nvGrpSpPr>
-      <p:grpSpPr>
+      <p:grpSpPr bwMode="auto">
         <a:xfrm>
           <a:off x="0" y="0"/>
           <a:ext cx="0" cy="0"/>
@@ -1158,11 +1630,14 @@
             <p:ph type="title"/>
           </p:nvPr>
         </p:nvSpPr>
-        <p:spPr/>
+        <p:spPr bwMode="auto"/>
         <p:txBody>
           <a:bodyPr/>
           <a:lstStyle/>
           <a:p>
+            <a:pPr>
+              <a:defRPr/>
+            </a:pPr>
             <a:r>
               <a:rPr lang="en-CA"/>
               <a:t>Click to edit Master title style</a:t>
@@ -1181,7 +1656,7 @@
             <p:ph sz="half" idx="1"/>
           </p:nvPr>
         </p:nvSpPr>
-        <p:spPr>
+        <p:spPr bwMode="auto">
           <a:xfrm>
             <a:off x="457200" y="1600200"/>
             <a:ext cx="4038600" cy="4525963"/>
@@ -1219,35 +1694,49 @@
             </a:lvl9pPr>
           </a:lstStyle>
           <a:p>
-            <a:pPr lvl="0"/>
+            <a:pPr lvl="0">
+              <a:defRPr/>
+            </a:pPr>
             <a:r>
               <a:rPr lang="en-CA"/>
               <a:t>Click to edit Master text styles</a:t>
             </a:r>
-          </a:p>
-          <a:p>
-            <a:pPr lvl="1"/>
+            <a:endParaRPr/>
+          </a:p>
+          <a:p>
+            <a:pPr lvl="1">
+              <a:defRPr/>
+            </a:pPr>
             <a:r>
               <a:rPr lang="en-CA"/>
               <a:t>Second level</a:t>
             </a:r>
-          </a:p>
-          <a:p>
-            <a:pPr lvl="2"/>
+            <a:endParaRPr/>
+          </a:p>
+          <a:p>
+            <a:pPr lvl="2">
+              <a:defRPr/>
+            </a:pPr>
             <a:r>
               <a:rPr lang="en-CA"/>
               <a:t>Third level</a:t>
             </a:r>
-          </a:p>
-          <a:p>
-            <a:pPr lvl="3"/>
+            <a:endParaRPr/>
+          </a:p>
+          <a:p>
+            <a:pPr lvl="3">
+              <a:defRPr/>
+            </a:pPr>
             <a:r>
               <a:rPr lang="en-CA"/>
               <a:t>Fourth level</a:t>
             </a:r>
-          </a:p>
-          <a:p>
-            <a:pPr lvl="4"/>
+            <a:endParaRPr/>
+          </a:p>
+          <a:p>
+            <a:pPr lvl="4">
+              <a:defRPr/>
+            </a:pPr>
             <a:r>
               <a:rPr lang="en-CA"/>
               <a:t>Fifth level</a:t>
@@ -1266,7 +1755,7 @@
             <p:ph sz="half" idx="2"/>
           </p:nvPr>
         </p:nvSpPr>
-        <p:spPr>
+        <p:spPr bwMode="auto">
           <a:xfrm>
             <a:off x="4648200" y="1600200"/>
             <a:ext cx="4038600" cy="4525963"/>
@@ -1304,35 +1793,49 @@
             </a:lvl9pPr>
           </a:lstStyle>
           <a:p>
-            <a:pPr lvl="0"/>
+            <a:pPr lvl="0">
+              <a:defRPr/>
+            </a:pPr>
             <a:r>
               <a:rPr lang="en-CA"/>
               <a:t>Click to edit Master text styles</a:t>
             </a:r>
-          </a:p>
-          <a:p>
-            <a:pPr lvl="1"/>
+            <a:endParaRPr/>
+          </a:p>
+          <a:p>
+            <a:pPr lvl="1">
+              <a:defRPr/>
+            </a:pPr>
             <a:r>
               <a:rPr lang="en-CA"/>
               <a:t>Second level</a:t>
             </a:r>
-          </a:p>
-          <a:p>
-            <a:pPr lvl="2"/>
+            <a:endParaRPr/>
+          </a:p>
+          <a:p>
+            <a:pPr lvl="2">
+              <a:defRPr/>
+            </a:pPr>
             <a:r>
               <a:rPr lang="en-CA"/>
               <a:t>Third level</a:t>
             </a:r>
-          </a:p>
-          <a:p>
-            <a:pPr lvl="3"/>
+            <a:endParaRPr/>
+          </a:p>
+          <a:p>
+            <a:pPr lvl="3">
+              <a:defRPr/>
+            </a:pPr>
             <a:r>
               <a:rPr lang="en-CA"/>
               <a:t>Fourth level</a:t>
             </a:r>
-          </a:p>
-          <a:p>
-            <a:pPr lvl="4"/>
+            <a:endParaRPr/>
+          </a:p>
+          <a:p>
+            <a:pPr lvl="4">
+              <a:defRPr/>
+            </a:pPr>
             <a:r>
               <a:rPr lang="en-CA"/>
               <a:t>Fifth level</a:t>
@@ -1351,13 +1854,16 @@
             <p:ph type="dt" sz="half" idx="10"/>
           </p:nvPr>
         </p:nvSpPr>
-        <p:spPr/>
+        <p:spPr bwMode="auto"/>
         <p:txBody>
           <a:bodyPr/>
           <a:lstStyle/>
           <a:p>
+            <a:pPr>
+              <a:defRPr/>
+            </a:pPr>
             <a:fld id="{779256A2-DE0C-7447-B687-786F38514E8C}" type="datetimeFigureOut">
-              <a:rPr lang="en-US" smtClean="0"/>
+              <a:rPr lang="en-US"/>
               <a:t>3/21/2024</a:t>
             </a:fld>
             <a:endParaRPr lang="en-US"/>
@@ -1374,11 +1880,14 @@
             <p:ph type="ftr" sz="quarter" idx="11"/>
           </p:nvPr>
         </p:nvSpPr>
-        <p:spPr/>
+        <p:spPr bwMode="auto"/>
         <p:txBody>
           <a:bodyPr/>
           <a:lstStyle/>
           <a:p>
+            <a:pPr>
+              <a:defRPr/>
+            </a:pPr>
             <a:endParaRPr lang="en-US"/>
           </a:p>
         </p:txBody>
@@ -1393,13 +1902,16 @@
             <p:ph type="sldNum" sz="quarter" idx="12"/>
           </p:nvPr>
         </p:nvSpPr>
-        <p:spPr/>
+        <p:spPr bwMode="auto"/>
         <p:txBody>
           <a:bodyPr/>
           <a:lstStyle/>
           <a:p>
+            <a:pPr>
+              <a:defRPr/>
+            </a:pPr>
             <a:fld id="{D1E6B054-2327-D043-B7B5-4043E46ED170}" type="slidenum">
-              <a:rPr lang="en-US" smtClean="0"/>
+              <a:rPr lang="en-US"/>
               <a:t>‹#›</a:t>
             </a:fld>
             <a:endParaRPr lang="en-US"/>
@@ -1407,11 +1919,6 @@
         </p:txBody>
       </p:sp>
     </p:spTree>
-    <p:extLst>
-      <p:ext uri="{BB962C8B-B14F-4D97-AF65-F5344CB8AC3E}">
-        <p14:creationId xmlns:p14="http://schemas.microsoft.com/office/powerpoint/2010/main" val="1759991822"/>
-      </p:ext>
-    </p:extLst>
   </p:cSld>
   <p:clrMapOvr>
     <a:masterClrMapping/>
@@ -1420,7 +1927,7 @@
 </file>
 
 <file path=ppt/slideLayouts/slideLayout5.xml><?xml version="1.0" encoding="utf-8"?>
-<p:sldLayout xmlns:a="http://schemas.openxmlformats.org/drawingml/2006/main" xmlns:r="http://schemas.openxmlformats.org/officeDocument/2006/relationships" xmlns:p="http://schemas.openxmlformats.org/presentationml/2006/main" type="twoTxTwoObj" preserve="1">
+<p:sldLayout xmlns:a="http://schemas.openxmlformats.org/drawingml/2006/main" xmlns:r="http://schemas.openxmlformats.org/officeDocument/2006/relationships" xmlns:p="http://schemas.openxmlformats.org/presentationml/2006/main" xmlns:m="http://schemas.openxmlformats.org/officeDocument/2006/math" xmlns:w="http://schemas.openxmlformats.org/wordprocessingml/2006/main" matchingName="" preserve="1" showMasterPhAnim="0" type="twoTxTwoObj" userDrawn="1">
   <p:cSld name="Comparison">
     <p:spTree>
       <p:nvGrpSpPr>
@@ -1428,7 +1935,7 @@
         <p:cNvGrpSpPr/>
         <p:nvPr/>
       </p:nvGrpSpPr>
-      <p:grpSpPr>
+      <p:grpSpPr bwMode="auto">
         <a:xfrm>
           <a:off x="0" y="0"/>
           <a:ext cx="0" cy="0"/>
@@ -1446,7 +1953,7 @@
             <p:ph type="title"/>
           </p:nvPr>
         </p:nvSpPr>
-        <p:spPr/>
+        <p:spPr bwMode="auto"/>
         <p:txBody>
           <a:bodyPr/>
           <a:lstStyle>
@@ -1455,6 +1962,9 @@
             </a:lvl1pPr>
           </a:lstStyle>
           <a:p>
+            <a:pPr>
+              <a:defRPr/>
+            </a:pPr>
             <a:r>
               <a:rPr lang="en-CA"/>
               <a:t>Click to edit Master title style</a:t>
@@ -1473,7 +1983,7 @@
             <p:ph type="body" idx="1"/>
           </p:nvPr>
         </p:nvSpPr>
-        <p:spPr>
+        <p:spPr bwMode="auto">
           <a:xfrm>
             <a:off x="457200" y="1535113"/>
             <a:ext cx="4040188" cy="639762"/>
@@ -1520,11 +2030,14 @@
             </a:lvl9pPr>
           </a:lstStyle>
           <a:p>
-            <a:pPr lvl="0"/>
+            <a:pPr lvl="0">
+              <a:defRPr/>
+            </a:pPr>
             <a:r>
               <a:rPr lang="en-CA"/>
               <a:t>Click to edit Master text styles</a:t>
             </a:r>
+            <a:endParaRPr/>
           </a:p>
         </p:txBody>
       </p:sp>
@@ -1538,7 +2051,7 @@
             <p:ph sz="half" idx="2"/>
           </p:nvPr>
         </p:nvSpPr>
-        <p:spPr>
+        <p:spPr bwMode="auto">
           <a:xfrm>
             <a:off x="457200" y="2174875"/>
             <a:ext cx="4040188" cy="3951288"/>
@@ -1576,35 +2089,49 @@
             </a:lvl9pPr>
           </a:lstStyle>
           <a:p>
-            <a:pPr lvl="0"/>
+            <a:pPr lvl="0">
+              <a:defRPr/>
+            </a:pPr>
             <a:r>
               <a:rPr lang="en-CA"/>
               <a:t>Click to edit Master text styles</a:t>
             </a:r>
-          </a:p>
-          <a:p>
-            <a:pPr lvl="1"/>
+            <a:endParaRPr/>
+          </a:p>
+          <a:p>
+            <a:pPr lvl="1">
+              <a:defRPr/>
+            </a:pPr>
             <a:r>
               <a:rPr lang="en-CA"/>
               <a:t>Second level</a:t>
             </a:r>
-          </a:p>
-          <a:p>
-            <a:pPr lvl="2"/>
+            <a:endParaRPr/>
+          </a:p>
+          <a:p>
+            <a:pPr lvl="2">
+              <a:defRPr/>
+            </a:pPr>
             <a:r>
               <a:rPr lang="en-CA"/>
               <a:t>Third level</a:t>
             </a:r>
-          </a:p>
-          <a:p>
-            <a:pPr lvl="3"/>
+            <a:endParaRPr/>
+          </a:p>
+          <a:p>
+            <a:pPr lvl="3">
+              <a:defRPr/>
+            </a:pPr>
             <a:r>
               <a:rPr lang="en-CA"/>
               <a:t>Fourth level</a:t>
             </a:r>
-          </a:p>
-          <a:p>
-            <a:pPr lvl="4"/>
+            <a:endParaRPr/>
+          </a:p>
+          <a:p>
+            <a:pPr lvl="4">
+              <a:defRPr/>
+            </a:pPr>
             <a:r>
               <a:rPr lang="en-CA"/>
               <a:t>Fifth level</a:t>
@@ -1623,7 +2150,7 @@
             <p:ph type="body" sz="quarter" idx="3"/>
           </p:nvPr>
         </p:nvSpPr>
-        <p:spPr>
+        <p:spPr bwMode="auto">
           <a:xfrm>
             <a:off x="4645025" y="1535113"/>
             <a:ext cx="4041775" cy="639762"/>
@@ -1670,11 +2197,14 @@
             </a:lvl9pPr>
           </a:lstStyle>
           <a:p>
-            <a:pPr lvl="0"/>
+            <a:pPr lvl="0">
+              <a:defRPr/>
+            </a:pPr>
             <a:r>
               <a:rPr lang="en-CA"/>
               <a:t>Click to edit Master text styles</a:t>
             </a:r>
+            <a:endParaRPr/>
           </a:p>
         </p:txBody>
       </p:sp>
@@ -1688,7 +2218,7 @@
             <p:ph sz="quarter" idx="4"/>
           </p:nvPr>
         </p:nvSpPr>
-        <p:spPr>
+        <p:spPr bwMode="auto">
           <a:xfrm>
             <a:off x="4645025" y="2174875"/>
             <a:ext cx="4041775" cy="3951288"/>
@@ -1726,35 +2256,49 @@
             </a:lvl9pPr>
           </a:lstStyle>
           <a:p>
-            <a:pPr lvl="0"/>
+            <a:pPr lvl="0">
+              <a:defRPr/>
+            </a:pPr>
             <a:r>
               <a:rPr lang="en-CA"/>
               <a:t>Click to edit Master text styles</a:t>
             </a:r>
-          </a:p>
-          <a:p>
-            <a:pPr lvl="1"/>
+            <a:endParaRPr/>
+          </a:p>
+          <a:p>
+            <a:pPr lvl="1">
+              <a:defRPr/>
+            </a:pPr>
             <a:r>
               <a:rPr lang="en-CA"/>
               <a:t>Second level</a:t>
             </a:r>
-          </a:p>
-          <a:p>
-            <a:pPr lvl="2"/>
+            <a:endParaRPr/>
+          </a:p>
+          <a:p>
+            <a:pPr lvl="2">
+              <a:defRPr/>
+            </a:pPr>
             <a:r>
               <a:rPr lang="en-CA"/>
               <a:t>Third level</a:t>
             </a:r>
-          </a:p>
-          <a:p>
-            <a:pPr lvl="3"/>
+            <a:endParaRPr/>
+          </a:p>
+          <a:p>
+            <a:pPr lvl="3">
+              <a:defRPr/>
+            </a:pPr>
             <a:r>
               <a:rPr lang="en-CA"/>
               <a:t>Fourth level</a:t>
             </a:r>
-          </a:p>
-          <a:p>
-            <a:pPr lvl="4"/>
+            <a:endParaRPr/>
+          </a:p>
+          <a:p>
+            <a:pPr lvl="4">
+              <a:defRPr/>
+            </a:pPr>
             <a:r>
               <a:rPr lang="en-CA"/>
               <a:t>Fifth level</a:t>
@@ -1773,13 +2317,16 @@
             <p:ph type="dt" sz="half" idx="10"/>
           </p:nvPr>
         </p:nvSpPr>
-        <p:spPr/>
+        <p:spPr bwMode="auto"/>
         <p:txBody>
           <a:bodyPr/>
           <a:lstStyle/>
           <a:p>
+            <a:pPr>
+              <a:defRPr/>
+            </a:pPr>
             <a:fld id="{779256A2-DE0C-7447-B687-786F38514E8C}" type="datetimeFigureOut">
-              <a:rPr lang="en-US" smtClean="0"/>
+              <a:rPr lang="en-US"/>
               <a:t>3/21/2024</a:t>
             </a:fld>
             <a:endParaRPr lang="en-US"/>
@@ -1796,11 +2343,14 @@
             <p:ph type="ftr" sz="quarter" idx="11"/>
           </p:nvPr>
         </p:nvSpPr>
-        <p:spPr/>
+        <p:spPr bwMode="auto"/>
         <p:txBody>
           <a:bodyPr/>
           <a:lstStyle/>
           <a:p>
+            <a:pPr>
+              <a:defRPr/>
+            </a:pPr>
             <a:endParaRPr lang="en-US"/>
           </a:p>
         </p:txBody>
@@ -1815,13 +2365,16 @@
             <p:ph type="sldNum" sz="quarter" idx="12"/>
           </p:nvPr>
         </p:nvSpPr>
-        <p:spPr/>
+        <p:spPr bwMode="auto"/>
         <p:txBody>
           <a:bodyPr/>
           <a:lstStyle/>
           <a:p>
+            <a:pPr>
+              <a:defRPr/>
+            </a:pPr>
             <a:fld id="{D1E6B054-2327-D043-B7B5-4043E46ED170}" type="slidenum">
-              <a:rPr lang="en-US" smtClean="0"/>
+              <a:rPr lang="en-US"/>
               <a:t>‹#›</a:t>
             </a:fld>
             <a:endParaRPr lang="en-US"/>
@@ -1829,11 +2382,6 @@
         </p:txBody>
       </p:sp>
     </p:spTree>
-    <p:extLst>
-      <p:ext uri="{BB962C8B-B14F-4D97-AF65-F5344CB8AC3E}">
-        <p14:creationId xmlns:p14="http://schemas.microsoft.com/office/powerpoint/2010/main" val="2069037642"/>
-      </p:ext>
-    </p:extLst>
   </p:cSld>
   <p:clrMapOvr>
     <a:masterClrMapping/>
@@ -1842,7 +2390,7 @@
 </file>
 
 <file path=ppt/slideLayouts/slideLayout6.xml><?xml version="1.0" encoding="utf-8"?>
-<p:sldLayout xmlns:a="http://schemas.openxmlformats.org/drawingml/2006/main" xmlns:r="http://schemas.openxmlformats.org/officeDocument/2006/relationships" xmlns:p="http://schemas.openxmlformats.org/presentationml/2006/main" type="titleOnly" preserve="1">
+<p:sldLayout xmlns:a="http://schemas.openxmlformats.org/drawingml/2006/main" xmlns:r="http://schemas.openxmlformats.org/officeDocument/2006/relationships" xmlns:p="http://schemas.openxmlformats.org/presentationml/2006/main" xmlns:m="http://schemas.openxmlformats.org/officeDocument/2006/math" xmlns:w="http://schemas.openxmlformats.org/wordprocessingml/2006/main" matchingName="" preserve="1" showMasterPhAnim="0" type="titleOnly" userDrawn="1">
   <p:cSld name="Title Only">
     <p:spTree>
       <p:nvGrpSpPr>
@@ -1850,7 +2398,7 @@
         <p:cNvGrpSpPr/>
         <p:nvPr/>
       </p:nvGrpSpPr>
-      <p:grpSpPr>
+      <p:grpSpPr bwMode="auto">
         <a:xfrm>
           <a:off x="0" y="0"/>
           <a:ext cx="0" cy="0"/>
@@ -1868,11 +2416,14 @@
             <p:ph type="title"/>
           </p:nvPr>
         </p:nvSpPr>
-        <p:spPr/>
+        <p:spPr bwMode="auto"/>
         <p:txBody>
           <a:bodyPr/>
           <a:lstStyle/>
           <a:p>
+            <a:pPr>
+              <a:defRPr/>
+            </a:pPr>
             <a:r>
               <a:rPr lang="en-CA"/>
               <a:t>Click to edit Master title style</a:t>
@@ -1891,13 +2442,16 @@
             <p:ph type="dt" sz="half" idx="10"/>
           </p:nvPr>
         </p:nvSpPr>
-        <p:spPr/>
+        <p:spPr bwMode="auto"/>
         <p:txBody>
           <a:bodyPr/>
           <a:lstStyle/>
           <a:p>
+            <a:pPr>
+              <a:defRPr/>
+            </a:pPr>
             <a:fld id="{779256A2-DE0C-7447-B687-786F38514E8C}" type="datetimeFigureOut">
-              <a:rPr lang="en-US" smtClean="0"/>
+              <a:rPr lang="en-US"/>
               <a:t>3/21/2024</a:t>
             </a:fld>
             <a:endParaRPr lang="en-US"/>
@@ -1914,11 +2468,14 @@
             <p:ph type="ftr" sz="quarter" idx="11"/>
           </p:nvPr>
         </p:nvSpPr>
-        <p:spPr/>
+        <p:spPr bwMode="auto"/>
         <p:txBody>
           <a:bodyPr/>
           <a:lstStyle/>
           <a:p>
+            <a:pPr>
+              <a:defRPr/>
+            </a:pPr>
             <a:endParaRPr lang="en-US"/>
           </a:p>
         </p:txBody>
@@ -1933,13 +2490,16 @@
             <p:ph type="sldNum" sz="quarter" idx="12"/>
           </p:nvPr>
         </p:nvSpPr>
-        <p:spPr/>
+        <p:spPr bwMode="auto"/>
         <p:txBody>
           <a:bodyPr/>
           <a:lstStyle/>
           <a:p>
+            <a:pPr>
+              <a:defRPr/>
+            </a:pPr>
             <a:fld id="{D1E6B054-2327-D043-B7B5-4043E46ED170}" type="slidenum">
-              <a:rPr lang="en-US" smtClean="0"/>
+              <a:rPr lang="en-US"/>
               <a:t>‹#›</a:t>
             </a:fld>
             <a:endParaRPr lang="en-US"/>
@@ -1947,11 +2507,6 @@
         </p:txBody>
       </p:sp>
     </p:spTree>
-    <p:extLst>
-      <p:ext uri="{BB962C8B-B14F-4D97-AF65-F5344CB8AC3E}">
-        <p14:creationId xmlns:p14="http://schemas.microsoft.com/office/powerpoint/2010/main" val="2545465010"/>
-      </p:ext>
-    </p:extLst>
   </p:cSld>
   <p:clrMapOvr>
     <a:masterClrMapping/>
@@ -1960,7 +2515,7 @@
 </file>
 
 <file path=ppt/slideLayouts/slideLayout7.xml><?xml version="1.0" encoding="utf-8"?>
-<p:sldLayout xmlns:a="http://schemas.openxmlformats.org/drawingml/2006/main" xmlns:r="http://schemas.openxmlformats.org/officeDocument/2006/relationships" xmlns:p="http://schemas.openxmlformats.org/presentationml/2006/main" type="blank" preserve="1">
+<p:sldLayout xmlns:a="http://schemas.openxmlformats.org/drawingml/2006/main" xmlns:r="http://schemas.openxmlformats.org/officeDocument/2006/relationships" xmlns:p="http://schemas.openxmlformats.org/presentationml/2006/main" xmlns:m="http://schemas.openxmlformats.org/officeDocument/2006/math" xmlns:w="http://schemas.openxmlformats.org/wordprocessingml/2006/main" matchingName="" preserve="1" showMasterPhAnim="0" type="blank" userDrawn="1">
   <p:cSld name="Blank">
     <p:spTree>
       <p:nvGrpSpPr>
@@ -1968,7 +2523,7 @@
         <p:cNvGrpSpPr/>
         <p:nvPr/>
       </p:nvGrpSpPr>
-      <p:grpSpPr>
+      <p:grpSpPr bwMode="auto">
         <a:xfrm>
           <a:off x="0" y="0"/>
           <a:ext cx="0" cy="0"/>
@@ -1986,13 +2541,16 @@
             <p:ph type="dt" sz="half" idx="10"/>
           </p:nvPr>
         </p:nvSpPr>
-        <p:spPr/>
+        <p:spPr bwMode="auto"/>
         <p:txBody>
           <a:bodyPr/>
           <a:lstStyle/>
           <a:p>
+            <a:pPr>
+              <a:defRPr/>
+            </a:pPr>
             <a:fld id="{779256A2-DE0C-7447-B687-786F38514E8C}" type="datetimeFigureOut">
-              <a:rPr lang="en-US" smtClean="0"/>
+              <a:rPr lang="en-US"/>
               <a:t>3/21/2024</a:t>
             </a:fld>
             <a:endParaRPr lang="en-US"/>
@@ -2009,11 +2567,14 @@
             <p:ph type="ftr" sz="quarter" idx="11"/>
           </p:nvPr>
         </p:nvSpPr>
-        <p:spPr/>
+        <p:spPr bwMode="auto"/>
         <p:txBody>
           <a:bodyPr/>
           <a:lstStyle/>
           <a:p>
+            <a:pPr>
+              <a:defRPr/>
+            </a:pPr>
             <a:endParaRPr lang="en-US"/>
           </a:p>
         </p:txBody>
@@ -2028,13 +2589,16 @@
             <p:ph type="sldNum" sz="quarter" idx="12"/>
           </p:nvPr>
         </p:nvSpPr>
-        <p:spPr/>
+        <p:spPr bwMode="auto"/>
         <p:txBody>
           <a:bodyPr/>
           <a:lstStyle/>
           <a:p>
+            <a:pPr>
+              <a:defRPr/>
+            </a:pPr>
             <a:fld id="{D1E6B054-2327-D043-B7B5-4043E46ED170}" type="slidenum">
-              <a:rPr lang="en-US" smtClean="0"/>
+              <a:rPr lang="en-US"/>
               <a:t>‹#›</a:t>
             </a:fld>
             <a:endParaRPr lang="en-US"/>
@@ -2042,11 +2606,6 @@
         </p:txBody>
       </p:sp>
     </p:spTree>
-    <p:extLst>
-      <p:ext uri="{BB962C8B-B14F-4D97-AF65-F5344CB8AC3E}">
-        <p14:creationId xmlns:p14="http://schemas.microsoft.com/office/powerpoint/2010/main" val="319494334"/>
-      </p:ext>
-    </p:extLst>
   </p:cSld>
   <p:clrMapOvr>
     <a:masterClrMapping/>
@@ -2055,7 +2614,7 @@
 </file>
 
 <file path=ppt/slideLayouts/slideLayout8.xml><?xml version="1.0" encoding="utf-8"?>
-<p:sldLayout xmlns:a="http://schemas.openxmlformats.org/drawingml/2006/main" xmlns:r="http://schemas.openxmlformats.org/officeDocument/2006/relationships" xmlns:p="http://schemas.openxmlformats.org/presentationml/2006/main" type="objTx" preserve="1">
+<p:sldLayout xmlns:a="http://schemas.openxmlformats.org/drawingml/2006/main" xmlns:r="http://schemas.openxmlformats.org/officeDocument/2006/relationships" xmlns:p="http://schemas.openxmlformats.org/presentationml/2006/main" xmlns:m="http://schemas.openxmlformats.org/officeDocument/2006/math" xmlns:w="http://schemas.openxmlformats.org/wordprocessingml/2006/main" matchingName="" preserve="1" showMasterPhAnim="0" type="objTx" userDrawn="1">
   <p:cSld name="Content with Caption">
     <p:spTree>
       <p:nvGrpSpPr>
@@ -2063,7 +2622,7 @@
         <p:cNvGrpSpPr/>
         <p:nvPr/>
       </p:nvGrpSpPr>
-      <p:grpSpPr>
+      <p:grpSpPr bwMode="auto">
         <a:xfrm>
           <a:off x="0" y="0"/>
           <a:ext cx="0" cy="0"/>
@@ -2081,7 +2640,7 @@
             <p:ph type="title"/>
           </p:nvPr>
         </p:nvSpPr>
-        <p:spPr>
+        <p:spPr bwMode="auto">
           <a:xfrm>
             <a:off x="457200" y="273050"/>
             <a:ext cx="3008313" cy="1162050"/>
@@ -2095,6 +2654,9 @@
             </a:lvl1pPr>
           </a:lstStyle>
           <a:p>
+            <a:pPr>
+              <a:defRPr/>
+            </a:pPr>
             <a:r>
               <a:rPr lang="en-CA"/>
               <a:t>Click to edit Master title style</a:t>
@@ -2113,7 +2675,7 @@
             <p:ph idx="1"/>
           </p:nvPr>
         </p:nvSpPr>
-        <p:spPr>
+        <p:spPr bwMode="auto">
           <a:xfrm>
             <a:off x="3575050" y="273050"/>
             <a:ext cx="5111750" cy="5853113"/>
@@ -2151,35 +2713,49 @@
             </a:lvl9pPr>
           </a:lstStyle>
           <a:p>
-            <a:pPr lvl="0"/>
+            <a:pPr lvl="0">
+              <a:defRPr/>
+            </a:pPr>
             <a:r>
               <a:rPr lang="en-CA"/>
               <a:t>Click to edit Master text styles</a:t>
             </a:r>
-          </a:p>
-          <a:p>
-            <a:pPr lvl="1"/>
+            <a:endParaRPr/>
+          </a:p>
+          <a:p>
+            <a:pPr lvl="1">
+              <a:defRPr/>
+            </a:pPr>
             <a:r>
               <a:rPr lang="en-CA"/>
               <a:t>Second level</a:t>
             </a:r>
-          </a:p>
-          <a:p>
-            <a:pPr lvl="2"/>
+            <a:endParaRPr/>
+          </a:p>
+          <a:p>
+            <a:pPr lvl="2">
+              <a:defRPr/>
+            </a:pPr>
             <a:r>
               <a:rPr lang="en-CA"/>
               <a:t>Third level</a:t>
             </a:r>
-          </a:p>
-          <a:p>
-            <a:pPr lvl="3"/>
+            <a:endParaRPr/>
+          </a:p>
+          <a:p>
+            <a:pPr lvl="3">
+              <a:defRPr/>
+            </a:pPr>
             <a:r>
               <a:rPr lang="en-CA"/>
               <a:t>Fourth level</a:t>
             </a:r>
-          </a:p>
-          <a:p>
-            <a:pPr lvl="4"/>
+            <a:endParaRPr/>
+          </a:p>
+          <a:p>
+            <a:pPr lvl="4">
+              <a:defRPr/>
+            </a:pPr>
             <a:r>
               <a:rPr lang="en-CA"/>
               <a:t>Fifth level</a:t>
@@ -2198,7 +2774,7 @@
             <p:ph type="body" sz="half" idx="2"/>
           </p:nvPr>
         </p:nvSpPr>
-        <p:spPr>
+        <p:spPr bwMode="auto">
           <a:xfrm>
             <a:off x="457200" y="1435100"/>
             <a:ext cx="3008313" cy="4691063"/>
@@ -2245,11 +2821,14 @@
             </a:lvl9pPr>
           </a:lstStyle>
           <a:p>
-            <a:pPr lvl="0"/>
+            <a:pPr lvl="0">
+              <a:defRPr/>
+            </a:pPr>
             <a:r>
               <a:rPr lang="en-CA"/>
               <a:t>Click to edit Master text styles</a:t>
             </a:r>
+            <a:endParaRPr/>
           </a:p>
         </p:txBody>
       </p:sp>
@@ -2263,13 +2842,16 @@
             <p:ph type="dt" sz="half" idx="10"/>
           </p:nvPr>
         </p:nvSpPr>
-        <p:spPr/>
+        <p:spPr bwMode="auto"/>
         <p:txBody>
           <a:bodyPr/>
           <a:lstStyle/>
           <a:p>
+            <a:pPr>
+              <a:defRPr/>
+            </a:pPr>
             <a:fld id="{779256A2-DE0C-7447-B687-786F38514E8C}" type="datetimeFigureOut">
-              <a:rPr lang="en-US" smtClean="0"/>
+              <a:rPr lang="en-US"/>
               <a:t>3/21/2024</a:t>
             </a:fld>
             <a:endParaRPr lang="en-US"/>
@@ -2286,11 +2868,14 @@
             <p:ph type="ftr" sz="quarter" idx="11"/>
           </p:nvPr>
         </p:nvSpPr>
-        <p:spPr/>
+        <p:spPr bwMode="auto"/>
         <p:txBody>
           <a:bodyPr/>
           <a:lstStyle/>
           <a:p>
+            <a:pPr>
+              <a:defRPr/>
+            </a:pPr>
             <a:endParaRPr lang="en-US"/>
           </a:p>
         </p:txBody>
@@ -2305,13 +2890,16 @@
             <p:ph type="sldNum" sz="quarter" idx="12"/>
           </p:nvPr>
         </p:nvSpPr>
-        <p:spPr/>
+        <p:spPr bwMode="auto"/>
         <p:txBody>
           <a:bodyPr/>
           <a:lstStyle/>
           <a:p>
+            <a:pPr>
+              <a:defRPr/>
+            </a:pPr>
             <a:fld id="{D1E6B054-2327-D043-B7B5-4043E46ED170}" type="slidenum">
-              <a:rPr lang="en-US" smtClean="0"/>
+              <a:rPr lang="en-US"/>
               <a:t>‹#›</a:t>
             </a:fld>
             <a:endParaRPr lang="en-US"/>
@@ -2319,11 +2907,6 @@
         </p:txBody>
       </p:sp>
     </p:spTree>
-    <p:extLst>
-      <p:ext uri="{BB962C8B-B14F-4D97-AF65-F5344CB8AC3E}">
-        <p14:creationId xmlns:p14="http://schemas.microsoft.com/office/powerpoint/2010/main" val="3966389927"/>
-      </p:ext>
-    </p:extLst>
   </p:cSld>
   <p:clrMapOvr>
     <a:masterClrMapping/>
@@ -2332,7 +2915,7 @@
 </file>
 
 <file path=ppt/slideLayouts/slideLayout9.xml><?xml version="1.0" encoding="utf-8"?>
-<p:sldLayout xmlns:a="http://schemas.openxmlformats.org/drawingml/2006/main" xmlns:r="http://schemas.openxmlformats.org/officeDocument/2006/relationships" xmlns:p="http://schemas.openxmlformats.org/presentationml/2006/main" type="picTx" preserve="1">
+<p:sldLayout xmlns:a="http://schemas.openxmlformats.org/drawingml/2006/main" xmlns:r="http://schemas.openxmlformats.org/officeDocument/2006/relationships" xmlns:p="http://schemas.openxmlformats.org/presentationml/2006/main" xmlns:m="http://schemas.openxmlformats.org/officeDocument/2006/math" xmlns:w="http://schemas.openxmlformats.org/wordprocessingml/2006/main" matchingName="" preserve="1" showMasterPhAnim="0" type="picTx" userDrawn="1">
   <p:cSld name="Picture with Caption">
     <p:spTree>
       <p:nvGrpSpPr>
@@ -2340,7 +2923,7 @@
         <p:cNvGrpSpPr/>
         <p:nvPr/>
       </p:nvGrpSpPr>
-      <p:grpSpPr>
+      <p:grpSpPr bwMode="auto">
         <a:xfrm>
           <a:off x="0" y="0"/>
           <a:ext cx="0" cy="0"/>
@@ -2358,7 +2941,7 @@
             <p:ph type="title"/>
           </p:nvPr>
         </p:nvSpPr>
-        <p:spPr>
+        <p:spPr bwMode="auto">
           <a:xfrm>
             <a:off x="1792288" y="4800600"/>
             <a:ext cx="5486400" cy="566738"/>
@@ -2372,6 +2955,9 @@
             </a:lvl1pPr>
           </a:lstStyle>
           <a:p>
+            <a:pPr>
+              <a:defRPr/>
+            </a:pPr>
             <a:r>
               <a:rPr lang="en-CA"/>
               <a:t>Click to edit Master title style</a:t>
@@ -2390,7 +2976,7 @@
             <p:ph type="pic" idx="1"/>
           </p:nvPr>
         </p:nvSpPr>
-        <p:spPr>
+        <p:spPr bwMode="auto">
           <a:xfrm>
             <a:off x="1792288" y="612775"/>
             <a:ext cx="5486400" cy="4114800"/>
@@ -2437,6 +3023,9 @@
             </a:lvl9pPr>
           </a:lstStyle>
           <a:p>
+            <a:pPr>
+              <a:defRPr/>
+            </a:pPr>
             <a:endParaRPr lang="en-US"/>
           </a:p>
         </p:txBody>
@@ -2451,7 +3040,7 @@
             <p:ph type="body" sz="half" idx="2"/>
           </p:nvPr>
         </p:nvSpPr>
-        <p:spPr>
+        <p:spPr bwMode="auto">
           <a:xfrm>
             <a:off x="1792288" y="5367338"/>
             <a:ext cx="5486400" cy="804862"/>
@@ -2498,11 +3087,14 @@
             </a:lvl9pPr>
           </a:lstStyle>
           <a:p>
-            <a:pPr lvl="0"/>
+            <a:pPr lvl="0">
+              <a:defRPr/>
+            </a:pPr>
             <a:r>
               <a:rPr lang="en-CA"/>
               <a:t>Click to edit Master text styles</a:t>
             </a:r>
+            <a:endParaRPr/>
           </a:p>
         </p:txBody>
       </p:sp>
@@ -2516,13 +3108,16 @@
             <p:ph type="dt" sz="half" idx="10"/>
           </p:nvPr>
         </p:nvSpPr>
-        <p:spPr/>
+        <p:spPr bwMode="auto"/>
         <p:txBody>
           <a:bodyPr/>
           <a:lstStyle/>
           <a:p>
+            <a:pPr>
+              <a:defRPr/>
+            </a:pPr>
             <a:fld id="{779256A2-DE0C-7447-B687-786F38514E8C}" type="datetimeFigureOut">
-              <a:rPr lang="en-US" smtClean="0"/>
+              <a:rPr lang="en-US"/>
               <a:t>3/21/2024</a:t>
             </a:fld>
             <a:endParaRPr lang="en-US"/>
@@ -2539,11 +3134,14 @@
             <p:ph type="ftr" sz="quarter" idx="11"/>
           </p:nvPr>
         </p:nvSpPr>
-        <p:spPr/>
+        <p:spPr bwMode="auto"/>
         <p:txBody>
           <a:bodyPr/>
           <a:lstStyle/>
           <a:p>
+            <a:pPr>
+              <a:defRPr/>
+            </a:pPr>
             <a:endParaRPr lang="en-US"/>
           </a:p>
         </p:txBody>
@@ -2558,13 +3156,16 @@
             <p:ph type="sldNum" sz="quarter" idx="12"/>
           </p:nvPr>
         </p:nvSpPr>
-        <p:spPr/>
+        <p:spPr bwMode="auto"/>
         <p:txBody>
           <a:bodyPr/>
           <a:lstStyle/>
           <a:p>
+            <a:pPr>
+              <a:defRPr/>
+            </a:pPr>
             <a:fld id="{D1E6B054-2327-D043-B7B5-4043E46ED170}" type="slidenum">
-              <a:rPr lang="en-US" smtClean="0"/>
+              <a:rPr lang="en-US"/>
               <a:t>‹#›</a:t>
             </a:fld>
             <a:endParaRPr lang="en-US"/>
@@ -2572,11 +3173,6 @@
         </p:txBody>
       </p:sp>
     </p:spTree>
-    <p:extLst>
-      <p:ext uri="{BB962C8B-B14F-4D97-AF65-F5344CB8AC3E}">
-        <p14:creationId xmlns:p14="http://schemas.microsoft.com/office/powerpoint/2010/main" val="1144746459"/>
-      </p:ext>
-    </p:extLst>
   </p:cSld>
   <p:clrMapOvr>
     <a:masterClrMapping/>
@@ -2585,8 +3181,8 @@
 </file>
 
 <file path=ppt/slideMasters/slideMaster1.xml><?xml version="1.0" encoding="utf-8"?>
-<p:sldMaster xmlns:a="http://schemas.openxmlformats.org/drawingml/2006/main" xmlns:r="http://schemas.openxmlformats.org/officeDocument/2006/relationships" xmlns:p="http://schemas.openxmlformats.org/presentationml/2006/main">
-  <p:cSld>
+<p:sldMaster xmlns:a="http://schemas.openxmlformats.org/drawingml/2006/main" xmlns:r="http://schemas.openxmlformats.org/officeDocument/2006/relationships" xmlns:p="http://schemas.openxmlformats.org/presentationml/2006/main" xmlns:m="http://schemas.openxmlformats.org/officeDocument/2006/math" xmlns:w="http://schemas.openxmlformats.org/wordprocessingml/2006/main" preserve="0">
+  <p:cSld name="">
     <p:bg>
       <p:bgRef idx="1001">
         <a:schemeClr val="bg1"/>
@@ -2598,7 +3194,7 @@
         <p:cNvGrpSpPr/>
         <p:nvPr/>
       </p:nvGrpSpPr>
-      <p:grpSpPr>
+      <p:grpSpPr bwMode="auto">
         <a:xfrm>
           <a:off x="0" y="0"/>
           <a:ext cx="0" cy="0"/>
@@ -2616,7 +3212,7 @@
             <p:ph type="title"/>
           </p:nvPr>
         </p:nvSpPr>
-        <p:spPr>
+        <p:spPr bwMode="auto">
           <a:xfrm>
             <a:off x="457200" y="274638"/>
             <a:ext cx="8229600" cy="1143000"/>
@@ -2631,6 +3227,9 @@
           </a:bodyPr>
           <a:lstStyle/>
           <a:p>
+            <a:pPr>
+              <a:defRPr/>
+            </a:pPr>
             <a:r>
               <a:rPr lang="en-CA"/>
               <a:t>Click to edit Master title style</a:t>
@@ -2649,7 +3248,7 @@
             <p:ph type="body" idx="1"/>
           </p:nvPr>
         </p:nvSpPr>
-        <p:spPr>
+        <p:spPr bwMode="auto">
           <a:xfrm>
             <a:off x="457200" y="1600200"/>
             <a:ext cx="8229600" cy="4525963"/>
@@ -2664,35 +3263,49 @@
           </a:bodyPr>
           <a:lstStyle/>
           <a:p>
-            <a:pPr lvl="0"/>
+            <a:pPr lvl="0">
+              <a:defRPr/>
+            </a:pPr>
             <a:r>
               <a:rPr lang="en-CA"/>
               <a:t>Click to edit Master text styles</a:t>
             </a:r>
-          </a:p>
-          <a:p>
-            <a:pPr lvl="1"/>
+            <a:endParaRPr/>
+          </a:p>
+          <a:p>
+            <a:pPr lvl="1">
+              <a:defRPr/>
+            </a:pPr>
             <a:r>
               <a:rPr lang="en-CA"/>
               <a:t>Second level</a:t>
             </a:r>
-          </a:p>
-          <a:p>
-            <a:pPr lvl="2"/>
+            <a:endParaRPr/>
+          </a:p>
+          <a:p>
+            <a:pPr lvl="2">
+              <a:defRPr/>
+            </a:pPr>
             <a:r>
               <a:rPr lang="en-CA"/>
               <a:t>Third level</a:t>
             </a:r>
-          </a:p>
-          <a:p>
-            <a:pPr lvl="3"/>
+            <a:endParaRPr/>
+          </a:p>
+          <a:p>
+            <a:pPr lvl="3">
+              <a:defRPr/>
+            </a:pPr>
             <a:r>
               <a:rPr lang="en-CA"/>
               <a:t>Fourth level</a:t>
             </a:r>
-          </a:p>
-          <a:p>
-            <a:pPr lvl="4"/>
+            <a:endParaRPr/>
+          </a:p>
+          <a:p>
+            <a:pPr lvl="4">
+              <a:defRPr/>
+            </a:pPr>
             <a:r>
               <a:rPr lang="en-CA"/>
               <a:t>Fifth level</a:t>
@@ -2711,7 +3324,7 @@
             <p:ph type="dt" sz="half" idx="2"/>
           </p:nvPr>
         </p:nvSpPr>
-        <p:spPr>
+        <p:spPr bwMode="auto">
           <a:xfrm>
             <a:off x="457200" y="6356350"/>
             <a:ext cx="2133600" cy="365125"/>
@@ -2734,8 +3347,11 @@
             </a:lvl1pPr>
           </a:lstStyle>
           <a:p>
+            <a:pPr>
+              <a:defRPr/>
+            </a:pPr>
             <a:fld id="{779256A2-DE0C-7447-B687-786F38514E8C}" type="datetimeFigureOut">
-              <a:rPr lang="en-US" smtClean="0"/>
+              <a:rPr lang="en-US"/>
               <a:t>3/21/2024</a:t>
             </a:fld>
             <a:endParaRPr lang="en-US"/>
@@ -2752,7 +3368,7 @@
             <p:ph type="ftr" sz="quarter" idx="3"/>
           </p:nvPr>
         </p:nvSpPr>
-        <p:spPr>
+        <p:spPr bwMode="auto">
           <a:xfrm>
             <a:off x="3124200" y="6356350"/>
             <a:ext cx="2895600" cy="365125"/>
@@ -2775,6 +3391,9 @@
             </a:lvl1pPr>
           </a:lstStyle>
           <a:p>
+            <a:pPr>
+              <a:defRPr/>
+            </a:pPr>
             <a:endParaRPr lang="en-US"/>
           </a:p>
         </p:txBody>
@@ -2789,7 +3408,7 @@
             <p:ph type="sldNum" sz="quarter" idx="4"/>
           </p:nvPr>
         </p:nvSpPr>
-        <p:spPr>
+        <p:spPr bwMode="auto">
           <a:xfrm>
             <a:off x="6553200" y="6356350"/>
             <a:ext cx="2133600" cy="365125"/>
@@ -2812,8 +3431,11 @@
             </a:lvl1pPr>
           </a:lstStyle>
           <a:p>
+            <a:pPr>
+              <a:defRPr/>
+            </a:pPr>
             <a:fld id="{D1E6B054-2327-D043-B7B5-4043E46ED170}" type="slidenum">
-              <a:rPr lang="en-US" smtClean="0"/>
+              <a:rPr lang="en-US"/>
               <a:t>‹#›</a:t>
             </a:fld>
             <a:endParaRPr lang="en-US"/>
@@ -2821,11 +3443,6 @@
         </p:txBody>
       </p:sp>
     </p:spTree>
-    <p:extLst>
-      <p:ext uri="{BB962C8B-B14F-4D97-AF65-F5344CB8AC3E}">
-        <p14:creationId xmlns:p14="http://schemas.microsoft.com/office/powerpoint/2010/main" val="1896066680"/>
-      </p:ext>
-    </p:extLst>
   </p:cSld>
   <p:clrMap bg1="lt1" tx1="dk1" bg2="lt2" tx2="dk2" accent1="accent1" accent2="accent2" accent3="accent3" accent4="accent4" accent5="accent5" accent6="accent6" hlink="hlink" folHlink="folHlink"/>
   <p:sldLayoutIdLst>
@@ -2843,12 +3460,12 @@
   </p:sldLayoutIdLst>
   <p:txStyles>
     <p:titleStyle>
-      <a:lvl1pPr algn="ctr" defTabSz="457200" rtl="0" eaLnBrk="1" latinLnBrk="0" hangingPunct="1">
+      <a:lvl1pPr algn="ctr" defTabSz="457200">
         <a:spcBef>
-          <a:spcPct val="0"/>
+          <a:spcPts val="0"/>
         </a:spcBef>
         <a:buNone/>
-        <a:defRPr sz="4400" kern="1200">
+        <a:defRPr sz="4400">
           <a:solidFill>
             <a:schemeClr val="tx1"/>
           </a:solidFill>
@@ -2859,13 +3476,13 @@
       </a:lvl1pPr>
     </p:titleStyle>
     <p:bodyStyle>
-      <a:lvl1pPr marL="342900" indent="-342900" algn="l" defTabSz="457200" rtl="0" eaLnBrk="1" latinLnBrk="0" hangingPunct="1">
+      <a:lvl1pPr marL="342900" indent="-342900" algn="l" defTabSz="457200">
         <a:spcBef>
-          <a:spcPct val="20000"/>
+          <a:spcPts val="0"/>
         </a:spcBef>
         <a:buFont typeface="Arial"/>
         <a:buChar char="•"/>
-        <a:defRPr sz="3200" kern="1200">
+        <a:defRPr sz="3200">
           <a:solidFill>
             <a:schemeClr val="tx1"/>
           </a:solidFill>
@@ -2874,13 +3491,13 @@
           <a:cs typeface="+mn-cs"/>
         </a:defRPr>
       </a:lvl1pPr>
-      <a:lvl2pPr marL="742950" indent="-285750" algn="l" defTabSz="457200" rtl="0" eaLnBrk="1" latinLnBrk="0" hangingPunct="1">
+      <a:lvl2pPr marL="742950" indent="-285750" algn="l" defTabSz="457200">
         <a:spcBef>
-          <a:spcPct val="20000"/>
+          <a:spcPts val="0"/>
         </a:spcBef>
         <a:buFont typeface="Arial"/>
         <a:buChar char="–"/>
-        <a:defRPr sz="2800" kern="1200">
+        <a:defRPr sz="2800">
           <a:solidFill>
             <a:schemeClr val="tx1"/>
           </a:solidFill>
@@ -2889,13 +3506,13 @@
           <a:cs typeface="+mn-cs"/>
         </a:defRPr>
       </a:lvl2pPr>
-      <a:lvl3pPr marL="1143000" indent="-228600" algn="l" defTabSz="457200" rtl="0" eaLnBrk="1" latinLnBrk="0" hangingPunct="1">
+      <a:lvl3pPr marL="1143000" indent="-228600" algn="l" defTabSz="457200">
         <a:spcBef>
-          <a:spcPct val="20000"/>
+          <a:spcPts val="0"/>
         </a:spcBef>
         <a:buFont typeface="Arial"/>
         <a:buChar char="•"/>
-        <a:defRPr sz="2400" kern="1200">
+        <a:defRPr sz="2400">
           <a:solidFill>
             <a:schemeClr val="tx1"/>
           </a:solidFill>
@@ -2904,13 +3521,13 @@
           <a:cs typeface="+mn-cs"/>
         </a:defRPr>
       </a:lvl3pPr>
-      <a:lvl4pPr marL="1600200" indent="-228600" algn="l" defTabSz="457200" rtl="0" eaLnBrk="1" latinLnBrk="0" hangingPunct="1">
+      <a:lvl4pPr marL="1600200" indent="-228600" algn="l" defTabSz="457200">
         <a:spcBef>
-          <a:spcPct val="20000"/>
+          <a:spcPts val="0"/>
         </a:spcBef>
         <a:buFont typeface="Arial"/>
         <a:buChar char="–"/>
-        <a:defRPr sz="2000" kern="1200">
+        <a:defRPr sz="2000">
           <a:solidFill>
             <a:schemeClr val="tx1"/>
           </a:solidFill>
@@ -2919,13 +3536,13 @@
           <a:cs typeface="+mn-cs"/>
         </a:defRPr>
       </a:lvl4pPr>
-      <a:lvl5pPr marL="2057400" indent="-228600" algn="l" defTabSz="457200" rtl="0" eaLnBrk="1" latinLnBrk="0" hangingPunct="1">
+      <a:lvl5pPr marL="2057400" indent="-228600" algn="l" defTabSz="457200">
         <a:spcBef>
-          <a:spcPct val="20000"/>
+          <a:spcPts val="0"/>
         </a:spcBef>
         <a:buFont typeface="Arial"/>
         <a:buChar char="»"/>
-        <a:defRPr sz="2000" kern="1200">
+        <a:defRPr sz="2000">
           <a:solidFill>
             <a:schemeClr val="tx1"/>
           </a:solidFill>
@@ -2934,13 +3551,13 @@
           <a:cs typeface="+mn-cs"/>
         </a:defRPr>
       </a:lvl5pPr>
-      <a:lvl6pPr marL="2514600" indent="-228600" algn="l" defTabSz="457200" rtl="0" eaLnBrk="1" latinLnBrk="0" hangingPunct="1">
+      <a:lvl6pPr marL="2514600" indent="-228600" algn="l" defTabSz="457200">
         <a:spcBef>
-          <a:spcPct val="20000"/>
+          <a:spcPts val="0"/>
         </a:spcBef>
         <a:buFont typeface="Arial"/>
         <a:buChar char="•"/>
-        <a:defRPr sz="2000" kern="1200">
+        <a:defRPr sz="2000">
           <a:solidFill>
             <a:schemeClr val="tx1"/>
           </a:solidFill>
@@ -2949,13 +3566,13 @@
           <a:cs typeface="+mn-cs"/>
         </a:defRPr>
       </a:lvl6pPr>
-      <a:lvl7pPr marL="2971800" indent="-228600" algn="l" defTabSz="457200" rtl="0" eaLnBrk="1" latinLnBrk="0" hangingPunct="1">
+      <a:lvl7pPr marL="2971800" indent="-228600" algn="l" defTabSz="457200">
         <a:spcBef>
-          <a:spcPct val="20000"/>
+          <a:spcPts val="0"/>
         </a:spcBef>
         <a:buFont typeface="Arial"/>
         <a:buChar char="•"/>
-        <a:defRPr sz="2000" kern="1200">
+        <a:defRPr sz="2000">
           <a:solidFill>
             <a:schemeClr val="tx1"/>
           </a:solidFill>
@@ -2964,13 +3581,13 @@
           <a:cs typeface="+mn-cs"/>
         </a:defRPr>
       </a:lvl7pPr>
-      <a:lvl8pPr marL="3429000" indent="-228600" algn="l" defTabSz="457200" rtl="0" eaLnBrk="1" latinLnBrk="0" hangingPunct="1">
+      <a:lvl8pPr marL="3429000" indent="-228600" algn="l" defTabSz="457200">
         <a:spcBef>
-          <a:spcPct val="20000"/>
+          <a:spcPts val="0"/>
         </a:spcBef>
         <a:buFont typeface="Arial"/>
         <a:buChar char="•"/>
-        <a:defRPr sz="2000" kern="1200">
+        <a:defRPr sz="2000">
           <a:solidFill>
             <a:schemeClr val="tx1"/>
           </a:solidFill>
@@ -2979,13 +3596,13 @@
           <a:cs typeface="+mn-cs"/>
         </a:defRPr>
       </a:lvl8pPr>
-      <a:lvl9pPr marL="3886200" indent="-228600" algn="l" defTabSz="457200" rtl="0" eaLnBrk="1" latinLnBrk="0" hangingPunct="1">
+      <a:lvl9pPr marL="3886200" indent="-228600" algn="l" defTabSz="457200">
         <a:spcBef>
-          <a:spcPct val="20000"/>
+          <a:spcPts val="0"/>
         </a:spcBef>
         <a:buFont typeface="Arial"/>
         <a:buChar char="•"/>
-        <a:defRPr sz="2000" kern="1200">
+        <a:defRPr sz="2000">
           <a:solidFill>
             <a:schemeClr val="tx1"/>
           </a:solidFill>
@@ -2999,8 +3616,8 @@
       <a:defPPr>
         <a:defRPr lang="en-US"/>
       </a:defPPr>
-      <a:lvl1pPr marL="0" algn="l" defTabSz="457200" rtl="0" eaLnBrk="1" latinLnBrk="0" hangingPunct="1">
-        <a:defRPr sz="1800" kern="1200">
+      <a:lvl1pPr marL="0" algn="l" defTabSz="457200">
+        <a:defRPr sz="1800">
           <a:solidFill>
             <a:schemeClr val="tx1"/>
           </a:solidFill>
@@ -3009,8 +3626,8 @@
           <a:cs typeface="+mn-cs"/>
         </a:defRPr>
       </a:lvl1pPr>
-      <a:lvl2pPr marL="457200" algn="l" defTabSz="457200" rtl="0" eaLnBrk="1" latinLnBrk="0" hangingPunct="1">
-        <a:defRPr sz="1800" kern="1200">
+      <a:lvl2pPr marL="457200" algn="l" defTabSz="457200">
+        <a:defRPr sz="1800">
           <a:solidFill>
             <a:schemeClr val="tx1"/>
           </a:solidFill>
@@ -3019,8 +3636,8 @@
           <a:cs typeface="+mn-cs"/>
         </a:defRPr>
       </a:lvl2pPr>
-      <a:lvl3pPr marL="914400" algn="l" defTabSz="457200" rtl="0" eaLnBrk="1" latinLnBrk="0" hangingPunct="1">
-        <a:defRPr sz="1800" kern="1200">
+      <a:lvl3pPr marL="914400" algn="l" defTabSz="457200">
+        <a:defRPr sz="1800">
           <a:solidFill>
             <a:schemeClr val="tx1"/>
           </a:solidFill>
@@ -3029,8 +3646,8 @@
           <a:cs typeface="+mn-cs"/>
         </a:defRPr>
       </a:lvl3pPr>
-      <a:lvl4pPr marL="1371600" algn="l" defTabSz="457200" rtl="0" eaLnBrk="1" latinLnBrk="0" hangingPunct="1">
-        <a:defRPr sz="1800" kern="1200">
+      <a:lvl4pPr marL="1371600" algn="l" defTabSz="457200">
+        <a:defRPr sz="1800">
           <a:solidFill>
             <a:schemeClr val="tx1"/>
           </a:solidFill>
@@ -3039,8 +3656,8 @@
           <a:cs typeface="+mn-cs"/>
         </a:defRPr>
       </a:lvl4pPr>
-      <a:lvl5pPr marL="1828800" algn="l" defTabSz="457200" rtl="0" eaLnBrk="1" latinLnBrk="0" hangingPunct="1">
-        <a:defRPr sz="1800" kern="1200">
+      <a:lvl5pPr marL="1828800" algn="l" defTabSz="457200">
+        <a:defRPr sz="1800">
           <a:solidFill>
             <a:schemeClr val="tx1"/>
           </a:solidFill>
@@ -3049,8 +3666,8 @@
           <a:cs typeface="+mn-cs"/>
         </a:defRPr>
       </a:lvl5pPr>
-      <a:lvl6pPr marL="2286000" algn="l" defTabSz="457200" rtl="0" eaLnBrk="1" latinLnBrk="0" hangingPunct="1">
-        <a:defRPr sz="1800" kern="1200">
+      <a:lvl6pPr marL="2286000" algn="l" defTabSz="457200">
+        <a:defRPr sz="1800">
           <a:solidFill>
             <a:schemeClr val="tx1"/>
           </a:solidFill>
@@ -3059,8 +3676,8 @@
           <a:cs typeface="+mn-cs"/>
         </a:defRPr>
       </a:lvl6pPr>
-      <a:lvl7pPr marL="2743200" algn="l" defTabSz="457200" rtl="0" eaLnBrk="1" latinLnBrk="0" hangingPunct="1">
-        <a:defRPr sz="1800" kern="1200">
+      <a:lvl7pPr marL="2743200" algn="l" defTabSz="457200">
+        <a:defRPr sz="1800">
           <a:solidFill>
             <a:schemeClr val="tx1"/>
           </a:solidFill>
@@ -3069,8 +3686,8 @@
           <a:cs typeface="+mn-cs"/>
         </a:defRPr>
       </a:lvl7pPr>
-      <a:lvl8pPr marL="3200400" algn="l" defTabSz="457200" rtl="0" eaLnBrk="1" latinLnBrk="0" hangingPunct="1">
-        <a:defRPr sz="1800" kern="1200">
+      <a:lvl8pPr marL="3200400" algn="l" defTabSz="457200">
+        <a:defRPr sz="1800">
           <a:solidFill>
             <a:schemeClr val="tx1"/>
           </a:solidFill>
@@ -3079,8 +3696,8 @@
           <a:cs typeface="+mn-cs"/>
         </a:defRPr>
       </a:lvl8pPr>
-      <a:lvl9pPr marL="3657600" algn="l" defTabSz="457200" rtl="0" eaLnBrk="1" latinLnBrk="0" hangingPunct="1">
-        <a:defRPr sz="1800" kern="1200">
+      <a:lvl9pPr marL="3657600" algn="l" defTabSz="457200">
+        <a:defRPr sz="1800">
           <a:solidFill>
             <a:schemeClr val="tx1"/>
           </a:solidFill>
@@ -3095,15 +3712,15 @@
 </file>
 
 <file path=ppt/slides/slide1.xml><?xml version="1.0" encoding="utf-8"?>
-<p:sld xmlns:a="http://schemas.openxmlformats.org/drawingml/2006/main" xmlns:r="http://schemas.openxmlformats.org/officeDocument/2006/relationships" xmlns:p="http://schemas.openxmlformats.org/presentationml/2006/main">
-  <p:cSld>
+<p:sld xmlns:a="http://schemas.openxmlformats.org/drawingml/2006/main" xmlns:r="http://schemas.openxmlformats.org/officeDocument/2006/relationships" xmlns:p="http://schemas.openxmlformats.org/presentationml/2006/main" xmlns:m="http://schemas.openxmlformats.org/officeDocument/2006/math" xmlns:w="http://schemas.openxmlformats.org/wordprocessingml/2006/main" showMasterPhAnim="0" show="1">
+  <p:cSld name="">
     <p:spTree>
       <p:nvGrpSpPr>
         <p:cNvPr id="1" name=""/>
         <p:cNvGrpSpPr/>
         <p:nvPr/>
       </p:nvGrpSpPr>
-      <p:grpSpPr>
+      <p:grpSpPr bwMode="auto">
         <a:xfrm>
           <a:off x="0" y="0"/>
           <a:ext cx="0" cy="0"/>
@@ -3117,12 +3734,12 @@
           <p:cNvGrpSpPr/>
           <p:nvPr/>
         </p:nvGrpSpPr>
-        <p:grpSpPr>
+        <p:grpSpPr bwMode="auto">
           <a:xfrm>
-            <a:off x="189913" y="483129"/>
-            <a:ext cx="8858711" cy="2069735"/>
-            <a:chOff x="189913" y="2564371"/>
-            <a:chExt cx="8858711" cy="2069735"/>
+            <a:off x="189912" y="483129"/>
+            <a:ext cx="8858710" cy="2069734"/>
+            <a:chOff x="0" y="0"/>
+            <a:chExt cx="8858710" cy="2069734"/>
           </a:xfrm>
         </p:grpSpPr>
         <p:grpSp>
@@ -3131,12 +3748,12 @@
             <p:cNvGrpSpPr/>
             <p:nvPr/>
           </p:nvGrpSpPr>
-          <p:grpSpPr>
+          <p:grpSpPr bwMode="auto">
             <a:xfrm>
-              <a:off x="189913" y="3387736"/>
-              <a:ext cx="8858711" cy="1246370"/>
-              <a:chOff x="189913" y="1721177"/>
-              <a:chExt cx="8858711" cy="1246370"/>
+              <a:off x="0" y="823365"/>
+              <a:ext cx="8858710" cy="1246369"/>
+              <a:chOff x="0" y="0"/>
+              <a:chExt cx="8858710" cy="1246369"/>
             </a:xfrm>
           </p:grpSpPr>
           <p:grpSp>
@@ -3145,12 +3762,12 @@
               <p:cNvGrpSpPr/>
               <p:nvPr/>
             </p:nvGrpSpPr>
-            <p:grpSpPr>
+            <p:grpSpPr bwMode="auto">
               <a:xfrm>
-                <a:off x="189913" y="1721177"/>
-                <a:ext cx="1246302" cy="1246370"/>
-                <a:chOff x="1436215" y="1721177"/>
-                <a:chExt cx="1246302" cy="1246370"/>
+                <a:off x="0" y="0"/>
+                <a:ext cx="1246302" cy="1246369"/>
+                <a:chOff x="0" y="0"/>
+                <a:chExt cx="1246302" cy="1246369"/>
               </a:xfrm>
             </p:grpSpPr>
             <p:sp>
@@ -3159,9 +3776,9 @@
                 <p:cNvSpPr/>
                 <p:nvPr/>
               </p:nvSpPr>
-              <p:spPr>
+              <p:spPr bwMode="auto">
                 <a:xfrm>
-                  <a:off x="1436215" y="1721177"/>
+                  <a:off x="0" y="0"/>
                   <a:ext cx="1246302" cy="1246370"/>
                 </a:xfrm>
                 <a:prstGeom prst="ellipse">
@@ -3193,7 +3810,9 @@
                 <a:bodyPr rtlCol="0" anchor="ctr"/>
                 <a:lstStyle/>
                 <a:p>
-                  <a:pPr algn="ctr"/>
+                  <a:pPr algn="ctr">
+                    <a:defRPr/>
+                  </a:pPr>
                   <a:endParaRPr lang="en-US"/>
                 </a:p>
               </p:txBody>
@@ -3204,9 +3823,9 @@
                 <p:cNvSpPr txBox="1"/>
                 <p:nvPr/>
               </p:nvSpPr>
-              <p:spPr>
+              <p:spPr bwMode="auto">
                 <a:xfrm>
-                  <a:off x="1673605" y="2052185"/>
+                  <a:off x="237389" y="331007"/>
                   <a:ext cx="762949" cy="461665"/>
                 </a:xfrm>
                 <a:prstGeom prst="rect">
@@ -3220,13 +3839,17 @@
                 </a:bodyPr>
                 <a:lstStyle/>
                 <a:p>
+                  <a:pPr>
+                    <a:defRPr/>
+                  </a:pPr>
                   <a:r>
-                    <a:rPr lang="en-US" sz="2400" dirty="0">
+                    <a:rPr lang="en-US" sz="2400">
                       <a:latin typeface="Times New Roman"/>
                       <a:cs typeface="Times New Roman"/>
                     </a:rPr>
                     <a:t>User</a:t>
                   </a:r>
+                  <a:endParaRPr/>
                 </a:p>
               </p:txBody>
             </p:sp>
@@ -3237,12 +3860,12 @@
               <p:cNvGrpSpPr/>
               <p:nvPr/>
             </p:nvGrpSpPr>
-            <p:grpSpPr>
+            <p:grpSpPr bwMode="auto">
               <a:xfrm>
-                <a:off x="7802322" y="1721177"/>
-                <a:ext cx="1246302" cy="1246370"/>
-                <a:chOff x="1436215" y="1721177"/>
-                <a:chExt cx="1246302" cy="1246370"/>
+                <a:off x="7612408" y="0"/>
+                <a:ext cx="1246302" cy="1246369"/>
+                <a:chOff x="0" y="0"/>
+                <a:chExt cx="1246302" cy="1246369"/>
               </a:xfrm>
             </p:grpSpPr>
             <p:sp>
@@ -3251,9 +3874,9 @@
                 <p:cNvSpPr/>
                 <p:nvPr/>
               </p:nvSpPr>
-              <p:spPr>
+              <p:spPr bwMode="auto">
                 <a:xfrm>
-                  <a:off x="1436215" y="1721177"/>
+                  <a:off x="0" y="0"/>
                   <a:ext cx="1246302" cy="1246370"/>
                 </a:xfrm>
                 <a:prstGeom prst="ellipse">
@@ -3285,7 +3908,9 @@
                 <a:bodyPr rtlCol="0" anchor="ctr"/>
                 <a:lstStyle/>
                 <a:p>
-                  <a:pPr algn="ctr"/>
+                  <a:pPr algn="ctr">
+                    <a:defRPr/>
+                  </a:pPr>
                   <a:endParaRPr lang="en-US"/>
                 </a:p>
               </p:txBody>
@@ -3296,9 +3921,9 @@
                 <p:cNvSpPr txBox="1"/>
                 <p:nvPr/>
               </p:nvSpPr>
-              <p:spPr>
+              <p:spPr bwMode="auto">
                 <a:xfrm>
-                  <a:off x="1595868" y="2052185"/>
+                  <a:off x="159652" y="331007"/>
                   <a:ext cx="936475" cy="461665"/>
                 </a:xfrm>
                 <a:prstGeom prst="rect">
@@ -3312,13 +3937,17 @@
                 </a:bodyPr>
                 <a:lstStyle/>
                 <a:p>
+                  <a:pPr>
+                    <a:defRPr/>
+                  </a:pPr>
                   <a:r>
-                    <a:rPr lang="en-US" sz="2400" dirty="0">
+                    <a:rPr lang="en-US" sz="2400">
                       <a:latin typeface="Times New Roman"/>
                       <a:cs typeface="Times New Roman"/>
                     </a:rPr>
                     <a:t>Saved</a:t>
                   </a:r>
+                  <a:endParaRPr/>
                 </a:p>
               </p:txBody>
             </p:sp>
@@ -3330,12 +3959,12 @@
             <p:cNvGrpSpPr/>
             <p:nvPr/>
           </p:nvGrpSpPr>
-          <p:grpSpPr>
+          <p:grpSpPr bwMode="auto">
             <a:xfrm>
-              <a:off x="3851314" y="3381165"/>
-              <a:ext cx="1552028" cy="1246370"/>
-              <a:chOff x="3669130" y="1721177"/>
-              <a:chExt cx="1552028" cy="1246370"/>
+              <a:off x="3661400" y="816793"/>
+              <a:ext cx="1552027" cy="1246369"/>
+              <a:chOff x="0" y="0"/>
+              <a:chExt cx="1552027" cy="1246369"/>
             </a:xfrm>
           </p:grpSpPr>
           <p:sp>
@@ -3344,9 +3973,9 @@
               <p:cNvSpPr/>
               <p:nvPr/>
             </p:nvSpPr>
-            <p:spPr>
+            <p:spPr bwMode="auto">
               <a:xfrm>
-                <a:off x="3703297" y="1721177"/>
+                <a:off x="34166" y="0"/>
                 <a:ext cx="1483694" cy="1246370"/>
               </a:xfrm>
               <a:prstGeom prst="rect">
@@ -3378,11 +4007,14 @@
               <a:bodyPr rtlCol="0" anchor="ctr"/>
               <a:lstStyle/>
               <a:p>
-                <a:pPr algn="ctr"/>
+                <a:pPr algn="ctr">
+                  <a:defRPr/>
+                </a:pPr>
                 <a:r>
                   <a:rPr lang="en-US"/>
                   <a:t>`</a:t>
                 </a:r>
+                <a:endParaRPr/>
               </a:p>
             </p:txBody>
           </p:sp>
@@ -3392,9 +4024,9 @@
               <p:cNvSpPr txBox="1"/>
               <p:nvPr/>
             </p:nvSpPr>
-            <p:spPr>
+            <p:spPr bwMode="auto">
               <a:xfrm>
-                <a:off x="3669130" y="1927152"/>
+                <a:off x="0" y="205974"/>
                 <a:ext cx="1552028" cy="461665"/>
               </a:xfrm>
               <a:prstGeom prst="rect">
@@ -3408,14 +4040,17 @@
               </a:bodyPr>
               <a:lstStyle/>
               <a:p>
+                <a:pPr>
+                  <a:defRPr/>
+                </a:pPr>
                 <a:r>
-                  <a:rPr lang="en-US" sz="2400" dirty="0" err="1">
+                  <a:rPr lang="en-US" sz="2400">
                     <a:latin typeface="Times New Roman"/>
                     <a:cs typeface="Times New Roman"/>
                   </a:rPr>
                   <a:t>SynthEddy</a:t>
                 </a:r>
-                <a:endParaRPr lang="en-US" sz="2400" dirty="0">
+                <a:endParaRPr lang="en-US" sz="2400">
                   <a:latin typeface="Times New Roman"/>
                   <a:cs typeface="Times New Roman"/>
                 </a:endParaRPr>
@@ -3427,14 +4062,15 @@
           <p:nvCxnSpPr>
             <p:cNvPr id="25" name="Straight Arrow Connector 24"/>
             <p:cNvCxnSpPr>
+              <a:cxnSpLocks/>
               <a:stCxn id="4" idx="6"/>
               <a:endCxn id="18" idx="1"/>
             </p:cNvCxnSpPr>
             <p:nvPr/>
           </p:nvCxnSpPr>
-          <p:spPr>
+          <p:spPr bwMode="auto">
             <a:xfrm flipV="1">
-              <a:off x="1436215" y="4004350"/>
+              <a:off x="1246302" y="1439978"/>
               <a:ext cx="2449266" cy="6571"/>
             </a:xfrm>
             <a:prstGeom prst="straightConnector1">
@@ -3466,12 +4102,14 @@
         <p:cxnSp>
           <p:nvCxnSpPr>
             <p:cNvPr id="27" name="Straight Arrow Connector 26"/>
-            <p:cNvCxnSpPr/>
+            <p:cNvCxnSpPr>
+              <a:cxnSpLocks/>
+            </p:cNvCxnSpPr>
             <p:nvPr/>
           </p:nvCxnSpPr>
-          <p:spPr>
+          <p:spPr bwMode="auto">
             <a:xfrm>
-              <a:off x="5369175" y="4010921"/>
+              <a:off x="5179261" y="1446549"/>
               <a:ext cx="2449266" cy="0"/>
             </a:xfrm>
             <a:prstGeom prst="straightConnector1">
@@ -3506,10 +4144,10 @@
             <p:cNvSpPr txBox="1"/>
             <p:nvPr/>
           </p:nvSpPr>
-          <p:spPr>
+          <p:spPr bwMode="auto">
             <a:xfrm>
-              <a:off x="1459432" y="2564371"/>
-              <a:ext cx="2307042" cy="1446550"/>
+              <a:off x="1269518" y="0"/>
+              <a:ext cx="2378589" cy="1432919"/>
             </a:xfrm>
             <a:prstGeom prst="rect">
               <a:avLst/>
@@ -3522,49 +4160,89 @@
             </a:bodyPr>
             <a:lstStyle/>
             <a:p>
+              <a:pPr>
+                <a:defRPr/>
+              </a:pPr>
               <a:r>
-                <a:rPr lang="en-US" dirty="0">
+                <a:rPr lang="en-US">
                   <a:latin typeface="Times New Roman"/>
                   <a:cs typeface="Times New Roman"/>
                 </a:rPr>
                 <a:t>Inputs: </a:t>
               </a:r>
+              <a:endParaRPr/>
             </a:p>
             <a:p>
+              <a:pPr>
+                <a:defRPr/>
+              </a:pPr>
               <a:r>
-                <a:rPr lang="en-US" dirty="0">
+                <a:rPr lang="en-US">
                   <a:latin typeface="Times New Roman"/>
                   <a:cs typeface="Times New Roman"/>
                 </a:rPr>
                 <a:t>Flow field dimensions,</a:t>
               </a:r>
+              <a:endParaRPr/>
             </a:p>
             <a:p>
+              <a:pPr>
+                <a:defRPr/>
+              </a:pPr>
               <a:r>
-                <a:rPr lang="en-US" dirty="0">
+                <a:rPr lang="en-US">
                   <a:latin typeface="Times New Roman"/>
                   <a:cs typeface="Times New Roman"/>
                 </a:rPr>
-                <a:t>Avg flow velocity,</a:t>
+                <a:t>Mean flow velocity,</a:t>
               </a:r>
+              <a:endParaRPr/>
             </a:p>
             <a:p>
+              <a:pPr>
+                <a:defRPr/>
+              </a:pPr>
               <a:r>
-                <a:rPr lang="en-US" dirty="0">
+                <a:rPr lang="en-US">
                   <a:latin typeface="Times New Roman"/>
                   <a:cs typeface="Times New Roman"/>
                 </a:rPr>
                 <a:t>Eddy profiles </a:t>
               </a:r>
-            </a:p>
-            <a:p>
               <a:r>
-                <a:rPr lang="en-US" sz="1600" dirty="0">
+                <a:rPr lang="en-US" sz="1600">
                   <a:latin typeface="Times New Roman"/>
                   <a:cs typeface="Times New Roman"/>
                 </a:rPr>
-                <a:t>(intensity and scale)</a:t>
+                <a:t>(density,</a:t>
               </a:r>
+              <a:endParaRPr lang="en-US" sz="1600">
+                <a:latin typeface="Times New Roman"/>
+                <a:cs typeface="Times New Roman"/>
+              </a:endParaRPr>
+            </a:p>
+            <a:p>
+              <a:pPr>
+                <a:defRPr/>
+              </a:pPr>
+              <a:r>
+                <a:rPr lang="en-US" sz="1600">
+                  <a:latin typeface="Times New Roman"/>
+                  <a:cs typeface="Times New Roman"/>
+                </a:rPr>
+                <a:t>intensity, </a:t>
+              </a:r>
+              <a:r>
+                <a:rPr lang="en-US" sz="1600">
+                  <a:latin typeface="Times New Roman"/>
+                  <a:cs typeface="Times New Roman"/>
+                </a:rPr>
+                <a:t>and length-scale)</a:t>
+              </a:r>
+              <a:endParaRPr lang="en-US" sz="1600">
+                <a:latin typeface="Times New Roman"/>
+                <a:cs typeface="Times New Roman"/>
+              </a:endParaRPr>
             </a:p>
           </p:txBody>
         </p:sp>
@@ -3574,10 +4252,10 @@
             <p:cNvSpPr txBox="1"/>
             <p:nvPr/>
           </p:nvSpPr>
-          <p:spPr>
+          <p:spPr bwMode="auto">
             <a:xfrm>
-              <a:off x="5573022" y="2754696"/>
-              <a:ext cx="2003497" cy="1200329"/>
+              <a:off x="5383108" y="190324"/>
+              <a:ext cx="2265653" cy="1189079"/>
             </a:xfrm>
             <a:prstGeom prst="rect">
               <a:avLst/>
@@ -3590,68 +4268,93 @@
             </a:bodyPr>
             <a:lstStyle/>
             <a:p>
+              <a:pPr>
+                <a:defRPr/>
+              </a:pPr>
               <a:r>
-                <a:rPr lang="en-US" dirty="0">
+                <a:rPr lang="en-US">
                   <a:latin typeface="Times New Roman"/>
                   <a:cs typeface="Times New Roman"/>
                 </a:rPr>
                 <a:t>Outputs: </a:t>
               </a:r>
+              <a:endParaRPr/>
             </a:p>
             <a:p>
+              <a:pPr>
+                <a:defRPr/>
+              </a:pPr>
               <a:r>
-                <a:rPr lang="en-US" dirty="0">
+                <a:rPr lang="en-US">
                   <a:latin typeface="Times New Roman"/>
                   <a:cs typeface="Times New Roman"/>
                 </a:rPr>
-                <a:t>Intensity, scale and </a:t>
+                <a:t>Intensity vector, </a:t>
               </a:r>
-              <a:br>
-                <a:rPr lang="en-US" dirty="0">
+              <a:endParaRPr lang="en-US">
+                <a:latin typeface="Times New Roman"/>
+                <a:cs typeface="Times New Roman"/>
+              </a:endParaRPr>
+            </a:p>
+            <a:p>
+              <a:pPr>
+                <a:defRPr/>
+              </a:pPr>
+              <a:r>
+                <a:rPr lang="en-US">
                   <a:latin typeface="Times New Roman"/>
                   <a:cs typeface="Times New Roman"/>
                 </a:rPr>
-              </a:br>
+                <a:t>length-scale and </a:t>
+              </a:r>
               <a:r>
-                <a:rPr lang="en-US" dirty="0">
+                <a:rPr lang="en-US">
                   <a:latin typeface="Times New Roman"/>
                   <a:cs typeface="Times New Roman"/>
                 </a:rPr>
-                <a:t>initial position </a:t>
+                <a:t>initial </a:t>
               </a:r>
-              <a:br>
-                <a:rPr lang="en-US" dirty="0">
+              <a:endParaRPr lang="en-US">
+                <a:latin typeface="Times New Roman"/>
+                <a:cs typeface="Times New Roman"/>
+              </a:endParaRPr>
+            </a:p>
+            <a:p>
+              <a:pPr>
+                <a:defRPr/>
+              </a:pPr>
+              <a:r>
+                <a:rPr lang="en-US">
                   <a:latin typeface="Times New Roman"/>
                   <a:cs typeface="Times New Roman"/>
                 </a:rPr>
-              </a:br>
+                <a:t>position </a:t>
+              </a:r>
               <a:r>
-                <a:rPr lang="en-US" dirty="0">
+                <a:rPr lang="en-US">
                   <a:latin typeface="Times New Roman"/>
                   <a:cs typeface="Times New Roman"/>
                 </a:rPr>
                 <a:t>of each eddy</a:t>
               </a:r>
+              <a:endParaRPr lang="en-US">
+                <a:latin typeface="Times New Roman"/>
+                <a:cs typeface="Times New Roman"/>
+              </a:endParaRPr>
             </a:p>
           </p:txBody>
         </p:sp>
       </p:grpSp>
       <p:sp>
         <p:nvSpPr>
-          <p:cNvPr id="3" name="TextBox 2">
-            <a:extLst>
-              <a:ext uri="{FF2B5EF4-FFF2-40B4-BE49-F238E27FC236}">
-                <a16:creationId xmlns:a16="http://schemas.microsoft.com/office/drawing/2014/main" id="{0152B9A9-F873-1FC7-4BE2-443523239136}"/>
-              </a:ext>
-            </a:extLst>
-          </p:cNvPr>
+          <p:cNvPr id="3" name="TextBox 2"/>
           <p:cNvSpPr txBox="1"/>
           <p:nvPr/>
         </p:nvSpPr>
-        <p:spPr>
+        <p:spPr bwMode="auto">
           <a:xfrm>
             <a:off x="3876962" y="1993653"/>
-            <a:ext cx="1526380" cy="523220"/>
+            <a:ext cx="1526379" cy="523220"/>
           </a:xfrm>
           <a:prstGeom prst="rect">
             <a:avLst/>
@@ -3664,43 +4367,40 @@
           </a:bodyPr>
           <a:lstStyle/>
           <a:p>
-            <a:pPr algn="ctr"/>
-            <a:r>
-              <a:rPr lang="en-US" sz="1400" dirty="0">
+            <a:pPr algn="ctr">
+              <a:defRPr/>
+            </a:pPr>
+            <a:r>
+              <a:rPr lang="en-US" sz="1400">
                 <a:latin typeface="Times New Roman"/>
                 <a:cs typeface="Times New Roman"/>
               </a:rPr>
               <a:t>Field Construction</a:t>
             </a:r>
             <a:br>
-              <a:rPr lang="en-US" sz="1400" dirty="0">
+              <a:rPr lang="en-US" sz="1400">
                 <a:latin typeface="Times New Roman"/>
                 <a:cs typeface="Times New Roman"/>
               </a:rPr>
             </a:br>
             <a:r>
-              <a:rPr lang="en-US" sz="1400" dirty="0">
+              <a:rPr lang="en-US" sz="1400">
                 <a:latin typeface="Times New Roman"/>
                 <a:cs typeface="Times New Roman"/>
               </a:rPr>
               <a:t>Mode</a:t>
             </a:r>
+            <a:endParaRPr/>
           </a:p>
         </p:txBody>
       </p:sp>
       <p:grpSp>
         <p:nvGrpSpPr>
-          <p:cNvPr id="11" name="Group 10">
-            <a:extLst>
-              <a:ext uri="{FF2B5EF4-FFF2-40B4-BE49-F238E27FC236}">
-                <a16:creationId xmlns:a16="http://schemas.microsoft.com/office/drawing/2014/main" id="{039CE3A7-B919-AFC6-A569-1A099AD40806}"/>
-              </a:ext>
-            </a:extLst>
-          </p:cNvPr>
+          <p:cNvPr id="11" name="Group 10"/>
           <p:cNvGrpSpPr/>
           <p:nvPr/>
         </p:nvGrpSpPr>
-        <p:grpSpPr>
+        <p:grpSpPr bwMode="auto">
           <a:xfrm>
             <a:off x="192139" y="3977200"/>
             <a:ext cx="8858711" cy="1580877"/>
@@ -3710,17 +4410,11 @@
         </p:grpSpPr>
         <p:grpSp>
           <p:nvGrpSpPr>
-            <p:cNvPr id="12" name="Group 11">
-              <a:extLst>
-                <a:ext uri="{FF2B5EF4-FFF2-40B4-BE49-F238E27FC236}">
-                  <a16:creationId xmlns:a16="http://schemas.microsoft.com/office/drawing/2014/main" id="{D8AC7D9C-B34F-3C62-A619-C0CBD49D80EA}"/>
-                </a:ext>
-              </a:extLst>
-            </p:cNvPr>
+            <p:cNvPr id="12" name="Group 11"/>
             <p:cNvGrpSpPr/>
             <p:nvPr/>
           </p:nvGrpSpPr>
-          <p:grpSpPr>
+          <p:grpSpPr bwMode="auto">
             <a:xfrm>
               <a:off x="189913" y="3387736"/>
               <a:ext cx="8858711" cy="1246370"/>
@@ -3730,17 +4424,11 @@
           </p:grpSpPr>
           <p:grpSp>
             <p:nvGrpSpPr>
-              <p:cNvPr id="23" name="Group 22">
-                <a:extLst>
-                  <a:ext uri="{FF2B5EF4-FFF2-40B4-BE49-F238E27FC236}">
-                    <a16:creationId xmlns:a16="http://schemas.microsoft.com/office/drawing/2014/main" id="{637D060B-E739-92F5-DF8A-721539B78303}"/>
-                  </a:ext>
-                </a:extLst>
-              </p:cNvPr>
+              <p:cNvPr id="23" name="Group 22"/>
               <p:cNvGrpSpPr/>
               <p:nvPr/>
             </p:nvGrpSpPr>
-            <p:grpSpPr>
+            <p:grpSpPr bwMode="auto">
               <a:xfrm>
                 <a:off x="189913" y="1721177"/>
                 <a:ext cx="1246302" cy="1246370"/>
@@ -3750,17 +4438,11 @@
             </p:grpSpPr>
             <p:sp>
               <p:nvSpPr>
-                <p:cNvPr id="29" name="Oval 28">
-                  <a:extLst>
-                    <a:ext uri="{FF2B5EF4-FFF2-40B4-BE49-F238E27FC236}">
-                      <a16:creationId xmlns:a16="http://schemas.microsoft.com/office/drawing/2014/main" id="{A1EEB837-7886-C9BB-82C7-CFC59875DDB8}"/>
-                    </a:ext>
-                  </a:extLst>
-                </p:cNvPr>
+                <p:cNvPr id="29" name="Oval 28"/>
                 <p:cNvSpPr/>
                 <p:nvPr/>
               </p:nvSpPr>
-              <p:spPr>
+              <p:spPr bwMode="auto">
                 <a:xfrm>
                   <a:off x="1436215" y="1721177"/>
                   <a:ext cx="1246302" cy="1246370"/>
@@ -3794,24 +4476,20 @@
                 <a:bodyPr rtlCol="0" anchor="ctr"/>
                 <a:lstStyle/>
                 <a:p>
-                  <a:pPr algn="ctr"/>
+                  <a:pPr algn="ctr">
+                    <a:defRPr/>
+                  </a:pPr>
                   <a:endParaRPr lang="en-US"/>
                 </a:p>
               </p:txBody>
             </p:sp>
             <p:sp>
               <p:nvSpPr>
-                <p:cNvPr id="30" name="TextBox 29">
-                  <a:extLst>
-                    <a:ext uri="{FF2B5EF4-FFF2-40B4-BE49-F238E27FC236}">
-                      <a16:creationId xmlns:a16="http://schemas.microsoft.com/office/drawing/2014/main" id="{F81C05D0-E59E-00FD-C84B-52A092AE94D7}"/>
-                    </a:ext>
-                  </a:extLst>
-                </p:cNvPr>
+                <p:cNvPr id="30" name="TextBox 29"/>
                 <p:cNvSpPr txBox="1"/>
                 <p:nvPr/>
               </p:nvSpPr>
-              <p:spPr>
+              <p:spPr bwMode="auto">
                 <a:xfrm>
                   <a:off x="1660758" y="1737563"/>
                   <a:ext cx="784189" cy="1200329"/>
@@ -3827,49 +4505,54 @@
                 </a:bodyPr>
                 <a:lstStyle/>
                 <a:p>
+                  <a:pPr>
+                    <a:defRPr/>
+                  </a:pPr>
                   <a:r>
-                    <a:rPr lang="en-US" sz="2400" dirty="0">
+                    <a:rPr lang="en-US" sz="2400">
                       <a:latin typeface="Times New Roman"/>
                       <a:cs typeface="Times New Roman"/>
                     </a:rPr>
                     <a:t>User</a:t>
                   </a:r>
+                  <a:endParaRPr/>
                 </a:p>
                 <a:p>
-                  <a:pPr algn="ctr"/>
+                  <a:pPr algn="ctr">
+                    <a:defRPr/>
+                  </a:pPr>
                   <a:r>
-                    <a:rPr lang="en-US" sz="2400" dirty="0">
+                    <a:rPr lang="en-US" sz="2400">
                       <a:latin typeface="Times New Roman"/>
                       <a:cs typeface="Times New Roman"/>
                     </a:rPr>
                     <a:t>or</a:t>
                   </a:r>
+                  <a:endParaRPr/>
                 </a:p>
                 <a:p>
+                  <a:pPr>
+                    <a:defRPr/>
+                  </a:pPr>
                   <a:r>
-                    <a:rPr lang="en-US" sz="2400" dirty="0">
+                    <a:rPr lang="en-US" sz="2400">
                       <a:latin typeface="Times New Roman"/>
                       <a:cs typeface="Times New Roman"/>
                     </a:rPr>
                     <a:t>CFD</a:t>
                   </a:r>
+                  <a:endParaRPr/>
                 </a:p>
               </p:txBody>
             </p:sp>
           </p:grpSp>
           <p:grpSp>
             <p:nvGrpSpPr>
-              <p:cNvPr id="24" name="Group 23">
-                <a:extLst>
-                  <a:ext uri="{FF2B5EF4-FFF2-40B4-BE49-F238E27FC236}">
-                    <a16:creationId xmlns:a16="http://schemas.microsoft.com/office/drawing/2014/main" id="{74E9B68D-1EC2-17BE-CC6F-94634F1D3D04}"/>
-                  </a:ext>
-                </a:extLst>
-              </p:cNvPr>
+              <p:cNvPr id="24" name="Group 23"/>
               <p:cNvGrpSpPr/>
               <p:nvPr/>
             </p:nvGrpSpPr>
-            <p:grpSpPr>
+            <p:grpSpPr bwMode="auto">
               <a:xfrm>
                 <a:off x="7802322" y="1721177"/>
                 <a:ext cx="1246302" cy="1246370"/>
@@ -3879,17 +4562,11 @@
             </p:grpSpPr>
             <p:sp>
               <p:nvSpPr>
-                <p:cNvPr id="26" name="Oval 25">
-                  <a:extLst>
-                    <a:ext uri="{FF2B5EF4-FFF2-40B4-BE49-F238E27FC236}">
-                      <a16:creationId xmlns:a16="http://schemas.microsoft.com/office/drawing/2014/main" id="{1246B490-44BE-2CFF-7A9C-E339CC13D788}"/>
-                    </a:ext>
-                  </a:extLst>
-                </p:cNvPr>
+                <p:cNvPr id="26" name="Oval 25"/>
                 <p:cNvSpPr/>
                 <p:nvPr/>
               </p:nvSpPr>
-              <p:spPr>
+              <p:spPr bwMode="auto">
                 <a:xfrm>
                   <a:off x="1436215" y="1721177"/>
                   <a:ext cx="1246302" cy="1246370"/>
@@ -3923,24 +4600,20 @@
                 <a:bodyPr rtlCol="0" anchor="ctr"/>
                 <a:lstStyle/>
                 <a:p>
-                  <a:pPr algn="ctr"/>
+                  <a:pPr algn="ctr">
+                    <a:defRPr/>
+                  </a:pPr>
                   <a:endParaRPr lang="en-US"/>
                 </a:p>
               </p:txBody>
             </p:sp>
             <p:sp>
               <p:nvSpPr>
-                <p:cNvPr id="28" name="TextBox 27">
-                  <a:extLst>
-                    <a:ext uri="{FF2B5EF4-FFF2-40B4-BE49-F238E27FC236}">
-                      <a16:creationId xmlns:a16="http://schemas.microsoft.com/office/drawing/2014/main" id="{C9EDDAED-64F1-D911-7CF3-05E240ABABBA}"/>
-                    </a:ext>
-                  </a:extLst>
-                </p:cNvPr>
+                <p:cNvPr id="28" name="TextBox 27"/>
                 <p:cNvSpPr txBox="1"/>
                 <p:nvPr/>
               </p:nvSpPr>
-              <p:spPr>
+              <p:spPr bwMode="auto">
                 <a:xfrm>
                   <a:off x="1595868" y="2052185"/>
                   <a:ext cx="936475" cy="461665"/>
@@ -3956,13 +4629,17 @@
                 </a:bodyPr>
                 <a:lstStyle/>
                 <a:p>
+                  <a:pPr>
+                    <a:defRPr/>
+                  </a:pPr>
                   <a:r>
-                    <a:rPr lang="en-US" sz="2400" dirty="0">
+                    <a:rPr lang="en-US" sz="2400">
                       <a:latin typeface="Times New Roman"/>
                       <a:cs typeface="Times New Roman"/>
                     </a:rPr>
                     <a:t>Saved</a:t>
                   </a:r>
+                  <a:endParaRPr/>
                 </a:p>
               </p:txBody>
             </p:sp>
@@ -3970,17 +4647,11 @@
         </p:grpSp>
         <p:grpSp>
           <p:nvGrpSpPr>
-            <p:cNvPr id="13" name="Group 12">
-              <a:extLst>
-                <a:ext uri="{FF2B5EF4-FFF2-40B4-BE49-F238E27FC236}">
-                  <a16:creationId xmlns:a16="http://schemas.microsoft.com/office/drawing/2014/main" id="{034E2477-9324-27FF-FC0F-935B946060B4}"/>
-                </a:ext>
-              </a:extLst>
-            </p:cNvPr>
+            <p:cNvPr id="13" name="Group 12"/>
             <p:cNvGrpSpPr/>
             <p:nvPr/>
           </p:nvGrpSpPr>
-          <p:grpSpPr>
+          <p:grpSpPr bwMode="auto">
             <a:xfrm>
               <a:off x="3851314" y="3381165"/>
               <a:ext cx="1552028" cy="1246370"/>
@@ -3990,17 +4661,11 @@
           </p:grpSpPr>
           <p:sp>
             <p:nvSpPr>
-              <p:cNvPr id="21" name="Rectangle 20">
-                <a:extLst>
-                  <a:ext uri="{FF2B5EF4-FFF2-40B4-BE49-F238E27FC236}">
-                    <a16:creationId xmlns:a16="http://schemas.microsoft.com/office/drawing/2014/main" id="{B53D56AD-039F-66A7-536B-26D3FD3E86F3}"/>
-                  </a:ext>
-                </a:extLst>
-              </p:cNvPr>
+              <p:cNvPr id="21" name="Rectangle 20"/>
               <p:cNvSpPr/>
               <p:nvPr/>
             </p:nvSpPr>
-            <p:spPr>
+            <p:spPr bwMode="auto">
               <a:xfrm>
                 <a:off x="3703297" y="1721177"/>
                 <a:ext cx="1483694" cy="1246370"/>
@@ -4034,29 +4699,26 @@
               <a:bodyPr rtlCol="0" anchor="ctr"/>
               <a:lstStyle/>
               <a:p>
-                <a:pPr algn="ctr"/>
+                <a:pPr algn="ctr">
+                  <a:defRPr/>
+                </a:pPr>
                 <a:r>
                   <a:rPr lang="en-US"/>
                   <a:t>`</a:t>
                 </a:r>
+                <a:endParaRPr/>
               </a:p>
             </p:txBody>
           </p:sp>
           <p:sp>
             <p:nvSpPr>
-              <p:cNvPr id="22" name="TextBox 21">
-                <a:extLst>
-                  <a:ext uri="{FF2B5EF4-FFF2-40B4-BE49-F238E27FC236}">
-                    <a16:creationId xmlns:a16="http://schemas.microsoft.com/office/drawing/2014/main" id="{7F85A99C-B9E2-A221-F62A-1FF2A7223F3A}"/>
-                  </a:ext>
-                </a:extLst>
-              </p:cNvPr>
+              <p:cNvPr id="22" name="TextBox 21"/>
               <p:cNvSpPr txBox="1"/>
               <p:nvPr/>
             </p:nvSpPr>
-            <p:spPr>
+            <p:spPr bwMode="auto">
               <a:xfrm>
-                <a:off x="3669130" y="1927152"/>
+                <a:off x="3669130" y="1927151"/>
                 <a:ext cx="1552028" cy="461665"/>
               </a:xfrm>
               <a:prstGeom prst="rect">
@@ -4070,14 +4732,17 @@
               </a:bodyPr>
               <a:lstStyle/>
               <a:p>
+                <a:pPr>
+                  <a:defRPr/>
+                </a:pPr>
                 <a:r>
-                  <a:rPr lang="en-US" sz="2400" dirty="0" err="1">
+                  <a:rPr lang="en-US" sz="2400">
                     <a:latin typeface="Times New Roman"/>
                     <a:cs typeface="Times New Roman"/>
                   </a:rPr>
                   <a:t>SynthEddy</a:t>
                 </a:r>
-                <a:endParaRPr lang="en-US" sz="2400" dirty="0">
+                <a:endParaRPr lang="en-US" sz="2400">
                   <a:latin typeface="Times New Roman"/>
                   <a:cs typeface="Times New Roman"/>
                 </a:endParaRPr>
@@ -4087,20 +4752,15 @@
         </p:grpSp>
         <p:cxnSp>
           <p:nvCxnSpPr>
-            <p:cNvPr id="14" name="Straight Arrow Connector 13">
-              <a:extLst>
-                <a:ext uri="{FF2B5EF4-FFF2-40B4-BE49-F238E27FC236}">
-                  <a16:creationId xmlns:a16="http://schemas.microsoft.com/office/drawing/2014/main" id="{F5628CE3-7457-06B4-83EC-0046878A21C3}"/>
-                </a:ext>
-              </a:extLst>
-            </p:cNvPr>
+            <p:cNvPr id="14" name="Straight Arrow Connector 13"/>
             <p:cNvCxnSpPr>
+              <a:cxnSpLocks/>
               <a:stCxn id="29" idx="6"/>
               <a:endCxn id="21" idx="1"/>
             </p:cNvCxnSpPr>
             <p:nvPr/>
           </p:nvCxnSpPr>
-          <p:spPr>
+          <p:spPr bwMode="auto">
             <a:xfrm flipV="1">
               <a:off x="1436215" y="4004350"/>
               <a:ext cx="2449266" cy="6571"/>
@@ -4133,19 +4793,15 @@
         </p:cxnSp>
         <p:cxnSp>
           <p:nvCxnSpPr>
-            <p:cNvPr id="15" name="Straight Arrow Connector 14">
-              <a:extLst>
-                <a:ext uri="{FF2B5EF4-FFF2-40B4-BE49-F238E27FC236}">
-                  <a16:creationId xmlns:a16="http://schemas.microsoft.com/office/drawing/2014/main" id="{C87B0814-6395-E39D-55D1-96CD9772500F}"/>
-                </a:ext>
-              </a:extLst>
-            </p:cNvPr>
-            <p:cNvCxnSpPr/>
+            <p:cNvPr id="15" name="Straight Arrow Connector 14"/>
+            <p:cNvCxnSpPr>
+              <a:cxnSpLocks/>
+            </p:cNvCxnSpPr>
             <p:nvPr/>
           </p:nvCxnSpPr>
-          <p:spPr>
+          <p:spPr bwMode="auto">
             <a:xfrm>
-              <a:off x="5369175" y="4010921"/>
+              <a:off x="5369175" y="4010920"/>
               <a:ext cx="2449266" cy="0"/>
             </a:xfrm>
             <a:prstGeom prst="straightConnector1">
@@ -4176,17 +4832,11 @@
         </p:cxnSp>
         <p:sp>
           <p:nvSpPr>
-            <p:cNvPr id="16" name="TextBox 15">
-              <a:extLst>
-                <a:ext uri="{FF2B5EF4-FFF2-40B4-BE49-F238E27FC236}">
-                  <a16:creationId xmlns:a16="http://schemas.microsoft.com/office/drawing/2014/main" id="{0C1872C3-4437-3222-896B-B8D141349931}"/>
-                </a:ext>
-              </a:extLst>
-            </p:cNvPr>
+            <p:cNvPr id="16" name="TextBox 15"/>
             <p:cNvSpPr txBox="1"/>
             <p:nvPr/>
           </p:nvSpPr>
-          <p:spPr>
+          <p:spPr bwMode="auto">
             <a:xfrm>
               <a:off x="1527972" y="3053229"/>
               <a:ext cx="2242922" cy="923330"/>
@@ -4202,68 +4852,73 @@
             </a:bodyPr>
             <a:lstStyle/>
             <a:p>
+              <a:pPr>
+                <a:defRPr/>
+              </a:pPr>
               <a:r>
-                <a:rPr lang="en-US" dirty="0">
+                <a:rPr lang="en-US">
                   <a:latin typeface="Times New Roman"/>
                   <a:cs typeface="Times New Roman"/>
                 </a:rPr>
                 <a:t>Inputs: </a:t>
               </a:r>
+              <a:endParaRPr/>
             </a:p>
             <a:p>
+              <a:pPr>
+                <a:defRPr/>
+              </a:pPr>
               <a:r>
-                <a:rPr lang="en-US" dirty="0">
+                <a:rPr lang="en-US">
                   <a:latin typeface="Times New Roman"/>
                   <a:cs typeface="Times New Roman"/>
                 </a:rPr>
                 <a:t>Position </a:t>
               </a:r>
               <a:r>
-                <a:rPr lang="en-US" b="1" dirty="0">
+                <a:rPr lang="en-US" b="1">
                   <a:latin typeface="Times New Roman"/>
                   <a:cs typeface="Times New Roman"/>
                 </a:rPr>
                 <a:t>x</a:t>
               </a:r>
               <a:r>
-                <a:rPr lang="en-US" dirty="0">
+                <a:rPr lang="en-US">
                   <a:latin typeface="Times New Roman"/>
                   <a:cs typeface="Times New Roman"/>
                 </a:rPr>
                 <a:t> (3D vector)</a:t>
               </a:r>
-              <a:endParaRPr lang="en-US" b="1" dirty="0">
+              <a:endParaRPr lang="en-US" b="1">
                 <a:latin typeface="Times New Roman"/>
                 <a:cs typeface="Times New Roman"/>
               </a:endParaRPr>
             </a:p>
             <a:p>
+              <a:pPr>
+                <a:defRPr/>
+              </a:pPr>
               <a:r>
-                <a:rPr lang="en-US" dirty="0">
+                <a:rPr lang="en-US">
                   <a:latin typeface="Times New Roman"/>
                   <a:cs typeface="Times New Roman"/>
                 </a:rPr>
                 <a:t>Time (t)</a:t>
               </a:r>
+              <a:endParaRPr/>
             </a:p>
           </p:txBody>
         </p:sp>
         <p:sp>
           <p:nvSpPr>
-            <p:cNvPr id="17" name="TextBox 16">
-              <a:extLst>
-                <a:ext uri="{FF2B5EF4-FFF2-40B4-BE49-F238E27FC236}">
-                  <a16:creationId xmlns:a16="http://schemas.microsoft.com/office/drawing/2014/main" id="{B7522B71-5505-D580-D8A0-ED0317319753}"/>
-                </a:ext>
-              </a:extLst>
-            </p:cNvPr>
+            <p:cNvPr id="17" name="TextBox 16"/>
             <p:cNvSpPr txBox="1"/>
             <p:nvPr/>
           </p:nvSpPr>
-          <p:spPr>
+          <p:spPr bwMode="auto">
             <a:xfrm>
               <a:off x="5512709" y="3303245"/>
-              <a:ext cx="1685141" cy="646331"/>
+              <a:ext cx="1685140" cy="646331"/>
             </a:xfrm>
             <a:prstGeom prst="rect">
               <a:avLst/>
@@ -4276,55 +4931,57 @@
             </a:bodyPr>
             <a:lstStyle/>
             <a:p>
+              <a:pPr>
+                <a:defRPr/>
+              </a:pPr>
               <a:r>
-                <a:rPr lang="en-US" dirty="0">
+                <a:rPr lang="en-US">
                   <a:latin typeface="Times New Roman"/>
                   <a:cs typeface="Times New Roman"/>
                 </a:rPr>
                 <a:t>Output: </a:t>
               </a:r>
+              <a:endParaRPr/>
             </a:p>
             <a:p>
+              <a:pPr>
+                <a:defRPr/>
+              </a:pPr>
               <a:r>
-                <a:rPr lang="en-US" dirty="0">
+                <a:rPr lang="en-US">
                   <a:latin typeface="Times New Roman"/>
                   <a:cs typeface="Times New Roman"/>
                 </a:rPr>
                 <a:t>Velocity at (</a:t>
               </a:r>
               <a:r>
-                <a:rPr lang="en-US" b="1" dirty="0">
+                <a:rPr lang="en-US" b="1">
                   <a:latin typeface="Times New Roman"/>
                   <a:cs typeface="Times New Roman"/>
                 </a:rPr>
                 <a:t>x</a:t>
               </a:r>
               <a:r>
-                <a:rPr lang="en-US" dirty="0">
+                <a:rPr lang="en-US">
                   <a:latin typeface="Times New Roman"/>
                   <a:cs typeface="Times New Roman"/>
                 </a:rPr>
                 <a:t>, t)</a:t>
               </a:r>
+              <a:endParaRPr/>
             </a:p>
           </p:txBody>
         </p:sp>
       </p:grpSp>
       <p:sp>
         <p:nvSpPr>
-          <p:cNvPr id="31" name="TextBox 30">
-            <a:extLst>
-              <a:ext uri="{FF2B5EF4-FFF2-40B4-BE49-F238E27FC236}">
-                <a16:creationId xmlns:a16="http://schemas.microsoft.com/office/drawing/2014/main" id="{2242D141-8642-50CE-2586-985806FEB9D8}"/>
-              </a:ext>
-            </a:extLst>
-          </p:cNvPr>
+          <p:cNvPr id="31" name="TextBox 30"/>
           <p:cNvSpPr txBox="1"/>
           <p:nvPr/>
         </p:nvSpPr>
-        <p:spPr>
+        <p:spPr bwMode="auto">
           <a:xfrm>
-            <a:off x="4095834" y="5079073"/>
+            <a:off x="4095834" y="5079072"/>
             <a:ext cx="1098378" cy="307777"/>
           </a:xfrm>
           <a:prstGeom prst="rect">
@@ -4338,34 +4995,32 @@
           </a:bodyPr>
           <a:lstStyle/>
           <a:p>
-            <a:r>
-              <a:rPr lang="en-US" sz="1400" dirty="0">
+            <a:pPr>
+              <a:defRPr/>
+            </a:pPr>
+            <a:r>
+              <a:rPr lang="en-US" sz="1400">
                 <a:latin typeface="Times New Roman"/>
                 <a:cs typeface="Times New Roman"/>
               </a:rPr>
               <a:t>Query Mode</a:t>
             </a:r>
+            <a:endParaRPr/>
           </a:p>
         </p:txBody>
       </p:sp>
       <p:cxnSp>
         <p:nvCxnSpPr>
-          <p:cNvPr id="33" name="Straight Arrow Connector 32">
-            <a:extLst>
-              <a:ext uri="{FF2B5EF4-FFF2-40B4-BE49-F238E27FC236}">
-                <a16:creationId xmlns:a16="http://schemas.microsoft.com/office/drawing/2014/main" id="{A952A90C-6F4D-20C3-59F8-DD12D8774945}"/>
-              </a:ext>
-            </a:extLst>
-          </p:cNvPr>
+          <p:cNvPr id="33" name="Straight Arrow Connector 32"/>
           <p:cNvCxnSpPr>
             <a:cxnSpLocks/>
           </p:cNvCxnSpPr>
           <p:nvPr/>
         </p:nvCxnSpPr>
-        <p:spPr>
+        <p:spPr bwMode="auto">
           <a:xfrm flipH="1">
             <a:off x="4743450" y="2255263"/>
-            <a:ext cx="3061098" cy="1995099"/>
+            <a:ext cx="3061098" cy="1995098"/>
           </a:xfrm>
           <a:prstGeom prst="straightConnector1">
             <a:avLst/>
@@ -4393,17 +5048,11 @@
       </p:cxnSp>
       <p:sp>
         <p:nvSpPr>
-          <p:cNvPr id="43" name="TextBox 42">
-            <a:extLst>
-              <a:ext uri="{FF2B5EF4-FFF2-40B4-BE49-F238E27FC236}">
-                <a16:creationId xmlns:a16="http://schemas.microsoft.com/office/drawing/2014/main" id="{4512E2B9-B1C0-2578-AA7A-848A35B9C61E}"/>
-              </a:ext>
-            </a:extLst>
-          </p:cNvPr>
+          <p:cNvPr id="43" name="TextBox 42"/>
           <p:cNvSpPr txBox="1"/>
           <p:nvPr/>
         </p:nvSpPr>
-        <p:spPr>
+        <p:spPr bwMode="auto">
           <a:xfrm rot="19624764">
             <a:off x="4647891" y="3049595"/>
             <a:ext cx="2460930" cy="369332"/>
@@ -4419,31 +5068,38 @@
           </a:bodyPr>
           <a:lstStyle/>
           <a:p>
-            <a:r>
-              <a:rPr lang="en-US" dirty="0">
+            <a:pPr>
+              <a:defRPr/>
+            </a:pPr>
+            <a:r>
+              <a:rPr lang="en-US">
                 <a:latin typeface="Times New Roman"/>
                 <a:cs typeface="Times New Roman"/>
               </a:rPr>
               <a:t>Inputs: (read saved data)</a:t>
             </a:r>
+            <a:endParaRPr/>
           </a:p>
         </p:txBody>
       </p:sp>
     </p:spTree>
-    <p:extLst>
-      <p:ext uri="{BB962C8B-B14F-4D97-AF65-F5344CB8AC3E}">
-        <p14:creationId xmlns:p14="http://schemas.microsoft.com/office/powerpoint/2010/main" val="2981099056"/>
-      </p:ext>
-    </p:extLst>
   </p:cSld>
   <p:clrMapOvr>
     <a:masterClrMapping/>
   </p:clrMapOvr>
+  <mc:AlternateContent xmlns:mc="http://schemas.openxmlformats.org/markup-compatibility/2006">
+    <mc:Choice xmlns:p159="http://schemas.microsoft.com/office/powerpoint/2015/09/main" xmlns:p14="http://schemas.microsoft.com/office/powerpoint/2010/main" Requires="p159">
+      <p:transition p14:dur="2000" advClick="1"/>
+    </mc:Choice>
+    <mc:Fallback>
+      <p:transition advClick="1"/>
+    </mc:Fallback>
+  </mc:AlternateContent>
 </p:sld>
 </file>
 
 <file path=ppt/theme/theme1.xml><?xml version="1.0" encoding="utf-8"?>
-<a:theme xmlns:a="http://schemas.openxmlformats.org/drawingml/2006/main" name="Office Theme">
+<a:theme xmlns:a="http://schemas.openxmlformats.org/drawingml/2006/main" xmlns:r="http://schemas.openxmlformats.org/officeDocument/2006/relationships" xmlns:p="http://schemas.openxmlformats.org/presentationml/2006/main" name="Office Theme">
   <a:themeElements>
     <a:clrScheme name="Office">
       <a:dk1>
@@ -4486,73 +5142,13 @@
     <a:fontScheme name="Office">
       <a:majorFont>
         <a:latin typeface="Calibri"/>
-        <a:ea typeface=""/>
-        <a:cs typeface=""/>
-        <a:font script="Jpan" typeface="ＭＳ Ｐゴシック"/>
-        <a:font script="Hang" typeface="맑은 고딕"/>
-        <a:font script="Hans" typeface="宋体"/>
-        <a:font script="Hant" typeface="新細明體"/>
-        <a:font script="Arab" typeface="Times New Roman"/>
-        <a:font script="Hebr" typeface="Times New Roman"/>
-        <a:font script="Thai" typeface="Angsana New"/>
-        <a:font script="Ethi" typeface="Nyala"/>
-        <a:font script="Beng" typeface="Vrinda"/>
-        <a:font script="Gujr" typeface="Shruti"/>
-        <a:font script="Khmr" typeface="MoolBoran"/>
-        <a:font script="Knda" typeface="Tunga"/>
-        <a:font script="Guru" typeface="Raavi"/>
-        <a:font script="Cans" typeface="Euphemia"/>
-        <a:font script="Cher" typeface="Plantagenet Cherokee"/>
-        <a:font script="Yiii" typeface="Microsoft Yi Baiti"/>
-        <a:font script="Tibt" typeface="Microsoft Himalaya"/>
-        <a:font script="Thaa" typeface="MV Boli"/>
-        <a:font script="Deva" typeface="Mangal"/>
-        <a:font script="Telu" typeface="Gautami"/>
-        <a:font script="Taml" typeface="Latha"/>
-        <a:font script="Syrc" typeface="Estrangelo Edessa"/>
-        <a:font script="Orya" typeface="Kalinga"/>
-        <a:font script="Mlym" typeface="Kartika"/>
-        <a:font script="Laoo" typeface="DokChampa"/>
-        <a:font script="Sinh" typeface="Iskoola Pota"/>
-        <a:font script="Mong" typeface="Mongolian Baiti"/>
-        <a:font script="Viet" typeface="Times New Roman"/>
-        <a:font script="Uigh" typeface="Microsoft Uighur"/>
-        <a:font script="Geor" typeface="Sylfaen"/>
+        <a:ea typeface="Arial"/>
+        <a:cs typeface="Arial"/>
       </a:majorFont>
       <a:minorFont>
         <a:latin typeface="Calibri"/>
-        <a:ea typeface=""/>
-        <a:cs typeface=""/>
-        <a:font script="Jpan" typeface="ＭＳ Ｐゴシック"/>
-        <a:font script="Hang" typeface="맑은 고딕"/>
-        <a:font script="Hans" typeface="宋体"/>
-        <a:font script="Hant" typeface="新細明體"/>
-        <a:font script="Arab" typeface="Arial"/>
-        <a:font script="Hebr" typeface="Arial"/>
-        <a:font script="Thai" typeface="Cordia New"/>
-        <a:font script="Ethi" typeface="Nyala"/>
-        <a:font script="Beng" typeface="Vrinda"/>
-        <a:font script="Gujr" typeface="Shruti"/>
-        <a:font script="Khmr" typeface="DaunPenh"/>
-        <a:font script="Knda" typeface="Tunga"/>
-        <a:font script="Guru" typeface="Raavi"/>
-        <a:font script="Cans" typeface="Euphemia"/>
-        <a:font script="Cher" typeface="Plantagenet Cherokee"/>
-        <a:font script="Yiii" typeface="Microsoft Yi Baiti"/>
-        <a:font script="Tibt" typeface="Microsoft Himalaya"/>
-        <a:font script="Thaa" typeface="MV Boli"/>
-        <a:font script="Deva" typeface="Mangal"/>
-        <a:font script="Telu" typeface="Gautami"/>
-        <a:font script="Taml" typeface="Latha"/>
-        <a:font script="Syrc" typeface="Estrangelo Edessa"/>
-        <a:font script="Orya" typeface="Kalinga"/>
-        <a:font script="Mlym" typeface="Kartika"/>
-        <a:font script="Laoo" typeface="DokChampa"/>
-        <a:font script="Sinh" typeface="Iskoola Pota"/>
-        <a:font script="Mong" typeface="Mongolian Baiti"/>
-        <a:font script="Viet" typeface="Arial"/>
-        <a:font script="Uigh" typeface="Microsoft Uighur"/>
-        <a:font script="Geor" typeface="Sylfaen"/>
+        <a:ea typeface="Arial"/>
+        <a:cs typeface="Arial"/>
       </a:minorFont>
     </a:fontScheme>
     <a:fmtScheme name="Office">
@@ -4560,7 +5156,7 @@
         <a:solidFill>
           <a:schemeClr val="phClr"/>
         </a:solidFill>
-        <a:gradFill rotWithShape="1">
+        <a:gradFill>
           <a:gsLst>
             <a:gs pos="0">
               <a:schemeClr val="phClr">
@@ -4583,7 +5179,7 @@
           </a:gsLst>
           <a:lin ang="16200000" scaled="1"/>
         </a:gradFill>
-        <a:gradFill rotWithShape="1">
+        <a:gradFill>
           <a:gsLst>
             <a:gs pos="0">
               <a:schemeClr val="phClr">
@@ -4653,24 +5249,13 @@
               </a:srgbClr>
             </a:outerShdw>
           </a:effectLst>
-          <a:scene3d>
-            <a:camera prst="orthographicFront">
-              <a:rot lat="0" lon="0" rev="0"/>
-            </a:camera>
-            <a:lightRig rig="threePt" dir="t">
-              <a:rot lat="0" lon="0" rev="1200000"/>
-            </a:lightRig>
-          </a:scene3d>
-          <a:sp3d>
-            <a:bevelT w="63500" h="25400"/>
-          </a:sp3d>
         </a:effectStyle>
       </a:effectStyleLst>
       <a:bgFillStyleLst>
         <a:solidFill>
           <a:schemeClr val="phClr"/>
         </a:solidFill>
-        <a:gradFill rotWithShape="1">
+        <a:gradFill>
           <a:gsLst>
             <a:gs pos="0">
               <a:schemeClr val="phClr">
@@ -4692,11 +5277,9 @@
               </a:schemeClr>
             </a:gs>
           </a:gsLst>
-          <a:path path="circle">
-            <a:fillToRect l="50000" t="-80000" r="50000" b="180000"/>
-          </a:path>
+          <a:path path="circle"/>
         </a:gradFill>
-        <a:gradFill rotWithShape="1">
+        <a:gradFill>
           <a:gsLst>
             <a:gs pos="0">
               <a:schemeClr val="phClr">
@@ -4711,16 +5294,14 @@
               </a:schemeClr>
             </a:gs>
           </a:gsLst>
-          <a:path path="circle">
-            <a:fillToRect l="50000" t="50000" r="50000" b="50000"/>
-          </a:path>
+          <a:path path="circle"/>
         </a:gradFill>
       </a:bgFillStyleLst>
     </a:fmtScheme>
   </a:themeElements>
   <a:objectDefaults>
     <a:spDef>
-      <a:spPr/>
+      <a:spPr bwMode="auto"/>
       <a:bodyPr/>
       <a:lstStyle/>
       <a:style>
@@ -4739,7 +5320,7 @@
       </a:style>
     </a:spDef>
     <a:lnDef>
-      <a:spPr/>
+      <a:spPr bwMode="auto"/>
       <a:bodyPr/>
       <a:lstStyle/>
       <a:style>
@@ -4758,6 +5339,249 @@
       </a:style>
     </a:lnDef>
   </a:objectDefaults>
-  <a:extraClrSchemeLst/>
+</a:theme>
+</file>
+
+<file path=ppt/theme/theme2.xml><?xml version="1.0" encoding="utf-8"?>
+<a:theme xmlns:a="http://schemas.openxmlformats.org/drawingml/2006/main" xmlns:r="http://schemas.openxmlformats.org/officeDocument/2006/relationships" xmlns:p="http://schemas.openxmlformats.org/presentationml/2006/main" name="Office Theme">
+  <a:themeElements>
+    <a:clrScheme name="Office">
+      <a:dk1>
+        <a:sysClr val="windowText" lastClr="000000"/>
+      </a:dk1>
+      <a:lt1>
+        <a:sysClr val="window" lastClr="FFFFFF"/>
+      </a:lt1>
+      <a:dk2>
+        <a:srgbClr val="1F497D"/>
+      </a:dk2>
+      <a:lt2>
+        <a:srgbClr val="EEECE1"/>
+      </a:lt2>
+      <a:accent1>
+        <a:srgbClr val="4F81BD"/>
+      </a:accent1>
+      <a:accent2>
+        <a:srgbClr val="C0504D"/>
+      </a:accent2>
+      <a:accent3>
+        <a:srgbClr val="9BBB59"/>
+      </a:accent3>
+      <a:accent4>
+        <a:srgbClr val="8064A2"/>
+      </a:accent4>
+      <a:accent5>
+        <a:srgbClr val="4BACC6"/>
+      </a:accent5>
+      <a:accent6>
+        <a:srgbClr val="F79646"/>
+      </a:accent6>
+      <a:hlink>
+        <a:srgbClr val="0000FF"/>
+      </a:hlink>
+      <a:folHlink>
+        <a:srgbClr val="800080"/>
+      </a:folHlink>
+    </a:clrScheme>
+    <a:fontScheme name="">
+      <a:majorFont>
+        <a:latin typeface="Calibri"/>
+        <a:ea typeface="Arial"/>
+        <a:cs typeface="Arial"/>
+      </a:majorFont>
+      <a:minorFont>
+        <a:latin typeface="Calibri"/>
+        <a:ea typeface="Arial"/>
+        <a:cs typeface="Arial"/>
+      </a:minorFont>
+    </a:fontScheme>
+    <a:fmtScheme name="Office">
+      <a:fillStyleLst>
+        <a:solidFill>
+          <a:schemeClr val="phClr"/>
+        </a:solidFill>
+        <a:gradFill>
+          <a:gsLst>
+            <a:gs pos="0">
+              <a:schemeClr val="phClr">
+                <a:tint val="50000"/>
+                <a:satMod val="300000"/>
+              </a:schemeClr>
+            </a:gs>
+            <a:gs pos="35000">
+              <a:schemeClr val="phClr">
+                <a:tint val="37000"/>
+                <a:satMod val="300000"/>
+              </a:schemeClr>
+            </a:gs>
+            <a:gs pos="100000">
+              <a:schemeClr val="phClr">
+                <a:tint val="15000"/>
+                <a:satMod val="350000"/>
+              </a:schemeClr>
+            </a:gs>
+          </a:gsLst>
+          <a:lin ang="16200000" scaled="1"/>
+        </a:gradFill>
+        <a:gradFill>
+          <a:gsLst>
+            <a:gs pos="0">
+              <a:schemeClr val="phClr">
+                <a:tint val="100000"/>
+                <a:shade val="100000"/>
+                <a:satMod val="130000"/>
+              </a:schemeClr>
+            </a:gs>
+            <a:gs pos="100000">
+              <a:schemeClr val="phClr">
+                <a:tint val="50000"/>
+                <a:shade val="100000"/>
+                <a:satMod val="350000"/>
+              </a:schemeClr>
+            </a:gs>
+          </a:gsLst>
+          <a:lin ang="16200000" scaled="0"/>
+        </a:gradFill>
+      </a:fillStyleLst>
+      <a:lnStyleLst>
+        <a:ln w="9525" cap="flat" cmpd="sng" algn="ctr">
+          <a:solidFill>
+            <a:schemeClr val="phClr">
+              <a:shade val="95000"/>
+              <a:satMod val="105000"/>
+            </a:schemeClr>
+          </a:solidFill>
+          <a:prstDash val="solid"/>
+        </a:ln>
+        <a:ln w="25400" cap="flat" cmpd="sng" algn="ctr">
+          <a:solidFill>
+            <a:schemeClr val="phClr"/>
+          </a:solidFill>
+          <a:prstDash val="solid"/>
+        </a:ln>
+        <a:ln w="38100" cap="flat" cmpd="sng" algn="ctr">
+          <a:solidFill>
+            <a:schemeClr val="phClr"/>
+          </a:solidFill>
+          <a:prstDash val="solid"/>
+        </a:ln>
+      </a:lnStyleLst>
+      <a:effectStyleLst>
+        <a:effectStyle>
+          <a:effectLst>
+            <a:outerShdw blurRad="40000" dist="20000" dir="5400000" rotWithShape="0">
+              <a:srgbClr val="000000">
+                <a:alpha val="38000"/>
+              </a:srgbClr>
+            </a:outerShdw>
+          </a:effectLst>
+        </a:effectStyle>
+        <a:effectStyle>
+          <a:effectLst>
+            <a:outerShdw blurRad="40000" dist="23000" dir="5400000" rotWithShape="0">
+              <a:srgbClr val="000000">
+                <a:alpha val="35000"/>
+              </a:srgbClr>
+            </a:outerShdw>
+          </a:effectLst>
+        </a:effectStyle>
+        <a:effectStyle>
+          <a:effectLst>
+            <a:outerShdw blurRad="40000" dist="23000" dir="5400000" rotWithShape="0">
+              <a:srgbClr val="000000">
+                <a:alpha val="35000"/>
+              </a:srgbClr>
+            </a:outerShdw>
+          </a:effectLst>
+        </a:effectStyle>
+      </a:effectStyleLst>
+      <a:bgFillStyleLst>
+        <a:solidFill>
+          <a:schemeClr val="phClr"/>
+        </a:solidFill>
+        <a:gradFill>
+          <a:gsLst>
+            <a:gs pos="0">
+              <a:schemeClr val="phClr">
+                <a:tint val="40000"/>
+                <a:satMod val="350000"/>
+              </a:schemeClr>
+            </a:gs>
+            <a:gs pos="40000">
+              <a:schemeClr val="phClr">
+                <a:tint val="45000"/>
+                <a:shade val="99000"/>
+                <a:satMod val="350000"/>
+              </a:schemeClr>
+            </a:gs>
+            <a:gs pos="100000">
+              <a:schemeClr val="phClr">
+                <a:shade val="20000"/>
+                <a:satMod val="255000"/>
+              </a:schemeClr>
+            </a:gs>
+          </a:gsLst>
+          <a:path path="circle"/>
+        </a:gradFill>
+        <a:gradFill>
+          <a:gsLst>
+            <a:gs pos="0">
+              <a:schemeClr val="phClr">
+                <a:tint val="80000"/>
+                <a:satMod val="300000"/>
+              </a:schemeClr>
+            </a:gs>
+            <a:gs pos="100000">
+              <a:schemeClr val="phClr">
+                <a:shade val="30000"/>
+                <a:satMod val="200000"/>
+              </a:schemeClr>
+            </a:gs>
+          </a:gsLst>
+          <a:path path="circle"/>
+        </a:gradFill>
+      </a:bgFillStyleLst>
+    </a:fmtScheme>
+  </a:themeElements>
+  <a:objectDefaults>
+    <a:spDef>
+      <a:spPr bwMode="auto"/>
+      <a:bodyPr/>
+      <a:lstStyle/>
+      <a:style>
+        <a:lnRef idx="1">
+          <a:schemeClr val="accent1"/>
+        </a:lnRef>
+        <a:fillRef idx="3">
+          <a:schemeClr val="accent1"/>
+        </a:fillRef>
+        <a:effectRef idx="2">
+          <a:schemeClr val="accent1"/>
+        </a:effectRef>
+        <a:fontRef idx="minor">
+          <a:schemeClr val="lt1"/>
+        </a:fontRef>
+      </a:style>
+    </a:spDef>
+    <a:lnDef>
+      <a:spPr bwMode="auto"/>
+      <a:bodyPr/>
+      <a:lstStyle/>
+      <a:style>
+        <a:lnRef idx="2">
+          <a:schemeClr val="accent1"/>
+        </a:lnRef>
+        <a:fillRef idx="0">
+          <a:schemeClr val="accent1"/>
+        </a:fillRef>
+        <a:effectRef idx="1">
+          <a:schemeClr val="accent1"/>
+        </a:effectRef>
+        <a:fontRef idx="minor">
+          <a:schemeClr val="tx1"/>
+        </a:fontRef>
+      </a:style>
+    </a:lnDef>
+  </a:objectDefaults>
 </a:theme>
 </file>
</xml_diff>